<commit_message>
chore: updated ppt doc for delivery 1
</commit_message>
<xml_diff>
--- a/docs/IOC_PrezentareBubbleShooter_DraghiciCiontu_CR4S1A.pptx
+++ b/docs/IOC_PrezentareBubbleShooter_DraghiciCiontu_CR4S1A.pptx
@@ -11,6 +11,12 @@
     <p:sldId id="259" r:id="rId5"/>
     <p:sldId id="260" r:id="rId6"/>
     <p:sldId id="261" r:id="rId7"/>
+    <p:sldId id="262" r:id="rId8"/>
+    <p:sldId id="263" r:id="rId9"/>
+    <p:sldId id="264" r:id="rId10"/>
+    <p:sldId id="265" r:id="rId11"/>
+    <p:sldId id="266" r:id="rId12"/>
+    <p:sldId id="267" r:id="rId13"/>
   </p:sldIdLst>
   <p:sldSz cx="9144000" cy="6858000" type="screen4x3"/>
   <p:notesSz cx="6858000" cy="9144000"/>
@@ -343,7 +349,7 @@
             <a:fld id="{1D8BD707-D9CF-40AE-B4C6-C98DA3205C09}" type="datetimeFigureOut">
               <a:rPr lang="en-US" smtClean="0"/>
               <a:pPr/>
-              <a:t>3/11/2023</a:t>
+              <a:t>3/12/2023</a:t>
             </a:fld>
             <a:endParaRPr lang="en-US"/>
           </a:p>
@@ -558,7 +564,7 @@
             <a:fld id="{1D8BD707-D9CF-40AE-B4C6-C98DA3205C09}" type="datetimeFigureOut">
               <a:rPr lang="en-US" smtClean="0"/>
               <a:pPr/>
-              <a:t>3/11/2023</a:t>
+              <a:t>3/12/2023</a:t>
             </a:fld>
             <a:endParaRPr lang="en-US"/>
           </a:p>
@@ -735,7 +741,7 @@
             <a:fld id="{1D8BD707-D9CF-40AE-B4C6-C98DA3205C09}" type="datetimeFigureOut">
               <a:rPr lang="en-US" smtClean="0"/>
               <a:pPr/>
-              <a:t>3/11/2023</a:t>
+              <a:t>3/12/2023</a:t>
             </a:fld>
             <a:endParaRPr lang="en-US"/>
           </a:p>
@@ -902,7 +908,7 @@
             <a:fld id="{1D8BD707-D9CF-40AE-B4C6-C98DA3205C09}" type="datetimeFigureOut">
               <a:rPr lang="en-US" smtClean="0"/>
               <a:pPr/>
-              <a:t>3/11/2023</a:t>
+              <a:t>3/12/2023</a:t>
             </a:fld>
             <a:endParaRPr lang="en-US"/>
           </a:p>
@@ -1188,7 +1194,7 @@
             <a:fld id="{1D8BD707-D9CF-40AE-B4C6-C98DA3205C09}" type="datetimeFigureOut">
               <a:rPr lang="en-US" smtClean="0"/>
               <a:pPr/>
-              <a:t>3/11/2023</a:t>
+              <a:t>3/12/2023</a:t>
             </a:fld>
             <a:endParaRPr lang="en-US"/>
           </a:p>
@@ -1516,7 +1522,7 @@
             <a:fld id="{1D8BD707-D9CF-40AE-B4C6-C98DA3205C09}" type="datetimeFigureOut">
               <a:rPr lang="en-US" smtClean="0"/>
               <a:pPr/>
-              <a:t>3/11/2023</a:t>
+              <a:t>3/12/2023</a:t>
             </a:fld>
             <a:endParaRPr lang="en-US"/>
           </a:p>
@@ -1943,7 +1949,7 @@
             <a:fld id="{1D8BD707-D9CF-40AE-B4C6-C98DA3205C09}" type="datetimeFigureOut">
               <a:rPr lang="en-US" smtClean="0"/>
               <a:pPr/>
-              <a:t>3/11/2023</a:t>
+              <a:t>3/12/2023</a:t>
             </a:fld>
             <a:endParaRPr lang="en-US"/>
           </a:p>
@@ -2118,7 +2124,7 @@
             <a:fld id="{1D8BD707-D9CF-40AE-B4C6-C98DA3205C09}" type="datetimeFigureOut">
               <a:rPr lang="en-US" smtClean="0"/>
               <a:pPr/>
-              <a:t>3/11/2023</a:t>
+              <a:t>3/12/2023</a:t>
             </a:fld>
             <a:endParaRPr lang="en-US"/>
           </a:p>
@@ -2210,7 +2216,7 @@
             <a:fld id="{1D8BD707-D9CF-40AE-B4C6-C98DA3205C09}" type="datetimeFigureOut">
               <a:rPr lang="en-US" smtClean="0"/>
               <a:pPr/>
-              <a:t>3/11/2023</a:t>
+              <a:t>3/12/2023</a:t>
             </a:fld>
             <a:endParaRPr lang="en-US"/>
           </a:p>
@@ -2492,7 +2498,7 @@
             <a:fld id="{1D8BD707-D9CF-40AE-B4C6-C98DA3205C09}" type="datetimeFigureOut">
               <a:rPr lang="en-US" smtClean="0"/>
               <a:pPr/>
-              <a:t>3/11/2023</a:t>
+              <a:t>3/12/2023</a:t>
             </a:fld>
             <a:endParaRPr lang="en-US"/>
           </a:p>
@@ -2793,7 +2799,7 @@
             <a:fld id="{1D8BD707-D9CF-40AE-B4C6-C98DA3205C09}" type="datetimeFigureOut">
               <a:rPr lang="en-US" smtClean="0"/>
               <a:pPr/>
-              <a:t>3/11/2023</a:t>
+              <a:t>3/12/2023</a:t>
             </a:fld>
             <a:endParaRPr lang="en-US"/>
           </a:p>
@@ -3005,7 +3011,7 @@
             <a:fld id="{1D8BD707-D9CF-40AE-B4C6-C98DA3205C09}" type="datetimeFigureOut">
               <a:rPr lang="en-US" smtClean="0"/>
               <a:pPr/>
-              <a:t>3/11/2023</a:t>
+              <a:t>3/12/2023</a:t>
             </a:fld>
             <a:endParaRPr lang="en-US"/>
           </a:p>
@@ -3563,8 +3569,8 @@
         </p:nvSpPr>
         <p:spPr>
           <a:xfrm>
-            <a:off x="1600200" y="609600"/>
-            <a:ext cx="6096000" cy="990600"/>
+            <a:off x="1600200" y="762000"/>
+            <a:ext cx="6096000" cy="838200"/>
           </a:xfrm>
         </p:spPr>
         <p:style>
@@ -3606,18 +3612,18 @@
         </p:nvSpPr>
         <p:spPr>
           <a:xfrm>
-            <a:off x="762000" y="4114800"/>
-            <a:ext cx="7772400" cy="1143000"/>
+            <a:off x="762000" y="4267200"/>
+            <a:ext cx="7772400" cy="990600"/>
           </a:xfrm>
         </p:spPr>
         <p:style>
-          <a:lnRef idx="1">
+          <a:lnRef idx="2">
             <a:schemeClr val="accent2"/>
           </a:lnRef>
-          <a:fillRef idx="2">
-            <a:schemeClr val="accent2"/>
+          <a:fillRef idx="1">
+            <a:schemeClr val="lt1"/>
           </a:fillRef>
-          <a:effectRef idx="1">
+          <a:effectRef idx="0">
             <a:schemeClr val="accent2"/>
           </a:effectRef>
           <a:fontRef idx="minor">
@@ -3632,6 +3638,9 @@
           <a:p>
             <a:r>
               <a:rPr lang="en-US" sz="1600" b="1" dirty="0" smtClean="0">
+                <a:solidFill>
+                  <a:srgbClr val="FF0000"/>
+                </a:solidFill>
                 <a:latin typeface="Times New Roman" pitchFamily="18" charset="0"/>
                 <a:cs typeface="Times New Roman" pitchFamily="18" charset="0"/>
               </a:rPr>
@@ -3641,6 +3650,9 @@
           <a:p>
             <a:r>
               <a:rPr lang="en-US" sz="1600" b="1" dirty="0" smtClean="0">
+                <a:solidFill>
+                  <a:srgbClr val="FF0000"/>
+                </a:solidFill>
                 <a:latin typeface="Times New Roman" pitchFamily="18" charset="0"/>
                 <a:cs typeface="Times New Roman" pitchFamily="18" charset="0"/>
               </a:rPr>
@@ -3650,12 +3662,18 @@
           <a:p>
             <a:r>
               <a:rPr lang="en-US" sz="1600" b="1" dirty="0" smtClean="0">
+                <a:solidFill>
+                  <a:srgbClr val="FF0000"/>
+                </a:solidFill>
                 <a:latin typeface="Times New Roman" pitchFamily="18" charset="0"/>
                 <a:cs typeface="Times New Roman" pitchFamily="18" charset="0"/>
               </a:rPr>
               <a:t>CR4.S1A                                                                                   Interactiunea Om-Calculator</a:t>
             </a:r>
             <a:endParaRPr lang="en-US" sz="1600" b="1" dirty="0">
+              <a:solidFill>
+                <a:srgbClr val="FF0000"/>
+              </a:solidFill>
               <a:latin typeface="Times New Roman" pitchFamily="18" charset="0"/>
               <a:cs typeface="Times New Roman" pitchFamily="18" charset="0"/>
             </a:endParaRPr>
@@ -3682,6 +3700,815 @@
 </p:sld>
 </file>
 
+<file path=ppt/slides/slide10.xml><?xml version="1.0" encoding="utf-8"?>
+<p:sld xmlns:a="http://schemas.openxmlformats.org/drawingml/2006/main" xmlns:r="http://schemas.openxmlformats.org/officeDocument/2006/relationships" xmlns:p="http://schemas.openxmlformats.org/presentationml/2006/main">
+  <p:cSld>
+    <p:spTree>
+      <p:nvGrpSpPr>
+        <p:cNvPr id="1" name=""/>
+        <p:cNvGrpSpPr/>
+        <p:nvPr/>
+      </p:nvGrpSpPr>
+      <p:grpSpPr>
+        <a:xfrm>
+          <a:off x="0" y="0"/>
+          <a:ext cx="0" cy="0"/>
+          <a:chOff x="0" y="0"/>
+          <a:chExt cx="0" cy="0"/>
+        </a:xfrm>
+      </p:grpSpPr>
+      <p:sp>
+        <p:nvSpPr>
+          <p:cNvPr id="2" name="Title 1"/>
+          <p:cNvSpPr>
+            <a:spLocks noGrp="1"/>
+          </p:cNvSpPr>
+          <p:nvPr>
+            <p:ph type="title"/>
+          </p:nvPr>
+        </p:nvSpPr>
+        <p:spPr>
+          <a:xfrm>
+            <a:off x="766483" y="457200"/>
+            <a:ext cx="7559488" cy="762000"/>
+          </a:xfrm>
+        </p:spPr>
+        <p:style>
+          <a:lnRef idx="2">
+            <a:schemeClr val="accent2"/>
+          </a:lnRef>
+          <a:fillRef idx="1">
+            <a:schemeClr val="lt1"/>
+          </a:fillRef>
+          <a:effectRef idx="0">
+            <a:schemeClr val="accent2"/>
+          </a:effectRef>
+          <a:fontRef idx="minor">
+            <a:schemeClr val="dk1"/>
+          </a:fontRef>
+        </p:style>
+        <p:txBody>
+          <a:bodyPr>
+            <a:noAutofit/>
+          </a:bodyPr>
+          <a:lstStyle/>
+          <a:p>
+            <a:pPr algn="ctr"/>
+            <a:r>
+              <a:rPr lang="ro-RO" sz="3600" dirty="0"/>
+              <a:t/>
+            </a:r>
+            <a:br>
+              <a:rPr lang="ro-RO" sz="3600" dirty="0"/>
+            </a:br>
+            <a:r>
+              <a:rPr lang="ro-RO" sz="2400" b="1" dirty="0" smtClean="0"/>
+              <a:t>Functionalitatea de salvare a </a:t>
+            </a:r>
+            <a:r>
+              <a:rPr lang="ro-RO" sz="2400" b="1" dirty="0"/>
+              <a:t>scorului si al jucatorilor </a:t>
+            </a:r>
+            <a:r>
+              <a:rPr lang="ro-RO" sz="2400" b="1" dirty="0" smtClean="0"/>
+              <a:t>castigatori –Partea 1</a:t>
+            </a:r>
+            <a:endParaRPr lang="en-US" sz="2400" b="1" dirty="0"/>
+          </a:p>
+        </p:txBody>
+      </p:sp>
+      <p:pic>
+        <p:nvPicPr>
+          <p:cNvPr id="5122" name="Picture 2"/>
+          <p:cNvPicPr>
+            <a:picLocks noGrp="1" noChangeAspect="1" noChangeArrowheads="1"/>
+          </p:cNvPicPr>
+          <p:nvPr>
+            <p:ph sz="half" idx="2"/>
+          </p:nvPr>
+        </p:nvPicPr>
+        <p:blipFill>
+          <a:blip r:embed="rId2">
+            <a:extLst>
+              <a:ext uri="{28A0092B-C50C-407E-A947-70E740481C1C}">
+                <a14:useLocalDpi xmlns:a14="http://schemas.microsoft.com/office/drawing/2010/main" val="0"/>
+              </a:ext>
+            </a:extLst>
+          </a:blip>
+          <a:srcRect/>
+          <a:stretch>
+            <a:fillRect/>
+          </a:stretch>
+        </p:blipFill>
+        <p:spPr bwMode="auto">
+          <a:xfrm>
+            <a:off x="4424722" y="1447800"/>
+            <a:ext cx="3918857" cy="3429000"/>
+          </a:xfrm>
+          <a:prstGeom prst="rect">
+            <a:avLst/>
+          </a:prstGeom>
+          <a:noFill/>
+          <a:ln>
+            <a:noFill/>
+          </a:ln>
+          <a:effectLst/>
+          <a:extLst>
+            <a:ext uri="{909E8E84-426E-40DD-AFC4-6F175D3DCCD1}">
+              <a14:hiddenFill xmlns:a14="http://schemas.microsoft.com/office/drawing/2010/main">
+                <a:solidFill>
+                  <a:schemeClr val="accent1"/>
+                </a:solidFill>
+              </a14:hiddenFill>
+            </a:ext>
+            <a:ext uri="{91240B29-F687-4F45-9708-019B960494DF}">
+              <a14:hiddenLine xmlns:a14="http://schemas.microsoft.com/office/drawing/2010/main" w="9525">
+                <a:solidFill>
+                  <a:schemeClr val="tx1"/>
+                </a:solidFill>
+                <a:miter lim="800000"/>
+                <a:headEnd/>
+                <a:tailEnd/>
+              </a14:hiddenLine>
+            </a:ext>
+            <a:ext uri="{AF507438-7753-43E0-B8FC-AC1667EBCBE1}">
+              <a14:hiddenEffects xmlns:a14="http://schemas.microsoft.com/office/drawing/2010/main">
+                <a:effectLst>
+                  <a:outerShdw dist="35921" dir="2700000" algn="ctr" rotWithShape="0">
+                    <a:schemeClr val="bg2"/>
+                  </a:outerShdw>
+                </a:effectLst>
+              </a14:hiddenEffects>
+            </a:ext>
+          </a:extLst>
+        </p:spPr>
+      </p:pic>
+      <p:sp>
+        <p:nvSpPr>
+          <p:cNvPr id="6" name="TextBox 5"/>
+          <p:cNvSpPr txBox="1"/>
+          <p:nvPr/>
+        </p:nvSpPr>
+        <p:spPr>
+          <a:xfrm>
+            <a:off x="746312" y="1676400"/>
+            <a:ext cx="3581400" cy="3970318"/>
+          </a:xfrm>
+          <a:prstGeom prst="rect">
+            <a:avLst/>
+          </a:prstGeom>
+        </p:spPr>
+        <p:style>
+          <a:lnRef idx="1">
+            <a:schemeClr val="accent2"/>
+          </a:lnRef>
+          <a:fillRef idx="2">
+            <a:schemeClr val="accent2"/>
+          </a:fillRef>
+          <a:effectRef idx="1">
+            <a:schemeClr val="accent2"/>
+          </a:effectRef>
+          <a:fontRef idx="minor">
+            <a:schemeClr val="dk1"/>
+          </a:fontRef>
+        </p:style>
+        <p:txBody>
+          <a:bodyPr wrap="square" rtlCol="0">
+            <a:spAutoFit/>
+          </a:bodyPr>
+          <a:lstStyle/>
+          <a:p>
+            <a:r>
+              <a:rPr lang="ro-RO" b="1" dirty="0" smtClean="0"/>
+              <a:t>La finalizarea jocului, va aparea un modal cu mesajul You win!, unde utilizatorul va trebui sa isi introduca numele pentru a fi inregistrat in clasament. </a:t>
+            </a:r>
+          </a:p>
+          <a:p>
+            <a:endParaRPr lang="ro-RO" b="1" dirty="0"/>
+          </a:p>
+          <a:p>
+            <a:r>
+              <a:rPr lang="ro-RO" b="1" dirty="0" smtClean="0"/>
+              <a:t>De altfel, aceste informatii vor fi salvate si intr-un fisier extern .text, astfel incat pe viitor la o noua sesiune de joc noii utilizatori sa poata vedea direct in interfata scorurile salvate, cat si numele jucatorilor castigatori, ca in a doua imagine atasata de jos.</a:t>
+            </a:r>
+            <a:endParaRPr lang="en-US" b="1" dirty="0"/>
+          </a:p>
+        </p:txBody>
+      </p:sp>
+      <p:pic>
+        <p:nvPicPr>
+          <p:cNvPr id="5123" name="Picture 3"/>
+          <p:cNvPicPr>
+            <a:picLocks noChangeAspect="1" noChangeArrowheads="1"/>
+          </p:cNvPicPr>
+          <p:nvPr/>
+        </p:nvPicPr>
+        <p:blipFill rotWithShape="1">
+          <a:blip r:embed="rId3">
+            <a:extLst>
+              <a:ext uri="{28A0092B-C50C-407E-A947-70E740481C1C}">
+                <a14:useLocalDpi xmlns:a14="http://schemas.microsoft.com/office/drawing/2010/main" val="0"/>
+              </a:ext>
+            </a:extLst>
+          </a:blip>
+          <a:srcRect b="81149"/>
+          <a:stretch/>
+        </p:blipFill>
+        <p:spPr bwMode="auto">
+          <a:xfrm>
+            <a:off x="4419600" y="5051601"/>
+            <a:ext cx="3939989" cy="750610"/>
+          </a:xfrm>
+          <a:prstGeom prst="rect">
+            <a:avLst/>
+          </a:prstGeom>
+          <a:noFill/>
+          <a:ln>
+            <a:noFill/>
+          </a:ln>
+          <a:effectLst/>
+          <a:extLst>
+            <a:ext uri="{909E8E84-426E-40DD-AFC4-6F175D3DCCD1}">
+              <a14:hiddenFill xmlns:a14="http://schemas.microsoft.com/office/drawing/2010/main">
+                <a:solidFill>
+                  <a:schemeClr val="accent1"/>
+                </a:solidFill>
+              </a14:hiddenFill>
+            </a:ext>
+            <a:ext uri="{91240B29-F687-4F45-9708-019B960494DF}">
+              <a14:hiddenLine xmlns:a14="http://schemas.microsoft.com/office/drawing/2010/main" w="9525">
+                <a:solidFill>
+                  <a:schemeClr val="tx1"/>
+                </a:solidFill>
+                <a:miter lim="800000"/>
+                <a:headEnd/>
+                <a:tailEnd/>
+              </a14:hiddenLine>
+            </a:ext>
+            <a:ext uri="{AF507438-7753-43E0-B8FC-AC1667EBCBE1}">
+              <a14:hiddenEffects xmlns:a14="http://schemas.microsoft.com/office/drawing/2010/main">
+                <a:effectLst>
+                  <a:outerShdw dist="35921" dir="2700000" algn="ctr" rotWithShape="0">
+                    <a:schemeClr val="bg2"/>
+                  </a:outerShdw>
+                </a:effectLst>
+              </a14:hiddenEffects>
+            </a:ext>
+          </a:extLst>
+        </p:spPr>
+      </p:pic>
+    </p:spTree>
+    <p:extLst>
+      <p:ext uri="{BB962C8B-B14F-4D97-AF65-F5344CB8AC3E}">
+        <p14:creationId xmlns:p14="http://schemas.microsoft.com/office/powerpoint/2010/main" val="390489320"/>
+      </p:ext>
+    </p:extLst>
+  </p:cSld>
+  <p:clrMapOvr>
+    <a:masterClrMapping/>
+  </p:clrMapOvr>
+  <p:timing>
+    <p:tnLst>
+      <p:par>
+        <p:cTn id="1" dur="indefinite" restart="never" nodeType="tmRoot"/>
+      </p:par>
+    </p:tnLst>
+  </p:timing>
+</p:sld>
+</file>
+
+<file path=ppt/slides/slide11.xml><?xml version="1.0" encoding="utf-8"?>
+<p:sld xmlns:a="http://schemas.openxmlformats.org/drawingml/2006/main" xmlns:r="http://schemas.openxmlformats.org/officeDocument/2006/relationships" xmlns:p="http://schemas.openxmlformats.org/presentationml/2006/main">
+  <p:cSld>
+    <p:spTree>
+      <p:nvGrpSpPr>
+        <p:cNvPr id="1" name=""/>
+        <p:cNvGrpSpPr/>
+        <p:nvPr/>
+      </p:nvGrpSpPr>
+      <p:grpSpPr>
+        <a:xfrm>
+          <a:off x="0" y="0"/>
+          <a:ext cx="0" cy="0"/>
+          <a:chOff x="0" y="0"/>
+          <a:chExt cx="0" cy="0"/>
+        </a:xfrm>
+      </p:grpSpPr>
+      <p:sp>
+        <p:nvSpPr>
+          <p:cNvPr id="2" name="Title 1"/>
+          <p:cNvSpPr>
+            <a:spLocks noGrp="1"/>
+          </p:cNvSpPr>
+          <p:nvPr>
+            <p:ph type="title"/>
+          </p:nvPr>
+        </p:nvSpPr>
+        <p:spPr>
+          <a:xfrm>
+            <a:off x="762000" y="457200"/>
+            <a:ext cx="7543800" cy="762000"/>
+          </a:xfrm>
+        </p:spPr>
+        <p:style>
+          <a:lnRef idx="2">
+            <a:schemeClr val="accent2"/>
+          </a:lnRef>
+          <a:fillRef idx="1">
+            <a:schemeClr val="lt1"/>
+          </a:fillRef>
+          <a:effectRef idx="0">
+            <a:schemeClr val="accent2"/>
+          </a:effectRef>
+          <a:fontRef idx="minor">
+            <a:schemeClr val="dk1"/>
+          </a:fontRef>
+        </p:style>
+        <p:txBody>
+          <a:bodyPr>
+            <a:normAutofit fontScale="90000"/>
+          </a:bodyPr>
+          <a:lstStyle/>
+          <a:p>
+            <a:pPr algn="ctr"/>
+            <a:r>
+              <a:rPr lang="ro-RO" sz="2800" b="1" dirty="0"/>
+              <a:t>Functionalitatea de salvare a scorului si al jucatorilor castigatori –Partea </a:t>
+            </a:r>
+            <a:r>
+              <a:rPr lang="ro-RO" sz="2800" b="1" dirty="0" smtClean="0"/>
+              <a:t>2</a:t>
+            </a:r>
+            <a:endParaRPr lang="en-US" sz="2800" dirty="0"/>
+          </a:p>
+        </p:txBody>
+      </p:sp>
+      <p:sp>
+        <p:nvSpPr>
+          <p:cNvPr id="3" name="Content Placeholder 2"/>
+          <p:cNvSpPr>
+            <a:spLocks noGrp="1"/>
+          </p:cNvSpPr>
+          <p:nvPr>
+            <p:ph sz="half" idx="1"/>
+          </p:nvPr>
+        </p:nvSpPr>
+        <p:spPr>
+          <a:xfrm>
+            <a:off x="762000" y="2057400"/>
+            <a:ext cx="3657600" cy="1676400"/>
+          </a:xfrm>
+        </p:spPr>
+        <p:style>
+          <a:lnRef idx="1">
+            <a:schemeClr val="accent2"/>
+          </a:lnRef>
+          <a:fillRef idx="2">
+            <a:schemeClr val="accent2"/>
+          </a:fillRef>
+          <a:effectRef idx="1">
+            <a:schemeClr val="accent2"/>
+          </a:effectRef>
+          <a:fontRef idx="minor">
+            <a:schemeClr val="dk1"/>
+          </a:fontRef>
+        </p:style>
+        <p:txBody>
+          <a:bodyPr>
+            <a:normAutofit/>
+          </a:bodyPr>
+          <a:lstStyle/>
+          <a:p>
+            <a:pPr marL="0" indent="0">
+              <a:buNone/>
+            </a:pPr>
+            <a:r>
+              <a:rPr lang="ro-RO" sz="1800" b="1" dirty="0" smtClean="0"/>
+              <a:t>Metodele pentru salvarea scorului intr-un fisier text si de incarcare din fisierul text apoi propagat in interfata grafica.</a:t>
+            </a:r>
+            <a:endParaRPr lang="en-US" sz="1800" b="1" dirty="0"/>
+          </a:p>
+        </p:txBody>
+      </p:sp>
+      <p:pic>
+        <p:nvPicPr>
+          <p:cNvPr id="6146" name="Picture 2"/>
+          <p:cNvPicPr>
+            <a:picLocks noGrp="1" noChangeAspect="1" noChangeArrowheads="1"/>
+          </p:cNvPicPr>
+          <p:nvPr>
+            <p:ph sz="half" idx="2"/>
+          </p:nvPr>
+        </p:nvPicPr>
+        <p:blipFill>
+          <a:blip r:embed="rId2">
+            <a:extLst>
+              <a:ext uri="{28A0092B-C50C-407E-A947-70E740481C1C}">
+                <a14:useLocalDpi xmlns:a14="http://schemas.microsoft.com/office/drawing/2010/main" val="0"/>
+              </a:ext>
+            </a:extLst>
+          </a:blip>
+          <a:srcRect/>
+          <a:stretch>
+            <a:fillRect/>
+          </a:stretch>
+        </p:blipFill>
+        <p:spPr bwMode="auto">
+          <a:xfrm>
+            <a:off x="4572000" y="1524000"/>
+            <a:ext cx="3733800" cy="4267200"/>
+          </a:xfrm>
+          <a:prstGeom prst="rect">
+            <a:avLst/>
+          </a:prstGeom>
+          <a:noFill/>
+          <a:ln>
+            <a:noFill/>
+          </a:ln>
+          <a:effectLst/>
+          <a:extLst>
+            <a:ext uri="{909E8E84-426E-40DD-AFC4-6F175D3DCCD1}">
+              <a14:hiddenFill xmlns:a14="http://schemas.microsoft.com/office/drawing/2010/main">
+                <a:solidFill>
+                  <a:schemeClr val="accent1"/>
+                </a:solidFill>
+              </a14:hiddenFill>
+            </a:ext>
+            <a:ext uri="{91240B29-F687-4F45-9708-019B960494DF}">
+              <a14:hiddenLine xmlns:a14="http://schemas.microsoft.com/office/drawing/2010/main" w="9525">
+                <a:solidFill>
+                  <a:schemeClr val="tx1"/>
+                </a:solidFill>
+                <a:miter lim="800000"/>
+                <a:headEnd/>
+                <a:tailEnd/>
+              </a14:hiddenLine>
+            </a:ext>
+            <a:ext uri="{AF507438-7753-43E0-B8FC-AC1667EBCBE1}">
+              <a14:hiddenEffects xmlns:a14="http://schemas.microsoft.com/office/drawing/2010/main">
+                <a:effectLst>
+                  <a:outerShdw dist="35921" dir="2700000" algn="ctr" rotWithShape="0">
+                    <a:schemeClr val="bg2"/>
+                  </a:outerShdw>
+                </a:effectLst>
+              </a14:hiddenEffects>
+            </a:ext>
+          </a:extLst>
+        </p:spPr>
+      </p:pic>
+    </p:spTree>
+    <p:extLst>
+      <p:ext uri="{BB962C8B-B14F-4D97-AF65-F5344CB8AC3E}">
+        <p14:creationId xmlns:p14="http://schemas.microsoft.com/office/powerpoint/2010/main" val="3452414315"/>
+      </p:ext>
+    </p:extLst>
+  </p:cSld>
+  <p:clrMapOvr>
+    <a:masterClrMapping/>
+  </p:clrMapOvr>
+  <p:timing>
+    <p:tnLst>
+      <p:par>
+        <p:cTn id="1" dur="indefinite" restart="never" nodeType="tmRoot"/>
+      </p:par>
+    </p:tnLst>
+  </p:timing>
+</p:sld>
+</file>
+
+<file path=ppt/slides/slide12.xml><?xml version="1.0" encoding="utf-8"?>
+<p:sld xmlns:a="http://schemas.openxmlformats.org/drawingml/2006/main" xmlns:r="http://schemas.openxmlformats.org/officeDocument/2006/relationships" xmlns:p="http://schemas.openxmlformats.org/presentationml/2006/main">
+  <p:cSld>
+    <p:spTree>
+      <p:nvGrpSpPr>
+        <p:cNvPr id="1" name=""/>
+        <p:cNvGrpSpPr/>
+        <p:nvPr/>
+      </p:nvGrpSpPr>
+      <p:grpSpPr>
+        <a:xfrm>
+          <a:off x="0" y="0"/>
+          <a:ext cx="0" cy="0"/>
+          <a:chOff x="0" y="0"/>
+          <a:chExt cx="0" cy="0"/>
+        </a:xfrm>
+      </p:grpSpPr>
+      <p:sp>
+        <p:nvSpPr>
+          <p:cNvPr id="2" name="Title 1"/>
+          <p:cNvSpPr>
+            <a:spLocks noGrp="1"/>
+          </p:cNvSpPr>
+          <p:nvPr>
+            <p:ph type="title"/>
+          </p:nvPr>
+        </p:nvSpPr>
+        <p:spPr>
+          <a:xfrm>
+            <a:off x="838200" y="457200"/>
+            <a:ext cx="7467600" cy="533400"/>
+          </a:xfrm>
+        </p:spPr>
+        <p:style>
+          <a:lnRef idx="2">
+            <a:schemeClr val="accent2"/>
+          </a:lnRef>
+          <a:fillRef idx="1">
+            <a:schemeClr val="lt1"/>
+          </a:fillRef>
+          <a:effectRef idx="0">
+            <a:schemeClr val="accent2"/>
+          </a:effectRef>
+          <a:fontRef idx="minor">
+            <a:schemeClr val="dk1"/>
+          </a:fontRef>
+        </p:style>
+        <p:txBody>
+          <a:bodyPr>
+            <a:normAutofit fontScale="90000"/>
+          </a:bodyPr>
+          <a:lstStyle/>
+          <a:p>
+            <a:pPr algn="ctr"/>
+            <a:r>
+              <a:rPr lang="ro-RO" sz="3600" b="1" dirty="0" smtClean="0"/>
+              <a:t/>
+            </a:r>
+            <a:br>
+              <a:rPr lang="ro-RO" sz="3600" b="1" dirty="0" smtClean="0"/>
+            </a:br>
+            <a:r>
+              <a:rPr lang="ro-RO" sz="3600" b="1" dirty="0" smtClean="0"/>
+              <a:t/>
+            </a:r>
+            <a:br>
+              <a:rPr lang="ro-RO" sz="3600" b="1" dirty="0" smtClean="0"/>
+            </a:br>
+            <a:r>
+              <a:rPr lang="ro-RO" sz="3600" b="1" dirty="0"/>
+              <a:t/>
+            </a:r>
+            <a:br>
+              <a:rPr lang="ro-RO" sz="3600" b="1" dirty="0"/>
+            </a:br>
+            <a:r>
+              <a:rPr lang="ro-RO" sz="3600" b="1" dirty="0" smtClean="0"/>
+              <a:t/>
+            </a:r>
+            <a:br>
+              <a:rPr lang="ro-RO" sz="3600" b="1" dirty="0" smtClean="0"/>
+            </a:br>
+            <a:r>
+              <a:rPr lang="en-US" b="1" dirty="0"/>
+              <a:t/>
+            </a:r>
+            <a:br>
+              <a:rPr lang="en-US" b="1" dirty="0"/>
+            </a:br>
+            <a:r>
+              <a:rPr lang="ro-RO" sz="3100" b="1" dirty="0"/>
+              <a:t>Functionalitatea de oprire a jocului</a:t>
+            </a:r>
+            <a:endParaRPr lang="en-US" sz="3600" dirty="0"/>
+          </a:p>
+        </p:txBody>
+      </p:sp>
+      <p:pic>
+        <p:nvPicPr>
+          <p:cNvPr id="7170" name="Picture 2"/>
+          <p:cNvPicPr>
+            <a:picLocks noGrp="1" noChangeAspect="1" noChangeArrowheads="1"/>
+          </p:cNvPicPr>
+          <p:nvPr>
+            <p:ph sz="half" idx="2"/>
+          </p:nvPr>
+        </p:nvPicPr>
+        <p:blipFill rotWithShape="1">
+          <a:blip r:embed="rId2">
+            <a:extLst>
+              <a:ext uri="{28A0092B-C50C-407E-A947-70E740481C1C}">
+                <a14:useLocalDpi xmlns:a14="http://schemas.microsoft.com/office/drawing/2010/main" val="0"/>
+              </a:ext>
+            </a:extLst>
+          </a:blip>
+          <a:srcRect l="1042" t="1615" r="981"/>
+          <a:stretch/>
+        </p:blipFill>
+        <p:spPr bwMode="auto">
+          <a:xfrm>
+            <a:off x="4724400" y="1219200"/>
+            <a:ext cx="3583641" cy="3429000"/>
+          </a:xfrm>
+          <a:prstGeom prst="rect">
+            <a:avLst/>
+          </a:prstGeom>
+          <a:noFill/>
+          <a:ln>
+            <a:noFill/>
+          </a:ln>
+          <a:effectLst/>
+          <a:extLst>
+            <a:ext uri="{909E8E84-426E-40DD-AFC4-6F175D3DCCD1}">
+              <a14:hiddenFill xmlns:a14="http://schemas.microsoft.com/office/drawing/2010/main">
+                <a:solidFill>
+                  <a:schemeClr val="accent1"/>
+                </a:solidFill>
+              </a14:hiddenFill>
+            </a:ext>
+            <a:ext uri="{91240B29-F687-4F45-9708-019B960494DF}">
+              <a14:hiddenLine xmlns:a14="http://schemas.microsoft.com/office/drawing/2010/main" w="9525">
+                <a:solidFill>
+                  <a:schemeClr val="tx1"/>
+                </a:solidFill>
+                <a:miter lim="800000"/>
+                <a:headEnd/>
+                <a:tailEnd/>
+              </a14:hiddenLine>
+            </a:ext>
+            <a:ext uri="{AF507438-7753-43E0-B8FC-AC1667EBCBE1}">
+              <a14:hiddenEffects xmlns:a14="http://schemas.microsoft.com/office/drawing/2010/main">
+                <a:effectLst>
+                  <a:outerShdw dist="35921" dir="2700000" algn="ctr" rotWithShape="0">
+                    <a:schemeClr val="bg2"/>
+                  </a:outerShdw>
+                </a:effectLst>
+              </a14:hiddenEffects>
+            </a:ext>
+          </a:extLst>
+        </p:spPr>
+      </p:pic>
+      <p:sp>
+        <p:nvSpPr>
+          <p:cNvPr id="8" name="TextBox 7"/>
+          <p:cNvSpPr txBox="1"/>
+          <p:nvPr/>
+        </p:nvSpPr>
+        <p:spPr>
+          <a:xfrm>
+            <a:off x="838200" y="1371600"/>
+            <a:ext cx="3733800" cy="923330"/>
+          </a:xfrm>
+          <a:prstGeom prst="rect">
+            <a:avLst/>
+          </a:prstGeom>
+        </p:spPr>
+        <p:style>
+          <a:lnRef idx="1">
+            <a:schemeClr val="accent2"/>
+          </a:lnRef>
+          <a:fillRef idx="2">
+            <a:schemeClr val="accent2"/>
+          </a:fillRef>
+          <a:effectRef idx="1">
+            <a:schemeClr val="accent2"/>
+          </a:effectRef>
+          <a:fontRef idx="minor">
+            <a:schemeClr val="dk1"/>
+          </a:fontRef>
+        </p:style>
+        <p:txBody>
+          <a:bodyPr wrap="square" rtlCol="0">
+            <a:spAutoFit/>
+          </a:bodyPr>
+          <a:lstStyle/>
+          <a:p>
+            <a:r>
+              <a:rPr lang="ro-RO" b="1" dirty="0"/>
+              <a:t>Pentru a opri fortat un joc utilizatorul va apasa pe butonul Stop </a:t>
+            </a:r>
+            <a:r>
+              <a:rPr lang="ro-RO" b="1" dirty="0" smtClean="0"/>
+              <a:t>Game din imaginea alaturata.</a:t>
+            </a:r>
+            <a:endParaRPr lang="en-US" b="1" dirty="0"/>
+          </a:p>
+        </p:txBody>
+      </p:sp>
+      <p:pic>
+        <p:nvPicPr>
+          <p:cNvPr id="7171" name="Picture 3"/>
+          <p:cNvPicPr>
+            <a:picLocks noChangeAspect="1" noChangeArrowheads="1"/>
+          </p:cNvPicPr>
+          <p:nvPr/>
+        </p:nvPicPr>
+        <p:blipFill>
+          <a:blip r:embed="rId3">
+            <a:extLst>
+              <a:ext uri="{28A0092B-C50C-407E-A947-70E740481C1C}">
+                <a14:useLocalDpi xmlns:a14="http://schemas.microsoft.com/office/drawing/2010/main" val="0"/>
+              </a:ext>
+            </a:extLst>
+          </a:blip>
+          <a:srcRect/>
+          <a:stretch>
+            <a:fillRect/>
+          </a:stretch>
+        </p:blipFill>
+        <p:spPr bwMode="auto">
+          <a:xfrm>
+            <a:off x="990600" y="4572000"/>
+            <a:ext cx="3689056" cy="1120776"/>
+          </a:xfrm>
+          <a:prstGeom prst="rect">
+            <a:avLst/>
+          </a:prstGeom>
+          <a:noFill/>
+          <a:ln>
+            <a:noFill/>
+          </a:ln>
+          <a:effectLst/>
+          <a:extLst>
+            <a:ext uri="{909E8E84-426E-40DD-AFC4-6F175D3DCCD1}">
+              <a14:hiddenFill xmlns:a14="http://schemas.microsoft.com/office/drawing/2010/main">
+                <a:solidFill>
+                  <a:schemeClr val="accent1"/>
+                </a:solidFill>
+              </a14:hiddenFill>
+            </a:ext>
+            <a:ext uri="{91240B29-F687-4F45-9708-019B960494DF}">
+              <a14:hiddenLine xmlns:a14="http://schemas.microsoft.com/office/drawing/2010/main" w="9525">
+                <a:solidFill>
+                  <a:schemeClr val="tx1"/>
+                </a:solidFill>
+                <a:miter lim="800000"/>
+                <a:headEnd/>
+                <a:tailEnd/>
+              </a14:hiddenLine>
+            </a:ext>
+            <a:ext uri="{AF507438-7753-43E0-B8FC-AC1667EBCBE1}">
+              <a14:hiddenEffects xmlns:a14="http://schemas.microsoft.com/office/drawing/2010/main">
+                <a:effectLst>
+                  <a:outerShdw dist="35921" dir="2700000" algn="ctr" rotWithShape="0">
+                    <a:schemeClr val="bg2"/>
+                  </a:outerShdw>
+                </a:effectLst>
+              </a14:hiddenEffects>
+            </a:ext>
+          </a:extLst>
+        </p:spPr>
+      </p:pic>
+      <p:sp>
+        <p:nvSpPr>
+          <p:cNvPr id="10" name="Rectangle 9"/>
+          <p:cNvSpPr/>
+          <p:nvPr/>
+        </p:nvSpPr>
+        <p:spPr>
+          <a:xfrm>
+            <a:off x="956072" y="5715000"/>
+            <a:ext cx="3723584" cy="369332"/>
+          </a:xfrm>
+          <a:prstGeom prst="rect">
+            <a:avLst/>
+          </a:prstGeom>
+        </p:spPr>
+        <p:style>
+          <a:lnRef idx="1">
+            <a:schemeClr val="accent2"/>
+          </a:lnRef>
+          <a:fillRef idx="2">
+            <a:schemeClr val="accent2"/>
+          </a:fillRef>
+          <a:effectRef idx="1">
+            <a:schemeClr val="accent2"/>
+          </a:effectRef>
+          <a:fontRef idx="minor">
+            <a:schemeClr val="dk1"/>
+          </a:fontRef>
+        </p:style>
+        <p:txBody>
+          <a:bodyPr wrap="none">
+            <a:spAutoFit/>
+          </a:bodyPr>
+          <a:lstStyle/>
+          <a:p>
+            <a:pPr algn="ctr"/>
+            <a:r>
+              <a:rPr lang="ro-RO" b="1" dirty="0"/>
+              <a:t>Initializarea butonului de </a:t>
+            </a:r>
+            <a:r>
+              <a:rPr lang="ro-RO" b="1" dirty="0" smtClean="0"/>
+              <a:t>Stop Game</a:t>
+            </a:r>
+            <a:endParaRPr lang="en-US" b="1" dirty="0"/>
+          </a:p>
+        </p:txBody>
+      </p:sp>
+    </p:spTree>
+    <p:extLst>
+      <p:ext uri="{BB962C8B-B14F-4D97-AF65-F5344CB8AC3E}">
+        <p14:creationId xmlns:p14="http://schemas.microsoft.com/office/powerpoint/2010/main" val="1839665857"/>
+      </p:ext>
+    </p:extLst>
+  </p:cSld>
+  <p:clrMapOvr>
+    <a:masterClrMapping/>
+  </p:clrMapOvr>
+</p:sld>
+</file>
+
 <file path=ppt/slides/slide2.xml><?xml version="1.0" encoding="utf-8"?>
 <p:sld xmlns:a="http://schemas.openxmlformats.org/drawingml/2006/main" xmlns:r="http://schemas.openxmlformats.org/officeDocument/2006/relationships" xmlns:p="http://schemas.openxmlformats.org/presentationml/2006/main">
   <p:cSld>
@@ -3738,7 +4565,11 @@
             <a:pPr algn="ctr"/>
             <a:r>
               <a:rPr lang="en-US" sz="4400" b="1" dirty="0" smtClean="0"/>
-              <a:t>Tehnologii utilizate:</a:t>
+              <a:t>Tehnologii </a:t>
+            </a:r>
+            <a:r>
+              <a:rPr lang="en-US" sz="4400" b="1" dirty="0" smtClean="0"/>
+              <a:t>utilizate</a:t>
             </a:r>
             <a:endParaRPr lang="en-US" sz="4400" b="1" dirty="0"/>
           </a:p>
@@ -3795,7 +4626,7 @@
               <a:buChar char="§"/>
             </a:pPr>
             <a:r>
-              <a:rPr lang="en-US" dirty="0" smtClean="0">
+              <a:rPr lang="en-US" b="1" dirty="0" smtClean="0">
                 <a:latin typeface="Arial" pitchFamily="34" charset="0"/>
                 <a:cs typeface="Arial" pitchFamily="34" charset="0"/>
               </a:rPr>
@@ -3808,7 +4639,7 @@
               <a:buChar char="§"/>
             </a:pPr>
             <a:r>
-              <a:rPr lang="en-US" dirty="0" smtClean="0">
+              <a:rPr lang="en-US" b="1" dirty="0" smtClean="0">
                 <a:latin typeface="Arial" pitchFamily="34" charset="0"/>
                 <a:cs typeface="Arial" pitchFamily="34" charset="0"/>
               </a:rPr>
@@ -3838,8 +4669,8 @@
         </p:blipFill>
         <p:spPr>
           <a:xfrm>
-            <a:off x="1295400" y="1905000"/>
-            <a:ext cx="2396178" cy="1519518"/>
+            <a:off x="1295400" y="2119832"/>
+            <a:ext cx="2057400" cy="1304685"/>
           </a:xfrm>
           <a:prstGeom prst="rect">
             <a:avLst/>
@@ -3868,8 +4699,8 @@
         </p:blipFill>
         <p:spPr>
           <a:xfrm>
-            <a:off x="5605182" y="1905000"/>
-            <a:ext cx="1600200" cy="1600200"/>
+            <a:off x="5605182" y="2023782"/>
+            <a:ext cx="1481418" cy="1481418"/>
           </a:xfrm>
           <a:prstGeom prst="rect">
             <a:avLst/>
@@ -3997,7 +4828,7 @@
               <a:buChar char="§"/>
             </a:pPr>
             <a:r>
-              <a:rPr lang="en-US" dirty="0" smtClean="0"/>
+              <a:rPr lang="en-US" b="1" dirty="0" smtClean="0"/>
               <a:t>Bubble Shooter este o aplicatie desktop dezvoltata utilizand limbajul de programare Java si mediul de dezvoltare IntelliJ IDEA.</a:t>
             </a:r>
           </a:p>
@@ -4006,7 +4837,7 @@
               <a:buFont typeface="Wingdings" pitchFamily="2" charset="2"/>
               <a:buChar char="§"/>
             </a:pPr>
-            <a:endParaRPr lang="en-US" dirty="0" smtClean="0"/>
+            <a:endParaRPr lang="en-US" b="1" dirty="0" smtClean="0"/>
           </a:p>
           <a:p>
             <a:pPr>
@@ -4014,7 +4845,7 @@
               <a:buChar char="§"/>
             </a:pPr>
             <a:r>
-              <a:rPr lang="en-US" dirty="0" smtClean="0"/>
+              <a:rPr lang="en-US" b="1" dirty="0" smtClean="0"/>
               <a:t>Pentru functionalitatea interfetei grafice cu utilizatorul s-au reutilizat elemente si obiecte grafice din libraria Java Swing pentru a crea interfata grafica si a reda functionalitate acesteia.</a:t>
             </a:r>
           </a:p>
@@ -4148,7 +4979,7 @@
               <a:buNone/>
             </a:pPr>
             <a:r>
-              <a:rPr lang="ro-RO" dirty="0" smtClean="0"/>
+              <a:rPr lang="ro-RO" b="1" dirty="0" smtClean="0"/>
               <a:t>Aplicatia dezvoltata are la baza urmatoarele functionalitati:</a:t>
             </a:r>
           </a:p>
@@ -4156,7 +4987,7 @@
             <a:pPr marL="0" indent="0">
               <a:buNone/>
             </a:pPr>
-            <a:endParaRPr lang="ro-RO" dirty="0" smtClean="0"/>
+            <a:endParaRPr lang="ro-RO" b="1" dirty="0" smtClean="0"/>
           </a:p>
           <a:p>
             <a:pPr>
@@ -4164,7 +4995,7 @@
               <a:buChar char="§"/>
             </a:pPr>
             <a:r>
-              <a:rPr lang="ro-RO" dirty="0" smtClean="0"/>
+              <a:rPr lang="ro-RO" b="1" dirty="0" smtClean="0"/>
               <a:t>Inceputul jocului </a:t>
             </a:r>
           </a:p>
@@ -4174,7 +5005,7 @@
               <a:buChar char="§"/>
             </a:pPr>
             <a:r>
-              <a:rPr lang="ro-RO" dirty="0" smtClean="0"/>
+              <a:rPr lang="ro-RO" b="1" dirty="0" smtClean="0"/>
               <a:t>Setarile de configurare a culorilor pentru bile.</a:t>
             </a:r>
           </a:p>
@@ -4184,7 +5015,7 @@
               <a:buChar char="§"/>
             </a:pPr>
             <a:r>
-              <a:rPr lang="ro-RO" dirty="0" smtClean="0"/>
+              <a:rPr lang="ro-RO" b="1" dirty="0" smtClean="0"/>
               <a:t>Shooter-ul si incrementarea punctelor obtinute</a:t>
             </a:r>
           </a:p>
@@ -4194,8 +5025,12 @@
               <a:buChar char="§"/>
             </a:pPr>
             <a:r>
-              <a:rPr lang="ro-RO" dirty="0" smtClean="0"/>
-              <a:t>Salvarea jucatorilor castigatori</a:t>
+              <a:rPr lang="ro-RO" b="1" dirty="0" smtClean="0"/>
+              <a:t>Salvarea scorului si al </a:t>
+            </a:r>
+            <a:r>
+              <a:rPr lang="ro-RO" b="1" dirty="0" smtClean="0"/>
+              <a:t>jucatorilor castigatori</a:t>
             </a:r>
           </a:p>
           <a:p>
@@ -4204,10 +5039,10 @@
               <a:buChar char="§"/>
             </a:pPr>
             <a:r>
-              <a:rPr lang="ro-RO" dirty="0" smtClean="0"/>
+              <a:rPr lang="ro-RO" b="1" dirty="0" smtClean="0"/>
               <a:t>Oprirea jocului</a:t>
             </a:r>
-            <a:endParaRPr lang="en-US" dirty="0"/>
+            <a:endParaRPr lang="en-US" b="1" dirty="0"/>
           </a:p>
         </p:txBody>
       </p:sp>
@@ -4318,7 +5153,7 @@
         </p:blipFill>
         <p:spPr bwMode="auto">
           <a:xfrm>
-            <a:off x="4267200" y="1524000"/>
+            <a:off x="4343400" y="1524000"/>
             <a:ext cx="3996244" cy="3223533"/>
           </a:xfrm>
           <a:prstGeom prst="rect">
@@ -4367,7 +5202,7 @@
         </p:nvSpPr>
         <p:spPr>
           <a:xfrm>
-            <a:off x="925606" y="1905000"/>
+            <a:off x="925606" y="1524000"/>
             <a:ext cx="3200400" cy="2246769"/>
           </a:xfrm>
           <a:prstGeom prst="rect">
@@ -4395,19 +5230,19 @@
           <a:lstStyle/>
           <a:p>
             <a:r>
-              <a:rPr lang="ro-RO" sz="2000" dirty="0" smtClean="0"/>
+              <a:rPr lang="ro-RO" sz="2000" b="1" dirty="0" smtClean="0"/>
               <a:t>Pagina principala a aplicatiei este reprezentata in imaginea alaturata:</a:t>
             </a:r>
           </a:p>
           <a:p>
-            <a:endParaRPr lang="ro-RO" sz="2000" dirty="0"/>
-          </a:p>
-          <a:p>
-            <a:r>
-              <a:rPr lang="ro-RO" sz="2000" dirty="0" smtClean="0"/>
+            <a:endParaRPr lang="ro-RO" sz="2000" b="1" dirty="0"/>
+          </a:p>
+          <a:p>
+            <a:r>
+              <a:rPr lang="ro-RO" sz="2000" b="1" dirty="0" smtClean="0"/>
               <a:t>Pentru a incepe un joc nou utilizatorul va apasa pe butonul New Game.</a:t>
             </a:r>
-            <a:endParaRPr lang="en-US" sz="2000" dirty="0"/>
+            <a:endParaRPr lang="en-US" sz="2000" b="1" dirty="0"/>
           </a:p>
         </p:txBody>
       </p:sp>
@@ -4434,8 +5269,8 @@
         </p:blipFill>
         <p:spPr bwMode="auto">
           <a:xfrm>
-            <a:off x="1082488" y="4738550"/>
-            <a:ext cx="3142223" cy="815975"/>
+            <a:off x="925606" y="4724400"/>
+            <a:ext cx="3364006" cy="815975"/>
           </a:xfrm>
           <a:prstGeom prst="rect">
             <a:avLst/>
@@ -4483,8 +5318,8 @@
         </p:nvSpPr>
         <p:spPr>
           <a:xfrm>
-            <a:off x="838200" y="5592625"/>
-            <a:ext cx="3810000" cy="369332"/>
+            <a:off x="925606" y="5638800"/>
+            <a:ext cx="3733800" cy="369332"/>
           </a:xfrm>
           <a:prstGeom prst="rect">
             <a:avLst/>
@@ -4592,38 +5427,239 @@
           </a:bodyPr>
           <a:lstStyle/>
           <a:p>
+            <a:pPr algn="ctr"/>
             <a:r>
               <a:rPr lang="ro-RO" sz="2800" b="1" dirty="0" smtClean="0"/>
-              <a:t>Functionalitatea de configurare a culorilor pentru bile</a:t>
+              <a:t>Functionalitatea de configurare a culorilor pentru </a:t>
+            </a:r>
+            <a:r>
+              <a:rPr lang="ro-RO" sz="2800" b="1" dirty="0" smtClean="0"/>
+              <a:t>bile – Partea 1</a:t>
             </a:r>
             <a:endParaRPr lang="en-US" sz="2800" b="1" dirty="0"/>
           </a:p>
         </p:txBody>
       </p:sp>
-      <p:sp>
-        <p:nvSpPr>
-          <p:cNvPr id="3" name="Content Placeholder 2"/>
-          <p:cNvSpPr>
-            <a:spLocks noGrp="1"/>
-          </p:cNvSpPr>
-          <p:nvPr>
-            <p:ph idx="1"/>
-          </p:nvPr>
+      <p:pic>
+        <p:nvPicPr>
+          <p:cNvPr id="1027" name="Picture 3"/>
+          <p:cNvPicPr>
+            <a:picLocks noGrp="1" noChangeAspect="1" noChangeArrowheads="1"/>
+          </p:cNvPicPr>
+          <p:nvPr>
+            <p:ph sz="half" idx="2"/>
+          </p:nvPr>
+        </p:nvPicPr>
+        <p:blipFill>
+          <a:blip r:embed="rId2">
+            <a:extLst>
+              <a:ext uri="{28A0092B-C50C-407E-A947-70E740481C1C}">
+                <a14:useLocalDpi xmlns:a14="http://schemas.microsoft.com/office/drawing/2010/main" val="0"/>
+              </a:ext>
+            </a:extLst>
+          </a:blip>
+          <a:srcRect/>
+          <a:stretch>
+            <a:fillRect/>
+          </a:stretch>
+        </p:blipFill>
+        <p:spPr bwMode="auto">
+          <a:xfrm>
+            <a:off x="4648200" y="1705451"/>
+            <a:ext cx="3657600" cy="2943225"/>
+          </a:xfrm>
+          <a:prstGeom prst="rect">
+            <a:avLst/>
+          </a:prstGeom>
+          <a:noFill/>
+          <a:ln>
+            <a:noFill/>
+          </a:ln>
+          <a:effectLst/>
+          <a:extLst>
+            <a:ext uri="{909E8E84-426E-40DD-AFC4-6F175D3DCCD1}">
+              <a14:hiddenFill xmlns:a14="http://schemas.microsoft.com/office/drawing/2010/main">
+                <a:solidFill>
+                  <a:schemeClr val="accent1"/>
+                </a:solidFill>
+              </a14:hiddenFill>
+            </a:ext>
+            <a:ext uri="{91240B29-F687-4F45-9708-019B960494DF}">
+              <a14:hiddenLine xmlns:a14="http://schemas.microsoft.com/office/drawing/2010/main" w="9525">
+                <a:solidFill>
+                  <a:schemeClr val="tx1"/>
+                </a:solidFill>
+                <a:miter lim="800000"/>
+                <a:headEnd/>
+                <a:tailEnd/>
+              </a14:hiddenLine>
+            </a:ext>
+            <a:ext uri="{AF507438-7753-43E0-B8FC-AC1667EBCBE1}">
+              <a14:hiddenEffects xmlns:a14="http://schemas.microsoft.com/office/drawing/2010/main">
+                <a:effectLst>
+                  <a:outerShdw dist="35921" dir="2700000" algn="ctr" rotWithShape="0">
+                    <a:schemeClr val="bg2"/>
+                  </a:outerShdw>
+                </a:effectLst>
+              </a14:hiddenEffects>
+            </a:ext>
+          </a:extLst>
+        </p:spPr>
+      </p:pic>
+      <p:sp>
+        <p:nvSpPr>
+          <p:cNvPr id="13" name="TextBox 12"/>
+          <p:cNvSpPr txBox="1"/>
+          <p:nvPr/>
         </p:nvSpPr>
         <p:spPr>
           <a:xfrm>
-            <a:off x="762000" y="1752600"/>
-            <a:ext cx="7543800" cy="4267200"/>
-          </a:xfrm>
-        </p:spPr>
-        <p:txBody>
-          <a:bodyPr/>
-          <a:lstStyle/>
-          <a:p>
-            <a:pPr marL="0" indent="0">
-              <a:buNone/>
-            </a:pPr>
+            <a:off x="759760" y="2438400"/>
+            <a:ext cx="3810000" cy="1477328"/>
+          </a:xfrm>
+          <a:prstGeom prst="rect">
+            <a:avLst/>
+          </a:prstGeom>
+        </p:spPr>
+        <p:style>
+          <a:lnRef idx="1">
+            <a:schemeClr val="accent2"/>
+          </a:lnRef>
+          <a:fillRef idx="2">
+            <a:schemeClr val="accent2"/>
+          </a:fillRef>
+          <a:effectRef idx="1">
+            <a:schemeClr val="accent2"/>
+          </a:effectRef>
+          <a:fontRef idx="minor">
+            <a:schemeClr val="dk1"/>
+          </a:fontRef>
+        </p:style>
+        <p:txBody>
+          <a:bodyPr wrap="square" rtlCol="0">
+            <a:spAutoFit/>
+          </a:bodyPr>
+          <a:lstStyle/>
+          <a:p>
+            <a:r>
+              <a:rPr lang="ro-RO" b="1" dirty="0"/>
+              <a:t>Inainte de a incepe un nou joc, utilizatorul poate selecta initial numarul maxim sau minim de culori </a:t>
+            </a:r>
+            <a:r>
+              <a:rPr lang="ro-RO" b="1" dirty="0" smtClean="0"/>
+              <a:t>dorit ca in imaginea alaturata.</a:t>
+            </a:r>
+            <a:endParaRPr lang="en-US" b="1" dirty="0"/>
+          </a:p>
+          <a:p>
             <a:endParaRPr lang="en-US" dirty="0"/>
+          </a:p>
+        </p:txBody>
+      </p:sp>
+      <p:pic>
+        <p:nvPicPr>
+          <p:cNvPr id="1028" name="Picture 4"/>
+          <p:cNvPicPr>
+            <a:picLocks noChangeAspect="1" noChangeArrowheads="1"/>
+          </p:cNvPicPr>
+          <p:nvPr/>
+        </p:nvPicPr>
+        <p:blipFill>
+          <a:blip r:embed="rId3">
+            <a:extLst>
+              <a:ext uri="{28A0092B-C50C-407E-A947-70E740481C1C}">
+                <a14:useLocalDpi xmlns:a14="http://schemas.microsoft.com/office/drawing/2010/main" val="0"/>
+              </a:ext>
+            </a:extLst>
+          </a:blip>
+          <a:srcRect/>
+          <a:stretch>
+            <a:fillRect/>
+          </a:stretch>
+        </p:blipFill>
+        <p:spPr bwMode="auto">
+          <a:xfrm>
+            <a:off x="784413" y="4800600"/>
+            <a:ext cx="5174876" cy="1264527"/>
+          </a:xfrm>
+          <a:prstGeom prst="rect">
+            <a:avLst/>
+          </a:prstGeom>
+          <a:noFill/>
+          <a:ln>
+            <a:noFill/>
+          </a:ln>
+          <a:effectLst/>
+          <a:extLst>
+            <a:ext uri="{909E8E84-426E-40DD-AFC4-6F175D3DCCD1}">
+              <a14:hiddenFill xmlns:a14="http://schemas.microsoft.com/office/drawing/2010/main">
+                <a:solidFill>
+                  <a:schemeClr val="accent1"/>
+                </a:solidFill>
+              </a14:hiddenFill>
+            </a:ext>
+            <a:ext uri="{91240B29-F687-4F45-9708-019B960494DF}">
+              <a14:hiddenLine xmlns:a14="http://schemas.microsoft.com/office/drawing/2010/main" w="9525">
+                <a:solidFill>
+                  <a:schemeClr val="tx1"/>
+                </a:solidFill>
+                <a:miter lim="800000"/>
+                <a:headEnd/>
+                <a:tailEnd/>
+              </a14:hiddenLine>
+            </a:ext>
+            <a:ext uri="{AF507438-7753-43E0-B8FC-AC1667EBCBE1}">
+              <a14:hiddenEffects xmlns:a14="http://schemas.microsoft.com/office/drawing/2010/main">
+                <a:effectLst>
+                  <a:outerShdw dist="35921" dir="2700000" algn="ctr" rotWithShape="0">
+                    <a:schemeClr val="bg2"/>
+                  </a:outerShdw>
+                </a:effectLst>
+              </a14:hiddenEffects>
+            </a:ext>
+          </a:extLst>
+        </p:spPr>
+      </p:pic>
+      <p:sp>
+        <p:nvSpPr>
+          <p:cNvPr id="17" name="TextBox 16"/>
+          <p:cNvSpPr txBox="1"/>
+          <p:nvPr/>
+        </p:nvSpPr>
+        <p:spPr>
+          <a:xfrm>
+            <a:off x="6096000" y="5140475"/>
+            <a:ext cx="1981199" cy="584775"/>
+          </a:xfrm>
+          <a:prstGeom prst="rect">
+            <a:avLst/>
+          </a:prstGeom>
+        </p:spPr>
+        <p:style>
+          <a:lnRef idx="1">
+            <a:schemeClr val="accent2"/>
+          </a:lnRef>
+          <a:fillRef idx="2">
+            <a:schemeClr val="accent2"/>
+          </a:fillRef>
+          <a:effectRef idx="1">
+            <a:schemeClr val="accent2"/>
+          </a:effectRef>
+          <a:fontRef idx="minor">
+            <a:schemeClr val="dk1"/>
+          </a:fontRef>
+        </p:style>
+        <p:txBody>
+          <a:bodyPr wrap="square" rtlCol="0">
+            <a:spAutoFit/>
+          </a:bodyPr>
+          <a:lstStyle/>
+          <a:p>
+            <a:r>
+              <a:rPr lang="ro-RO" sz="1600" b="1" dirty="0" smtClean="0"/>
+              <a:t>Initalizarea culorilor pentru bile</a:t>
+            </a:r>
+            <a:endParaRPr lang="en-US" sz="1600" b="1" dirty="0"/>
           </a:p>
         </p:txBody>
       </p:sp>
@@ -4631,6 +5667,749 @@
     <p:extLst>
       <p:ext uri="{BB962C8B-B14F-4D97-AF65-F5344CB8AC3E}">
         <p14:creationId xmlns:p14="http://schemas.microsoft.com/office/powerpoint/2010/main" val="3673873426"/>
+      </p:ext>
+    </p:extLst>
+  </p:cSld>
+  <p:clrMapOvr>
+    <a:masterClrMapping/>
+  </p:clrMapOvr>
+  <p:timing>
+    <p:tnLst>
+      <p:par>
+        <p:cTn id="1" dur="indefinite" restart="never" nodeType="tmRoot"/>
+      </p:par>
+    </p:tnLst>
+  </p:timing>
+</p:sld>
+</file>
+
+<file path=ppt/slides/slide7.xml><?xml version="1.0" encoding="utf-8"?>
+<p:sld xmlns:a="http://schemas.openxmlformats.org/drawingml/2006/main" xmlns:r="http://schemas.openxmlformats.org/officeDocument/2006/relationships" xmlns:p="http://schemas.openxmlformats.org/presentationml/2006/main">
+  <p:cSld>
+    <p:spTree>
+      <p:nvGrpSpPr>
+        <p:cNvPr id="1" name=""/>
+        <p:cNvGrpSpPr/>
+        <p:nvPr/>
+      </p:nvGrpSpPr>
+      <p:grpSpPr>
+        <a:xfrm>
+          <a:off x="0" y="0"/>
+          <a:ext cx="0" cy="0"/>
+          <a:chOff x="0" y="0"/>
+          <a:chExt cx="0" cy="0"/>
+        </a:xfrm>
+      </p:grpSpPr>
+      <p:sp>
+        <p:nvSpPr>
+          <p:cNvPr id="2" name="Title 1"/>
+          <p:cNvSpPr>
+            <a:spLocks noGrp="1"/>
+          </p:cNvSpPr>
+          <p:nvPr>
+            <p:ph type="title"/>
+          </p:nvPr>
+        </p:nvSpPr>
+        <p:spPr>
+          <a:xfrm>
+            <a:off x="762000" y="457200"/>
+            <a:ext cx="7543800" cy="1066800"/>
+          </a:xfrm>
+        </p:spPr>
+        <p:style>
+          <a:lnRef idx="2">
+            <a:schemeClr val="accent2"/>
+          </a:lnRef>
+          <a:fillRef idx="1">
+            <a:schemeClr val="lt1"/>
+          </a:fillRef>
+          <a:effectRef idx="0">
+            <a:schemeClr val="accent2"/>
+          </a:effectRef>
+          <a:fontRef idx="minor">
+            <a:schemeClr val="dk1"/>
+          </a:fontRef>
+        </p:style>
+        <p:txBody>
+          <a:bodyPr>
+            <a:noAutofit/>
+          </a:bodyPr>
+          <a:lstStyle/>
+          <a:p>
+            <a:pPr algn="ctr"/>
+            <a:r>
+              <a:rPr lang="ro-RO" sz="2800" b="1" dirty="0"/>
+              <a:t>Functionalitatea de configurare a culorilor pentru bile – Partea </a:t>
+            </a:r>
+            <a:r>
+              <a:rPr lang="ro-RO" sz="2800" b="1" dirty="0" smtClean="0"/>
+              <a:t>2</a:t>
+            </a:r>
+            <a:endParaRPr lang="en-US" sz="2800" dirty="0"/>
+          </a:p>
+        </p:txBody>
+      </p:sp>
+      <p:pic>
+        <p:nvPicPr>
+          <p:cNvPr id="2050" name="Picture 2"/>
+          <p:cNvPicPr>
+            <a:picLocks noGrp="1" noChangeAspect="1" noChangeArrowheads="1"/>
+          </p:cNvPicPr>
+          <p:nvPr>
+            <p:ph sz="half" idx="2"/>
+          </p:nvPr>
+        </p:nvPicPr>
+        <p:blipFill>
+          <a:blip r:embed="rId2">
+            <a:extLst>
+              <a:ext uri="{28A0092B-C50C-407E-A947-70E740481C1C}">
+                <a14:useLocalDpi xmlns:a14="http://schemas.microsoft.com/office/drawing/2010/main" val="0"/>
+              </a:ext>
+            </a:extLst>
+          </a:blip>
+          <a:srcRect/>
+          <a:stretch>
+            <a:fillRect/>
+          </a:stretch>
+        </p:blipFill>
+        <p:spPr bwMode="auto">
+          <a:xfrm>
+            <a:off x="4684840" y="1676400"/>
+            <a:ext cx="3620960" cy="4267200"/>
+          </a:xfrm>
+          <a:prstGeom prst="rect">
+            <a:avLst/>
+          </a:prstGeom>
+          <a:noFill/>
+          <a:ln>
+            <a:noFill/>
+          </a:ln>
+          <a:effectLst/>
+          <a:extLst>
+            <a:ext uri="{909E8E84-426E-40DD-AFC4-6F175D3DCCD1}">
+              <a14:hiddenFill xmlns:a14="http://schemas.microsoft.com/office/drawing/2010/main">
+                <a:solidFill>
+                  <a:schemeClr val="accent1"/>
+                </a:solidFill>
+              </a14:hiddenFill>
+            </a:ext>
+            <a:ext uri="{91240B29-F687-4F45-9708-019B960494DF}">
+              <a14:hiddenLine xmlns:a14="http://schemas.microsoft.com/office/drawing/2010/main" w="9525">
+                <a:solidFill>
+                  <a:schemeClr val="tx1"/>
+                </a:solidFill>
+                <a:miter lim="800000"/>
+                <a:headEnd/>
+                <a:tailEnd/>
+              </a14:hiddenLine>
+            </a:ext>
+            <a:ext uri="{AF507438-7753-43E0-B8FC-AC1667EBCBE1}">
+              <a14:hiddenEffects xmlns:a14="http://schemas.microsoft.com/office/drawing/2010/main">
+                <a:effectLst>
+                  <a:outerShdw dist="35921" dir="2700000" algn="ctr" rotWithShape="0">
+                    <a:schemeClr val="bg2"/>
+                  </a:outerShdw>
+                </a:effectLst>
+              </a14:hiddenEffects>
+            </a:ext>
+          </a:extLst>
+        </p:spPr>
+      </p:pic>
+      <p:sp>
+        <p:nvSpPr>
+          <p:cNvPr id="5" name="TextBox 4"/>
+          <p:cNvSpPr txBox="1"/>
+          <p:nvPr/>
+        </p:nvSpPr>
+        <p:spPr>
+          <a:xfrm>
+            <a:off x="768724" y="2057400"/>
+            <a:ext cx="3733800" cy="3416320"/>
+          </a:xfrm>
+          <a:prstGeom prst="rect">
+            <a:avLst/>
+          </a:prstGeom>
+        </p:spPr>
+        <p:style>
+          <a:lnRef idx="1">
+            <a:schemeClr val="accent2"/>
+          </a:lnRef>
+          <a:fillRef idx="2">
+            <a:schemeClr val="accent2"/>
+          </a:fillRef>
+          <a:effectRef idx="1">
+            <a:schemeClr val="accent2"/>
+          </a:effectRef>
+          <a:fontRef idx="minor">
+            <a:schemeClr val="dk1"/>
+          </a:fontRef>
+        </p:style>
+        <p:txBody>
+          <a:bodyPr wrap="square" rtlCol="0">
+            <a:spAutoFit/>
+          </a:bodyPr>
+          <a:lstStyle/>
+          <a:p>
+            <a:r>
+              <a:rPr lang="ro-RO" b="1" dirty="0" smtClean="0"/>
+              <a:t>Culorile pentru bile sunt generate aleatoru de algoritmul din imaginea atasata.</a:t>
+            </a:r>
+          </a:p>
+          <a:p>
+            <a:endParaRPr lang="ro-RO" b="1" dirty="0"/>
+          </a:p>
+          <a:p>
+            <a:r>
+              <a:rPr lang="ro-RO" b="1" dirty="0" smtClean="0"/>
+              <a:t>Numarul maxim de posibilitati pentru culori este 8, iar numarul minim este 2. </a:t>
+            </a:r>
+          </a:p>
+          <a:p>
+            <a:endParaRPr lang="ro-RO" b="1" dirty="0"/>
+          </a:p>
+          <a:p>
+            <a:r>
+              <a:rPr lang="ro-RO" b="1" dirty="0" smtClean="0"/>
+              <a:t>Astfel in functie de dorinta utilizatorului, se vor genera culorile in functie de cate isi doreste acesta in intervalul (2,8).</a:t>
+            </a:r>
+            <a:endParaRPr lang="en-US" b="1" dirty="0"/>
+          </a:p>
+        </p:txBody>
+      </p:sp>
+    </p:spTree>
+    <p:extLst>
+      <p:ext uri="{BB962C8B-B14F-4D97-AF65-F5344CB8AC3E}">
+        <p14:creationId xmlns:p14="http://schemas.microsoft.com/office/powerpoint/2010/main" val="493938646"/>
+      </p:ext>
+    </p:extLst>
+  </p:cSld>
+  <p:clrMapOvr>
+    <a:masterClrMapping/>
+  </p:clrMapOvr>
+  <p:timing>
+    <p:tnLst>
+      <p:par>
+        <p:cTn id="1" dur="indefinite" restart="never" nodeType="tmRoot"/>
+      </p:par>
+    </p:tnLst>
+  </p:timing>
+</p:sld>
+</file>
+
+<file path=ppt/slides/slide8.xml><?xml version="1.0" encoding="utf-8"?>
+<p:sld xmlns:a="http://schemas.openxmlformats.org/drawingml/2006/main" xmlns:r="http://schemas.openxmlformats.org/officeDocument/2006/relationships" xmlns:p="http://schemas.openxmlformats.org/presentationml/2006/main">
+  <p:cSld>
+    <p:spTree>
+      <p:nvGrpSpPr>
+        <p:cNvPr id="1" name=""/>
+        <p:cNvGrpSpPr/>
+        <p:nvPr/>
+      </p:nvGrpSpPr>
+      <p:grpSpPr>
+        <a:xfrm>
+          <a:off x="0" y="0"/>
+          <a:ext cx="0" cy="0"/>
+          <a:chOff x="0" y="0"/>
+          <a:chExt cx="0" cy="0"/>
+        </a:xfrm>
+      </p:grpSpPr>
+      <p:sp>
+        <p:nvSpPr>
+          <p:cNvPr id="2" name="Title 1"/>
+          <p:cNvSpPr>
+            <a:spLocks noGrp="1"/>
+          </p:cNvSpPr>
+          <p:nvPr>
+            <p:ph type="title"/>
+          </p:nvPr>
+        </p:nvSpPr>
+        <p:spPr>
+          <a:xfrm>
+            <a:off x="762000" y="457200"/>
+            <a:ext cx="7620000" cy="914400"/>
+          </a:xfrm>
+        </p:spPr>
+        <p:style>
+          <a:lnRef idx="2">
+            <a:schemeClr val="accent2"/>
+          </a:lnRef>
+          <a:fillRef idx="1">
+            <a:schemeClr val="lt1"/>
+          </a:fillRef>
+          <a:effectRef idx="0">
+            <a:schemeClr val="accent2"/>
+          </a:effectRef>
+          <a:fontRef idx="minor">
+            <a:schemeClr val="dk1"/>
+          </a:fontRef>
+        </p:style>
+        <p:txBody>
+          <a:bodyPr>
+            <a:noAutofit/>
+          </a:bodyPr>
+          <a:lstStyle/>
+          <a:p>
+            <a:pPr algn="ctr"/>
+            <a:r>
+              <a:rPr lang="ro-RO" sz="2400" b="1" dirty="0" smtClean="0"/>
+              <a:t>Functionalitatea pentru shooter si incrementarea punctelor – Partea 1</a:t>
+            </a:r>
+            <a:endParaRPr lang="en-US" sz="2400" b="1" dirty="0"/>
+          </a:p>
+        </p:txBody>
+      </p:sp>
+      <p:pic>
+        <p:nvPicPr>
+          <p:cNvPr id="3074" name="Picture 2"/>
+          <p:cNvPicPr>
+            <a:picLocks noGrp="1" noChangeAspect="1" noChangeArrowheads="1"/>
+          </p:cNvPicPr>
+          <p:nvPr>
+            <p:ph sz="half" idx="2"/>
+          </p:nvPr>
+        </p:nvPicPr>
+        <p:blipFill>
+          <a:blip r:embed="rId2">
+            <a:extLst>
+              <a:ext uri="{28A0092B-C50C-407E-A947-70E740481C1C}">
+                <a14:useLocalDpi xmlns:a14="http://schemas.microsoft.com/office/drawing/2010/main" val="0"/>
+              </a:ext>
+            </a:extLst>
+          </a:blip>
+          <a:srcRect/>
+          <a:stretch>
+            <a:fillRect/>
+          </a:stretch>
+        </p:blipFill>
+        <p:spPr bwMode="auto">
+          <a:xfrm>
+            <a:off x="4800600" y="1524000"/>
+            <a:ext cx="3551200" cy="3124200"/>
+          </a:xfrm>
+          <a:prstGeom prst="rect">
+            <a:avLst/>
+          </a:prstGeom>
+          <a:noFill/>
+          <a:ln>
+            <a:noFill/>
+          </a:ln>
+          <a:effectLst/>
+          <a:extLst>
+            <a:ext uri="{909E8E84-426E-40DD-AFC4-6F175D3DCCD1}">
+              <a14:hiddenFill xmlns:a14="http://schemas.microsoft.com/office/drawing/2010/main">
+                <a:solidFill>
+                  <a:schemeClr val="accent1"/>
+                </a:solidFill>
+              </a14:hiddenFill>
+            </a:ext>
+            <a:ext uri="{91240B29-F687-4F45-9708-019B960494DF}">
+              <a14:hiddenLine xmlns:a14="http://schemas.microsoft.com/office/drawing/2010/main" w="9525">
+                <a:solidFill>
+                  <a:schemeClr val="tx1"/>
+                </a:solidFill>
+                <a:miter lim="800000"/>
+                <a:headEnd/>
+                <a:tailEnd/>
+              </a14:hiddenLine>
+            </a:ext>
+            <a:ext uri="{AF507438-7753-43E0-B8FC-AC1667EBCBE1}">
+              <a14:hiddenEffects xmlns:a14="http://schemas.microsoft.com/office/drawing/2010/main">
+                <a:effectLst>
+                  <a:outerShdw dist="35921" dir="2700000" algn="ctr" rotWithShape="0">
+                    <a:schemeClr val="bg2"/>
+                  </a:outerShdw>
+                </a:effectLst>
+              </a14:hiddenEffects>
+            </a:ext>
+          </a:extLst>
+        </p:spPr>
+      </p:pic>
+      <p:sp>
+        <p:nvSpPr>
+          <p:cNvPr id="5" name="TextBox 4"/>
+          <p:cNvSpPr txBox="1"/>
+          <p:nvPr/>
+        </p:nvSpPr>
+        <p:spPr>
+          <a:xfrm>
+            <a:off x="838200" y="1828800"/>
+            <a:ext cx="184731" cy="369332"/>
+          </a:xfrm>
+          <a:prstGeom prst="rect">
+            <a:avLst/>
+          </a:prstGeom>
+          <a:noFill/>
+        </p:spPr>
+        <p:txBody>
+          <a:bodyPr wrap="none" rtlCol="0">
+            <a:spAutoFit/>
+          </a:bodyPr>
+          <a:lstStyle/>
+          <a:p>
+            <a:endParaRPr lang="en-US" dirty="0"/>
+          </a:p>
+        </p:txBody>
+      </p:sp>
+      <p:sp>
+        <p:nvSpPr>
+          <p:cNvPr id="6" name="TextBox 5"/>
+          <p:cNvSpPr txBox="1"/>
+          <p:nvPr/>
+        </p:nvSpPr>
+        <p:spPr>
+          <a:xfrm>
+            <a:off x="685800" y="3135406"/>
+            <a:ext cx="4014538" cy="2862322"/>
+          </a:xfrm>
+          <a:prstGeom prst="rect">
+            <a:avLst/>
+          </a:prstGeom>
+        </p:spPr>
+        <p:style>
+          <a:lnRef idx="1">
+            <a:schemeClr val="accent2"/>
+          </a:lnRef>
+          <a:fillRef idx="2">
+            <a:schemeClr val="accent2"/>
+          </a:fillRef>
+          <a:effectRef idx="1">
+            <a:schemeClr val="accent2"/>
+          </a:effectRef>
+          <a:fontRef idx="minor">
+            <a:schemeClr val="dk1"/>
+          </a:fontRef>
+        </p:style>
+        <p:txBody>
+          <a:bodyPr wrap="square" rtlCol="0">
+            <a:spAutoFit/>
+          </a:bodyPr>
+          <a:lstStyle/>
+          <a:p>
+            <a:r>
+              <a:rPr lang="ro-RO" b="1" dirty="0" smtClean="0"/>
+              <a:t>Shooter-ul este redat de catre sageata din imaginea alaturata, utilizatorul poate trage catre o grupare de doua sau mai multe bile.</a:t>
+            </a:r>
+          </a:p>
+          <a:p>
+            <a:endParaRPr lang="ro-RO" b="1" dirty="0"/>
+          </a:p>
+          <a:p>
+            <a:r>
+              <a:rPr lang="ro-RO" b="1" dirty="0" smtClean="0"/>
+              <a:t>O data tintita grupa de bile de aceeasi culoare cu bila, aceasta dispare si punctele se incrementeaza si afisate in sectiunea de sus din stanga a imaginii alaturate.</a:t>
+            </a:r>
+            <a:endParaRPr lang="en-US" b="1" dirty="0"/>
+          </a:p>
+        </p:txBody>
+      </p:sp>
+    </p:spTree>
+    <p:extLst>
+      <p:ext uri="{BB962C8B-B14F-4D97-AF65-F5344CB8AC3E}">
+        <p14:creationId xmlns:p14="http://schemas.microsoft.com/office/powerpoint/2010/main" val="3745293928"/>
+      </p:ext>
+    </p:extLst>
+  </p:cSld>
+  <p:clrMapOvr>
+    <a:masterClrMapping/>
+  </p:clrMapOvr>
+  <p:timing>
+    <p:tnLst>
+      <p:par>
+        <p:cTn id="1" dur="indefinite" restart="never" nodeType="tmRoot"/>
+      </p:par>
+    </p:tnLst>
+  </p:timing>
+</p:sld>
+</file>
+
+<file path=ppt/slides/slide9.xml><?xml version="1.0" encoding="utf-8"?>
+<p:sld xmlns:a="http://schemas.openxmlformats.org/drawingml/2006/main" xmlns:r="http://schemas.openxmlformats.org/officeDocument/2006/relationships" xmlns:p="http://schemas.openxmlformats.org/presentationml/2006/main">
+  <p:cSld>
+    <p:spTree>
+      <p:nvGrpSpPr>
+        <p:cNvPr id="1" name=""/>
+        <p:cNvGrpSpPr/>
+        <p:nvPr/>
+      </p:nvGrpSpPr>
+      <p:grpSpPr>
+        <a:xfrm>
+          <a:off x="0" y="0"/>
+          <a:ext cx="0" cy="0"/>
+          <a:chOff x="0" y="0"/>
+          <a:chExt cx="0" cy="0"/>
+        </a:xfrm>
+      </p:grpSpPr>
+      <p:sp>
+        <p:nvSpPr>
+          <p:cNvPr id="2" name="Title 1"/>
+          <p:cNvSpPr>
+            <a:spLocks noGrp="1"/>
+          </p:cNvSpPr>
+          <p:nvPr>
+            <p:ph type="title"/>
+          </p:nvPr>
+        </p:nvSpPr>
+        <p:spPr>
+          <a:xfrm>
+            <a:off x="800100" y="457200"/>
+            <a:ext cx="7543800" cy="838200"/>
+          </a:xfrm>
+        </p:spPr>
+        <p:style>
+          <a:lnRef idx="2">
+            <a:schemeClr val="accent2"/>
+          </a:lnRef>
+          <a:fillRef idx="1">
+            <a:schemeClr val="lt1"/>
+          </a:fillRef>
+          <a:effectRef idx="0">
+            <a:schemeClr val="accent2"/>
+          </a:effectRef>
+          <a:fontRef idx="minor">
+            <a:schemeClr val="dk1"/>
+          </a:fontRef>
+        </p:style>
+        <p:txBody>
+          <a:bodyPr>
+            <a:noAutofit/>
+          </a:bodyPr>
+          <a:lstStyle/>
+          <a:p>
+            <a:pPr algn="ctr"/>
+            <a:r>
+              <a:rPr lang="ro-RO" sz="2400" b="1" dirty="0"/>
+              <a:t>Functionalitatea pentru shooter si incrementarea punctelor – Partea </a:t>
+            </a:r>
+            <a:r>
+              <a:rPr lang="ro-RO" sz="2400" b="1" dirty="0" smtClean="0"/>
+              <a:t>2</a:t>
+            </a:r>
+            <a:endParaRPr lang="en-US" sz="2400" dirty="0"/>
+          </a:p>
+        </p:txBody>
+      </p:sp>
+      <p:pic>
+        <p:nvPicPr>
+          <p:cNvPr id="4098" name="Picture 2"/>
+          <p:cNvPicPr>
+            <a:picLocks noGrp="1" noChangeAspect="1" noChangeArrowheads="1"/>
+          </p:cNvPicPr>
+          <p:nvPr>
+            <p:ph sz="half" idx="2"/>
+          </p:nvPr>
+        </p:nvPicPr>
+        <p:blipFill>
+          <a:blip r:embed="rId2">
+            <a:extLst>
+              <a:ext uri="{28A0092B-C50C-407E-A947-70E740481C1C}">
+                <a14:useLocalDpi xmlns:a14="http://schemas.microsoft.com/office/drawing/2010/main" val="0"/>
+              </a:ext>
+            </a:extLst>
+          </a:blip>
+          <a:srcRect/>
+          <a:stretch>
+            <a:fillRect/>
+          </a:stretch>
+        </p:blipFill>
+        <p:spPr bwMode="auto">
+          <a:xfrm>
+            <a:off x="4670684" y="2286000"/>
+            <a:ext cx="3647148" cy="3048000"/>
+          </a:xfrm>
+          <a:prstGeom prst="rect">
+            <a:avLst/>
+          </a:prstGeom>
+          <a:noFill/>
+          <a:ln>
+            <a:noFill/>
+          </a:ln>
+          <a:effectLst/>
+          <a:extLst>
+            <a:ext uri="{909E8E84-426E-40DD-AFC4-6F175D3DCCD1}">
+              <a14:hiddenFill xmlns:a14="http://schemas.microsoft.com/office/drawing/2010/main">
+                <a:solidFill>
+                  <a:schemeClr val="accent1"/>
+                </a:solidFill>
+              </a14:hiddenFill>
+            </a:ext>
+            <a:ext uri="{91240B29-F687-4F45-9708-019B960494DF}">
+              <a14:hiddenLine xmlns:a14="http://schemas.microsoft.com/office/drawing/2010/main" w="9525">
+                <a:solidFill>
+                  <a:schemeClr val="tx1"/>
+                </a:solidFill>
+                <a:miter lim="800000"/>
+                <a:headEnd/>
+                <a:tailEnd/>
+              </a14:hiddenLine>
+            </a:ext>
+            <a:ext uri="{AF507438-7753-43E0-B8FC-AC1667EBCBE1}">
+              <a14:hiddenEffects xmlns:a14="http://schemas.microsoft.com/office/drawing/2010/main">
+                <a:effectLst>
+                  <a:outerShdw dist="35921" dir="2700000" algn="ctr" rotWithShape="0">
+                    <a:schemeClr val="bg2"/>
+                  </a:outerShdw>
+                </a:effectLst>
+              </a14:hiddenEffects>
+            </a:ext>
+          </a:extLst>
+        </p:spPr>
+      </p:pic>
+      <p:sp>
+        <p:nvSpPr>
+          <p:cNvPr id="5" name="TextBox 4"/>
+          <p:cNvSpPr txBox="1"/>
+          <p:nvPr/>
+        </p:nvSpPr>
+        <p:spPr>
+          <a:xfrm>
+            <a:off x="4657165" y="1524000"/>
+            <a:ext cx="3669632" cy="646331"/>
+          </a:xfrm>
+          <a:prstGeom prst="rect">
+            <a:avLst/>
+          </a:prstGeom>
+        </p:spPr>
+        <p:style>
+          <a:lnRef idx="1">
+            <a:schemeClr val="accent2"/>
+          </a:lnRef>
+          <a:fillRef idx="2">
+            <a:schemeClr val="accent2"/>
+          </a:fillRef>
+          <a:effectRef idx="1">
+            <a:schemeClr val="accent2"/>
+          </a:effectRef>
+          <a:fontRef idx="minor">
+            <a:schemeClr val="dk1"/>
+          </a:fontRef>
+        </p:style>
+        <p:txBody>
+          <a:bodyPr wrap="square" rtlCol="0">
+            <a:spAutoFit/>
+          </a:bodyPr>
+          <a:lstStyle/>
+          <a:p>
+            <a:r>
+              <a:rPr lang="ro-RO" b="1" dirty="0" smtClean="0"/>
+              <a:t>Contorizarea bilelor marcate de aceeasi culoare </a:t>
+            </a:r>
+            <a:endParaRPr lang="en-US" b="1" dirty="0"/>
+          </a:p>
+        </p:txBody>
+      </p:sp>
+      <p:pic>
+        <p:nvPicPr>
+          <p:cNvPr id="4099" name="Picture 3"/>
+          <p:cNvPicPr>
+            <a:picLocks noGrp="1" noChangeAspect="1" noChangeArrowheads="1"/>
+          </p:cNvPicPr>
+          <p:nvPr>
+            <p:ph sz="half" idx="1"/>
+          </p:nvPr>
+        </p:nvPicPr>
+        <p:blipFill>
+          <a:blip r:embed="rId3">
+            <a:extLst>
+              <a:ext uri="{28A0092B-C50C-407E-A947-70E740481C1C}">
+                <a14:useLocalDpi xmlns:a14="http://schemas.microsoft.com/office/drawing/2010/main" val="0"/>
+              </a:ext>
+            </a:extLst>
+          </a:blip>
+          <a:srcRect/>
+          <a:stretch>
+            <a:fillRect/>
+          </a:stretch>
+        </p:blipFill>
+        <p:spPr bwMode="auto">
+          <a:xfrm>
+            <a:off x="838200" y="1676400"/>
+            <a:ext cx="3733800" cy="3276600"/>
+          </a:xfrm>
+          <a:prstGeom prst="rect">
+            <a:avLst/>
+          </a:prstGeom>
+          <a:noFill/>
+          <a:ln>
+            <a:noFill/>
+          </a:ln>
+          <a:effectLst/>
+          <a:extLst>
+            <a:ext uri="{909E8E84-426E-40DD-AFC4-6F175D3DCCD1}">
+              <a14:hiddenFill xmlns:a14="http://schemas.microsoft.com/office/drawing/2010/main">
+                <a:solidFill>
+                  <a:schemeClr val="accent1"/>
+                </a:solidFill>
+              </a14:hiddenFill>
+            </a:ext>
+            <a:ext uri="{91240B29-F687-4F45-9708-019B960494DF}">
+              <a14:hiddenLine xmlns:a14="http://schemas.microsoft.com/office/drawing/2010/main" w="9525">
+                <a:solidFill>
+                  <a:schemeClr val="tx1"/>
+                </a:solidFill>
+                <a:miter lim="800000"/>
+                <a:headEnd/>
+                <a:tailEnd/>
+              </a14:hiddenLine>
+            </a:ext>
+            <a:ext uri="{AF507438-7753-43E0-B8FC-AC1667EBCBE1}">
+              <a14:hiddenEffects xmlns:a14="http://schemas.microsoft.com/office/drawing/2010/main">
+                <a:effectLst>
+                  <a:outerShdw dist="35921" dir="2700000" algn="ctr" rotWithShape="0">
+                    <a:schemeClr val="bg2"/>
+                  </a:outerShdw>
+                </a:effectLst>
+              </a14:hiddenEffects>
+            </a:ext>
+          </a:extLst>
+        </p:spPr>
+      </p:pic>
+      <p:sp>
+        <p:nvSpPr>
+          <p:cNvPr id="6" name="TextBox 5"/>
+          <p:cNvSpPr txBox="1"/>
+          <p:nvPr/>
+        </p:nvSpPr>
+        <p:spPr>
+          <a:xfrm>
+            <a:off x="856129" y="5105400"/>
+            <a:ext cx="3733800" cy="646331"/>
+          </a:xfrm>
+          <a:prstGeom prst="rect">
+            <a:avLst/>
+          </a:prstGeom>
+        </p:spPr>
+        <p:style>
+          <a:lnRef idx="1">
+            <a:schemeClr val="accent2"/>
+          </a:lnRef>
+          <a:fillRef idx="2">
+            <a:schemeClr val="accent2"/>
+          </a:fillRef>
+          <a:effectRef idx="1">
+            <a:schemeClr val="accent2"/>
+          </a:effectRef>
+          <a:fontRef idx="minor">
+            <a:schemeClr val="dk1"/>
+          </a:fontRef>
+        </p:style>
+        <p:txBody>
+          <a:bodyPr wrap="square" rtlCol="0">
+            <a:spAutoFit/>
+          </a:bodyPr>
+          <a:lstStyle/>
+          <a:p>
+            <a:r>
+              <a:rPr lang="ro-RO" b="1" dirty="0" smtClean="0"/>
+              <a:t>Marcarea bilelor care au aceeasi culoare cu cea data de shooter</a:t>
+            </a:r>
+            <a:endParaRPr lang="en-US" b="1" dirty="0"/>
+          </a:p>
+        </p:txBody>
+      </p:sp>
+    </p:spTree>
+    <p:extLst>
+      <p:ext uri="{BB962C8B-B14F-4D97-AF65-F5344CB8AC3E}">
+        <p14:creationId xmlns:p14="http://schemas.microsoft.com/office/powerpoint/2010/main" val="2796172894"/>
       </p:ext>
     </p:extLst>
   </p:cSld>

</xml_diff>

<commit_message>
chore: updated ppt doc for delivery 2
</commit_message>
<xml_diff>
--- a/docs/IOC_PrezentareBubbleShooter_DraghiciCiontu_CR4S1A.pptx
+++ b/docs/IOC_PrezentareBubbleShooter_DraghiciCiontu_CR4S1A.pptx
@@ -17,6 +17,7 @@
     <p:sldId id="265" r:id="rId11"/>
     <p:sldId id="266" r:id="rId12"/>
     <p:sldId id="267" r:id="rId13"/>
+    <p:sldId id="268" r:id="rId14"/>
   </p:sldIdLst>
   <p:sldSz cx="9144000" cy="6858000" type="screen4x3"/>
   <p:notesSz cx="6858000" cy="9144000"/>
@@ -349,7 +350,7 @@
             <a:fld id="{1D8BD707-D9CF-40AE-B4C6-C98DA3205C09}" type="datetimeFigureOut">
               <a:rPr lang="en-US" smtClean="0"/>
               <a:pPr/>
-              <a:t>3/12/2023</a:t>
+              <a:t>3/24/2023</a:t>
             </a:fld>
             <a:endParaRPr lang="en-US"/>
           </a:p>
@@ -564,7 +565,7 @@
             <a:fld id="{1D8BD707-D9CF-40AE-B4C6-C98DA3205C09}" type="datetimeFigureOut">
               <a:rPr lang="en-US" smtClean="0"/>
               <a:pPr/>
-              <a:t>3/12/2023</a:t>
+              <a:t>3/24/2023</a:t>
             </a:fld>
             <a:endParaRPr lang="en-US"/>
           </a:p>
@@ -741,7 +742,7 @@
             <a:fld id="{1D8BD707-D9CF-40AE-B4C6-C98DA3205C09}" type="datetimeFigureOut">
               <a:rPr lang="en-US" smtClean="0"/>
               <a:pPr/>
-              <a:t>3/12/2023</a:t>
+              <a:t>3/24/2023</a:t>
             </a:fld>
             <a:endParaRPr lang="en-US"/>
           </a:p>
@@ -908,7 +909,7 @@
             <a:fld id="{1D8BD707-D9CF-40AE-B4C6-C98DA3205C09}" type="datetimeFigureOut">
               <a:rPr lang="en-US" smtClean="0"/>
               <a:pPr/>
-              <a:t>3/12/2023</a:t>
+              <a:t>3/24/2023</a:t>
             </a:fld>
             <a:endParaRPr lang="en-US"/>
           </a:p>
@@ -1194,7 +1195,7 @@
             <a:fld id="{1D8BD707-D9CF-40AE-B4C6-C98DA3205C09}" type="datetimeFigureOut">
               <a:rPr lang="en-US" smtClean="0"/>
               <a:pPr/>
-              <a:t>3/12/2023</a:t>
+              <a:t>3/24/2023</a:t>
             </a:fld>
             <a:endParaRPr lang="en-US"/>
           </a:p>
@@ -1522,7 +1523,7 @@
             <a:fld id="{1D8BD707-D9CF-40AE-B4C6-C98DA3205C09}" type="datetimeFigureOut">
               <a:rPr lang="en-US" smtClean="0"/>
               <a:pPr/>
-              <a:t>3/12/2023</a:t>
+              <a:t>3/24/2023</a:t>
             </a:fld>
             <a:endParaRPr lang="en-US"/>
           </a:p>
@@ -1949,7 +1950,7 @@
             <a:fld id="{1D8BD707-D9CF-40AE-B4C6-C98DA3205C09}" type="datetimeFigureOut">
               <a:rPr lang="en-US" smtClean="0"/>
               <a:pPr/>
-              <a:t>3/12/2023</a:t>
+              <a:t>3/24/2023</a:t>
             </a:fld>
             <a:endParaRPr lang="en-US"/>
           </a:p>
@@ -2124,7 +2125,7 @@
             <a:fld id="{1D8BD707-D9CF-40AE-B4C6-C98DA3205C09}" type="datetimeFigureOut">
               <a:rPr lang="en-US" smtClean="0"/>
               <a:pPr/>
-              <a:t>3/12/2023</a:t>
+              <a:t>3/24/2023</a:t>
             </a:fld>
             <a:endParaRPr lang="en-US"/>
           </a:p>
@@ -2216,7 +2217,7 @@
             <a:fld id="{1D8BD707-D9CF-40AE-B4C6-C98DA3205C09}" type="datetimeFigureOut">
               <a:rPr lang="en-US" smtClean="0"/>
               <a:pPr/>
-              <a:t>3/12/2023</a:t>
+              <a:t>3/24/2023</a:t>
             </a:fld>
             <a:endParaRPr lang="en-US"/>
           </a:p>
@@ -2498,7 +2499,7 @@
             <a:fld id="{1D8BD707-D9CF-40AE-B4C6-C98DA3205C09}" type="datetimeFigureOut">
               <a:rPr lang="en-US" smtClean="0"/>
               <a:pPr/>
-              <a:t>3/12/2023</a:t>
+              <a:t>3/24/2023</a:t>
             </a:fld>
             <a:endParaRPr lang="en-US"/>
           </a:p>
@@ -2799,7 +2800,7 @@
             <a:fld id="{1D8BD707-D9CF-40AE-B4C6-C98DA3205C09}" type="datetimeFigureOut">
               <a:rPr lang="en-US" smtClean="0"/>
               <a:pPr/>
-              <a:t>3/12/2023</a:t>
+              <a:t>3/24/2023</a:t>
             </a:fld>
             <a:endParaRPr lang="en-US"/>
           </a:p>
@@ -3011,7 +3012,7 @@
             <a:fld id="{1D8BD707-D9CF-40AE-B4C6-C98DA3205C09}" type="datetimeFigureOut">
               <a:rPr lang="en-US" smtClean="0"/>
               <a:pPr/>
-              <a:t>3/12/2023</a:t>
+              <a:t>3/24/2023</a:t>
             </a:fld>
             <a:endParaRPr lang="en-US"/>
           </a:p>
@@ -4509,6 +4510,346 @@
 </p:sld>
 </file>
 
+<file path=ppt/slides/slide13.xml><?xml version="1.0" encoding="utf-8"?>
+<p:sld xmlns:a="http://schemas.openxmlformats.org/drawingml/2006/main" xmlns:r="http://schemas.openxmlformats.org/officeDocument/2006/relationships" xmlns:p="http://schemas.openxmlformats.org/presentationml/2006/main">
+  <p:cSld>
+    <p:spTree>
+      <p:nvGrpSpPr>
+        <p:cNvPr id="1" name=""/>
+        <p:cNvGrpSpPr/>
+        <p:nvPr/>
+      </p:nvGrpSpPr>
+      <p:grpSpPr>
+        <a:xfrm>
+          <a:off x="0" y="0"/>
+          <a:ext cx="0" cy="0"/>
+          <a:chOff x="0" y="0"/>
+          <a:chExt cx="0" cy="0"/>
+        </a:xfrm>
+      </p:grpSpPr>
+      <p:sp>
+        <p:nvSpPr>
+          <p:cNvPr id="2" name="Title 1"/>
+          <p:cNvSpPr>
+            <a:spLocks noGrp="1"/>
+          </p:cNvSpPr>
+          <p:nvPr>
+            <p:ph type="title"/>
+          </p:nvPr>
+        </p:nvSpPr>
+        <p:spPr>
+          <a:xfrm>
+            <a:off x="762000" y="457200"/>
+            <a:ext cx="7543800" cy="533400"/>
+          </a:xfrm>
+        </p:spPr>
+        <p:style>
+          <a:lnRef idx="2">
+            <a:schemeClr val="accent1"/>
+          </a:lnRef>
+          <a:fillRef idx="1">
+            <a:schemeClr val="lt1"/>
+          </a:fillRef>
+          <a:effectRef idx="0">
+            <a:schemeClr val="accent1"/>
+          </a:effectRef>
+          <a:fontRef idx="minor">
+            <a:schemeClr val="dk1"/>
+          </a:fontRef>
+        </p:style>
+        <p:txBody>
+          <a:bodyPr>
+            <a:noAutofit/>
+          </a:bodyPr>
+          <a:lstStyle/>
+          <a:p>
+            <a:pPr algn="ctr"/>
+            <a:r>
+              <a:rPr lang="en-US" sz="2800" b="1" dirty="0">
+                <a:latin typeface="+mn-lt"/>
+              </a:rPr>
+              <a:t>Legatura </a:t>
+            </a:r>
+            <a:r>
+              <a:rPr lang="ro-RO" sz="2800" b="1" dirty="0" smtClean="0">
+                <a:latin typeface="+mn-lt"/>
+              </a:rPr>
+              <a:t>dintre PC </a:t>
+            </a:r>
+            <a:r>
+              <a:rPr lang="en-US" sz="2800" b="1" dirty="0" smtClean="0">
+                <a:latin typeface="+mn-lt"/>
+              </a:rPr>
+              <a:t>cu </a:t>
+            </a:r>
+            <a:r>
+              <a:rPr lang="en-US" sz="2800" b="1" dirty="0">
+                <a:latin typeface="+mn-lt"/>
+              </a:rPr>
+              <a:t>un controller </a:t>
+            </a:r>
+            <a:r>
+              <a:rPr lang="en-US" sz="2800" b="1" dirty="0" smtClean="0">
+                <a:latin typeface="+mn-lt"/>
+              </a:rPr>
+              <a:t>extern</a:t>
+            </a:r>
+            <a:endParaRPr lang="en-US" sz="2800" b="1" dirty="0">
+              <a:latin typeface="+mn-lt"/>
+            </a:endParaRPr>
+          </a:p>
+        </p:txBody>
+      </p:sp>
+      <p:pic>
+        <p:nvPicPr>
+          <p:cNvPr id="6" name="Content Placeholder 5"/>
+          <p:cNvPicPr>
+            <a:picLocks noGrp="1" noChangeAspect="1"/>
+          </p:cNvPicPr>
+          <p:nvPr>
+            <p:ph sz="half" idx="2"/>
+          </p:nvPr>
+        </p:nvPicPr>
+        <p:blipFill>
+          <a:blip r:embed="rId2" cstate="print">
+            <a:extLst>
+              <a:ext uri="{28A0092B-C50C-407E-A947-70E740481C1C}">
+                <a14:useLocalDpi xmlns:a14="http://schemas.microsoft.com/office/drawing/2010/main" val="0"/>
+              </a:ext>
+            </a:extLst>
+          </a:blip>
+          <a:stretch>
+            <a:fillRect/>
+          </a:stretch>
+        </p:blipFill>
+        <p:spPr>
+          <a:xfrm>
+            <a:off x="6172200" y="1371600"/>
+            <a:ext cx="2119015" cy="3767138"/>
+          </a:xfrm>
+        </p:spPr>
+      </p:pic>
+      <p:sp>
+        <p:nvSpPr>
+          <p:cNvPr id="11" name="TextBox 10"/>
+          <p:cNvSpPr txBox="1"/>
+          <p:nvPr/>
+        </p:nvSpPr>
+        <p:spPr>
+          <a:xfrm>
+            <a:off x="762000" y="1371600"/>
+            <a:ext cx="5257800" cy="1200329"/>
+          </a:xfrm>
+          <a:prstGeom prst="rect">
+            <a:avLst/>
+          </a:prstGeom>
+        </p:spPr>
+        <p:style>
+          <a:lnRef idx="1">
+            <a:schemeClr val="accent2"/>
+          </a:lnRef>
+          <a:fillRef idx="2">
+            <a:schemeClr val="accent2"/>
+          </a:fillRef>
+          <a:effectRef idx="1">
+            <a:schemeClr val="accent2"/>
+          </a:effectRef>
+          <a:fontRef idx="minor">
+            <a:schemeClr val="dk1"/>
+          </a:fontRef>
+        </p:style>
+        <p:txBody>
+          <a:bodyPr wrap="square" rtlCol="0">
+            <a:spAutoFit/>
+          </a:bodyPr>
+          <a:lstStyle/>
+          <a:p>
+            <a:r>
+              <a:rPr lang="ro-RO" b="1" dirty="0"/>
+              <a:t>Legatura interfetei grafice cu controller-ul extern se face via </a:t>
+            </a:r>
+            <a:r>
+              <a:rPr lang="en-US" b="1" dirty="0">
+                <a:solidFill>
+                  <a:srgbClr val="FF0000"/>
+                </a:solidFill>
+              </a:rPr>
+              <a:t>U</a:t>
+            </a:r>
+            <a:r>
+              <a:rPr lang="en-US" b="1" dirty="0"/>
+              <a:t>niversal </a:t>
+            </a:r>
+            <a:r>
+              <a:rPr lang="en-US" b="1" dirty="0">
+                <a:solidFill>
+                  <a:srgbClr val="FF0000"/>
+                </a:solidFill>
+              </a:rPr>
+              <a:t>S</a:t>
+            </a:r>
+            <a:r>
+              <a:rPr lang="en-US" b="1" dirty="0"/>
+              <a:t>erial </a:t>
+            </a:r>
+            <a:r>
+              <a:rPr lang="en-US" b="1" dirty="0">
+                <a:solidFill>
+                  <a:srgbClr val="FF0000"/>
+                </a:solidFill>
+              </a:rPr>
+              <a:t>B</a:t>
+            </a:r>
+            <a:r>
+              <a:rPr lang="en-US" b="1" dirty="0"/>
+              <a:t>us 3.0</a:t>
+            </a:r>
+            <a:r>
+              <a:rPr lang="ro-RO" b="1" dirty="0" smtClean="0"/>
+              <a:t>, </a:t>
+            </a:r>
+            <a:r>
+              <a:rPr lang="ro-RO" b="1" dirty="0"/>
+              <a:t>acesta </a:t>
+            </a:r>
+            <a:r>
+              <a:rPr lang="ro-RO" b="1" dirty="0" smtClean="0"/>
+              <a:t>arata </a:t>
+            </a:r>
+            <a:r>
+              <a:rPr lang="ro-RO" b="1" dirty="0"/>
+              <a:t>ca in figura alaturata</a:t>
+            </a:r>
+            <a:r>
+              <a:rPr lang="ro-RO" b="1" dirty="0" smtClean="0"/>
+              <a:t>.</a:t>
+            </a:r>
+          </a:p>
+          <a:p>
+            <a:endParaRPr lang="en-US" b="1" dirty="0"/>
+          </a:p>
+        </p:txBody>
+      </p:sp>
+      <p:pic>
+        <p:nvPicPr>
+          <p:cNvPr id="1026" name="Picture 2"/>
+          <p:cNvPicPr>
+            <a:picLocks noChangeAspect="1" noChangeArrowheads="1"/>
+          </p:cNvPicPr>
+          <p:nvPr/>
+        </p:nvPicPr>
+        <p:blipFill>
+          <a:blip r:embed="rId3">
+            <a:extLst>
+              <a:ext uri="{28A0092B-C50C-407E-A947-70E740481C1C}">
+                <a14:useLocalDpi xmlns:a14="http://schemas.microsoft.com/office/drawing/2010/main" val="0"/>
+              </a:ext>
+            </a:extLst>
+          </a:blip>
+          <a:srcRect/>
+          <a:stretch>
+            <a:fillRect/>
+          </a:stretch>
+        </p:blipFill>
+        <p:spPr bwMode="auto">
+          <a:xfrm>
+            <a:off x="769272" y="2967317"/>
+            <a:ext cx="5252769" cy="3048000"/>
+          </a:xfrm>
+          <a:prstGeom prst="rect">
+            <a:avLst/>
+          </a:prstGeom>
+          <a:noFill/>
+          <a:ln>
+            <a:noFill/>
+          </a:ln>
+          <a:effectLst/>
+          <a:extLst>
+            <a:ext uri="{909E8E84-426E-40DD-AFC4-6F175D3DCCD1}">
+              <a14:hiddenFill xmlns:a14="http://schemas.microsoft.com/office/drawing/2010/main">
+                <a:solidFill>
+                  <a:schemeClr val="accent1"/>
+                </a:solidFill>
+              </a14:hiddenFill>
+            </a:ext>
+            <a:ext uri="{91240B29-F687-4F45-9708-019B960494DF}">
+              <a14:hiddenLine xmlns:a14="http://schemas.microsoft.com/office/drawing/2010/main" w="9525">
+                <a:solidFill>
+                  <a:schemeClr val="tx1"/>
+                </a:solidFill>
+                <a:miter lim="800000"/>
+                <a:headEnd/>
+                <a:tailEnd/>
+              </a14:hiddenLine>
+            </a:ext>
+            <a:ext uri="{AF507438-7753-43E0-B8FC-AC1667EBCBE1}">
+              <a14:hiddenEffects xmlns:a14="http://schemas.microsoft.com/office/drawing/2010/main">
+                <a:effectLst>
+                  <a:outerShdw dist="35921" dir="2700000" algn="ctr" rotWithShape="0">
+                    <a:schemeClr val="bg2"/>
+                  </a:outerShdw>
+                </a:effectLst>
+              </a14:hiddenEffects>
+            </a:ext>
+          </a:extLst>
+        </p:spPr>
+      </p:pic>
+      <p:sp>
+        <p:nvSpPr>
+          <p:cNvPr id="13" name="TextBox 12"/>
+          <p:cNvSpPr txBox="1"/>
+          <p:nvPr/>
+        </p:nvSpPr>
+        <p:spPr>
+          <a:xfrm>
+            <a:off x="6172200" y="5725777"/>
+            <a:ext cx="2133600" cy="276999"/>
+          </a:xfrm>
+          <a:prstGeom prst="rect">
+            <a:avLst/>
+          </a:prstGeom>
+        </p:spPr>
+        <p:style>
+          <a:lnRef idx="1">
+            <a:schemeClr val="accent2"/>
+          </a:lnRef>
+          <a:fillRef idx="2">
+            <a:schemeClr val="accent2"/>
+          </a:fillRef>
+          <a:effectRef idx="1">
+            <a:schemeClr val="accent2"/>
+          </a:effectRef>
+          <a:fontRef idx="minor">
+            <a:schemeClr val="dk1"/>
+          </a:fontRef>
+        </p:style>
+        <p:txBody>
+          <a:bodyPr wrap="square" rtlCol="0">
+            <a:spAutoFit/>
+          </a:bodyPr>
+          <a:lstStyle/>
+          <a:p>
+            <a:r>
+              <a:rPr lang="ro-RO" sz="1200" b="1" dirty="0" smtClean="0"/>
+              <a:t>Cod pentru reactiile de baza</a:t>
+            </a:r>
+            <a:endParaRPr lang="en-US" sz="1200" b="1" dirty="0"/>
+          </a:p>
+        </p:txBody>
+      </p:sp>
+    </p:spTree>
+    <p:extLst>
+      <p:ext uri="{BB962C8B-B14F-4D97-AF65-F5344CB8AC3E}">
+        <p14:creationId xmlns:p14="http://schemas.microsoft.com/office/powerpoint/2010/main" val="3827987516"/>
+      </p:ext>
+    </p:extLst>
+  </p:cSld>
+  <p:clrMapOvr>
+    <a:masterClrMapping/>
+  </p:clrMapOvr>
+</p:sld>
+</file>
+
 <file path=ppt/slides/slide2.xml><?xml version="1.0" encoding="utf-8"?>
 <p:sld xmlns:a="http://schemas.openxmlformats.org/drawingml/2006/main" xmlns:r="http://schemas.openxmlformats.org/officeDocument/2006/relationships" xmlns:p="http://schemas.openxmlformats.org/presentationml/2006/main">
   <p:cSld>
@@ -4565,11 +4906,7 @@
             <a:pPr algn="ctr"/>
             <a:r>
               <a:rPr lang="en-US" sz="4400" b="1" dirty="0" smtClean="0"/>
-              <a:t>Tehnologii </a:t>
-            </a:r>
-            <a:r>
-              <a:rPr lang="en-US" sz="4400" b="1" dirty="0" smtClean="0"/>
-              <a:t>utilizate</a:t>
+              <a:t>Tehnologii utilizate</a:t>
             </a:r>
             <a:endParaRPr lang="en-US" sz="4400" b="1" dirty="0"/>
           </a:p>
@@ -5026,11 +5363,7 @@
             </a:pPr>
             <a:r>
               <a:rPr lang="ro-RO" b="1" dirty="0" smtClean="0"/>
-              <a:t>Salvarea scorului si al </a:t>
-            </a:r>
-            <a:r>
-              <a:rPr lang="ro-RO" b="1" dirty="0" smtClean="0"/>
-              <a:t>jucatorilor castigatori</a:t>
+              <a:t>Salvarea scorului si al jucatorilor castigatori</a:t>
             </a:r>
           </a:p>
           <a:p>
@@ -5430,11 +5763,7 @@
             <a:pPr algn="ctr"/>
             <a:r>
               <a:rPr lang="ro-RO" sz="2800" b="1" dirty="0" smtClean="0"/>
-              <a:t>Functionalitatea de configurare a culorilor pentru </a:t>
-            </a:r>
-            <a:r>
-              <a:rPr lang="ro-RO" sz="2800" b="1" dirty="0" smtClean="0"/>
-              <a:t>bile – Partea 1</a:t>
+              <a:t>Functionalitatea de configurare a culorilor pentru bile – Partea 1</a:t>
             </a:r>
             <a:endParaRPr lang="en-US" sz="2800" b="1" dirty="0"/>
           </a:p>

</xml_diff>

<commit_message>
feat: integrate jinput lib to detect and connect to joystick and prepare the final doc delivery
</commit_message>
<xml_diff>
--- a/docs/IOC_PrezentareBubbleShooter_DraghiciCiontu_CR4S1A.pptx
+++ b/docs/IOC_PrezentareBubbleShooter_DraghiciCiontu_CR4S1A.pptx
@@ -6,18 +6,24 @@
   </p:sldMasterIdLst>
   <p:sldIdLst>
     <p:sldId id="256" r:id="rId2"/>
-    <p:sldId id="257" r:id="rId3"/>
-    <p:sldId id="258" r:id="rId4"/>
-    <p:sldId id="259" r:id="rId5"/>
-    <p:sldId id="260" r:id="rId6"/>
-    <p:sldId id="261" r:id="rId7"/>
-    <p:sldId id="262" r:id="rId8"/>
-    <p:sldId id="263" r:id="rId9"/>
-    <p:sldId id="264" r:id="rId10"/>
-    <p:sldId id="265" r:id="rId11"/>
-    <p:sldId id="266" r:id="rId12"/>
-    <p:sldId id="267" r:id="rId13"/>
-    <p:sldId id="268" r:id="rId14"/>
+    <p:sldId id="274" r:id="rId3"/>
+    <p:sldId id="257" r:id="rId4"/>
+    <p:sldId id="258" r:id="rId5"/>
+    <p:sldId id="259" r:id="rId6"/>
+    <p:sldId id="260" r:id="rId7"/>
+    <p:sldId id="261" r:id="rId8"/>
+    <p:sldId id="262" r:id="rId9"/>
+    <p:sldId id="263" r:id="rId10"/>
+    <p:sldId id="264" r:id="rId11"/>
+    <p:sldId id="265" r:id="rId12"/>
+    <p:sldId id="266" r:id="rId13"/>
+    <p:sldId id="267" r:id="rId14"/>
+    <p:sldId id="272" r:id="rId15"/>
+    <p:sldId id="268" r:id="rId16"/>
+    <p:sldId id="273" r:id="rId17"/>
+    <p:sldId id="269" r:id="rId18"/>
+    <p:sldId id="270" r:id="rId19"/>
+    <p:sldId id="271" r:id="rId20"/>
   </p:sldIdLst>
   <p:sldSz cx="9144000" cy="6858000" type="screen4x3"/>
   <p:notesSz cx="6858000" cy="9144000"/>
@@ -350,7 +356,7 @@
             <a:fld id="{1D8BD707-D9CF-40AE-B4C6-C98DA3205C09}" type="datetimeFigureOut">
               <a:rPr lang="en-US" smtClean="0"/>
               <a:pPr/>
-              <a:t>3/24/2023</a:t>
+              <a:t>4/5/2023</a:t>
             </a:fld>
             <a:endParaRPr lang="en-US"/>
           </a:p>
@@ -565,7 +571,7 @@
             <a:fld id="{1D8BD707-D9CF-40AE-B4C6-C98DA3205C09}" type="datetimeFigureOut">
               <a:rPr lang="en-US" smtClean="0"/>
               <a:pPr/>
-              <a:t>3/24/2023</a:t>
+              <a:t>4/5/2023</a:t>
             </a:fld>
             <a:endParaRPr lang="en-US"/>
           </a:p>
@@ -742,7 +748,7 @@
             <a:fld id="{1D8BD707-D9CF-40AE-B4C6-C98DA3205C09}" type="datetimeFigureOut">
               <a:rPr lang="en-US" smtClean="0"/>
               <a:pPr/>
-              <a:t>3/24/2023</a:t>
+              <a:t>4/5/2023</a:t>
             </a:fld>
             <a:endParaRPr lang="en-US"/>
           </a:p>
@@ -909,7 +915,7 @@
             <a:fld id="{1D8BD707-D9CF-40AE-B4C6-C98DA3205C09}" type="datetimeFigureOut">
               <a:rPr lang="en-US" smtClean="0"/>
               <a:pPr/>
-              <a:t>3/24/2023</a:t>
+              <a:t>4/5/2023</a:t>
             </a:fld>
             <a:endParaRPr lang="en-US"/>
           </a:p>
@@ -1195,7 +1201,7 @@
             <a:fld id="{1D8BD707-D9CF-40AE-B4C6-C98DA3205C09}" type="datetimeFigureOut">
               <a:rPr lang="en-US" smtClean="0"/>
               <a:pPr/>
-              <a:t>3/24/2023</a:t>
+              <a:t>4/5/2023</a:t>
             </a:fld>
             <a:endParaRPr lang="en-US"/>
           </a:p>
@@ -1523,7 +1529,7 @@
             <a:fld id="{1D8BD707-D9CF-40AE-B4C6-C98DA3205C09}" type="datetimeFigureOut">
               <a:rPr lang="en-US" smtClean="0"/>
               <a:pPr/>
-              <a:t>3/24/2023</a:t>
+              <a:t>4/5/2023</a:t>
             </a:fld>
             <a:endParaRPr lang="en-US"/>
           </a:p>
@@ -1950,7 +1956,7 @@
             <a:fld id="{1D8BD707-D9CF-40AE-B4C6-C98DA3205C09}" type="datetimeFigureOut">
               <a:rPr lang="en-US" smtClean="0"/>
               <a:pPr/>
-              <a:t>3/24/2023</a:t>
+              <a:t>4/5/2023</a:t>
             </a:fld>
             <a:endParaRPr lang="en-US"/>
           </a:p>
@@ -2125,7 +2131,7 @@
             <a:fld id="{1D8BD707-D9CF-40AE-B4C6-C98DA3205C09}" type="datetimeFigureOut">
               <a:rPr lang="en-US" smtClean="0"/>
               <a:pPr/>
-              <a:t>3/24/2023</a:t>
+              <a:t>4/5/2023</a:t>
             </a:fld>
             <a:endParaRPr lang="en-US"/>
           </a:p>
@@ -2217,7 +2223,7 @@
             <a:fld id="{1D8BD707-D9CF-40AE-B4C6-C98DA3205C09}" type="datetimeFigureOut">
               <a:rPr lang="en-US" smtClean="0"/>
               <a:pPr/>
-              <a:t>3/24/2023</a:t>
+              <a:t>4/5/2023</a:t>
             </a:fld>
             <a:endParaRPr lang="en-US"/>
           </a:p>
@@ -2499,7 +2505,7 @@
             <a:fld id="{1D8BD707-D9CF-40AE-B4C6-C98DA3205C09}" type="datetimeFigureOut">
               <a:rPr lang="en-US" smtClean="0"/>
               <a:pPr/>
-              <a:t>3/24/2023</a:t>
+              <a:t>4/5/2023</a:t>
             </a:fld>
             <a:endParaRPr lang="en-US"/>
           </a:p>
@@ -2800,7 +2806,7 @@
             <a:fld id="{1D8BD707-D9CF-40AE-B4C6-C98DA3205C09}" type="datetimeFigureOut">
               <a:rPr lang="en-US" smtClean="0"/>
               <a:pPr/>
-              <a:t>3/24/2023</a:t>
+              <a:t>4/5/2023</a:t>
             </a:fld>
             <a:endParaRPr lang="en-US"/>
           </a:p>
@@ -3012,7 +3018,7 @@
             <a:fld id="{1D8BD707-D9CF-40AE-B4C6-C98DA3205C09}" type="datetimeFigureOut">
               <a:rPr lang="en-US" smtClean="0"/>
               <a:pPr/>
-              <a:t>3/24/2023</a:t>
+              <a:t>4/5/2023</a:t>
             </a:fld>
             <a:endParaRPr lang="en-US"/>
           </a:p>
@@ -3730,8 +3736,8 @@
         </p:nvSpPr>
         <p:spPr>
           <a:xfrm>
-            <a:off x="766483" y="457200"/>
-            <a:ext cx="7559488" cy="762000"/>
+            <a:off x="800100" y="457200"/>
+            <a:ext cx="7543800" cy="838200"/>
           </a:xfrm>
         </p:spPr>
         <p:style>
@@ -3756,31 +3762,20 @@
           <a:p>
             <a:pPr algn="ctr"/>
             <a:r>
-              <a:rPr lang="ro-RO" sz="3600" dirty="0"/>
-              <a:t/>
-            </a:r>
-            <a:br>
-              <a:rPr lang="ro-RO" sz="3600" dirty="0"/>
-            </a:br>
+              <a:rPr lang="ro-RO" sz="2400" b="1" dirty="0"/>
+              <a:t>Functionalitatea pentru shooter si incrementarea punctelor – Partea </a:t>
+            </a:r>
             <a:r>
               <a:rPr lang="ro-RO" sz="2400" b="1" dirty="0" smtClean="0"/>
-              <a:t>Functionalitatea de salvare a </a:t>
-            </a:r>
-            <a:r>
-              <a:rPr lang="ro-RO" sz="2400" b="1" dirty="0"/>
-              <a:t>scorului si al jucatorilor </a:t>
-            </a:r>
-            <a:r>
-              <a:rPr lang="ro-RO" sz="2400" b="1" dirty="0" smtClean="0"/>
-              <a:t>castigatori –Partea 1</a:t>
-            </a:r>
-            <a:endParaRPr lang="en-US" sz="2400" b="1" dirty="0"/>
+              <a:t>2</a:t>
+            </a:r>
+            <a:endParaRPr lang="en-US" sz="2400" dirty="0"/>
           </a:p>
         </p:txBody>
       </p:sp>
       <p:pic>
         <p:nvPicPr>
-          <p:cNvPr id="5122" name="Picture 2"/>
+          <p:cNvPr id="4098" name="Picture 2"/>
           <p:cNvPicPr>
             <a:picLocks noGrp="1" noChangeAspect="1" noChangeArrowheads="1"/>
           </p:cNvPicPr>
@@ -3803,8 +3798,8 @@
         </p:blipFill>
         <p:spPr bwMode="auto">
           <a:xfrm>
-            <a:off x="4424722" y="1447800"/>
-            <a:ext cx="3918857" cy="3429000"/>
+            <a:off x="4670684" y="2286000"/>
+            <a:ext cx="3647148" cy="3048000"/>
           </a:xfrm>
           <a:prstGeom prst="rect">
             <a:avLst/>
@@ -3846,14 +3841,14 @@
       </p:pic>
       <p:sp>
         <p:nvSpPr>
-          <p:cNvPr id="6" name="TextBox 5"/>
+          <p:cNvPr id="5" name="TextBox 4"/>
           <p:cNvSpPr txBox="1"/>
           <p:nvPr/>
         </p:nvSpPr>
         <p:spPr>
           <a:xfrm>
-            <a:off x="746312" y="1676400"/>
-            <a:ext cx="3581400" cy="3970318"/>
+            <a:off x="4657165" y="1524000"/>
+            <a:ext cx="3669632" cy="646331"/>
           </a:xfrm>
           <a:prstGeom prst="rect">
             <a:avLst/>
@@ -3881,16 +3876,7 @@
           <a:p>
             <a:r>
               <a:rPr lang="ro-RO" b="1" dirty="0" smtClean="0"/>
-              <a:t>La finalizarea jocului, va aparea un modal cu mesajul You win!, unde utilizatorul va trebui sa isi introduca numele pentru a fi inregistrat in clasament. </a:t>
-            </a:r>
-          </a:p>
-          <a:p>
-            <a:endParaRPr lang="ro-RO" b="1" dirty="0"/>
-          </a:p>
-          <a:p>
-            <a:r>
-              <a:rPr lang="ro-RO" b="1" dirty="0" smtClean="0"/>
-              <a:t>De altfel, aceste informatii vor fi salvate si intr-un fisier extern .text, astfel incat pe viitor la o noua sesiune de joc noii utilizatori sa poata vedea direct in interfata scorurile salvate, cat si numele jucatorilor castigatori, ca in a doua imagine atasata de jos.</a:t>
+              <a:t>Contorizarea bilelor marcate de aceeasi culoare </a:t>
             </a:r>
             <a:endParaRPr lang="en-US" b="1" dirty="0"/>
           </a:p>
@@ -3898,13 +3884,15 @@
       </p:sp>
       <p:pic>
         <p:nvPicPr>
-          <p:cNvPr id="5123" name="Picture 3"/>
+          <p:cNvPr id="4099" name="Picture 3"/>
           <p:cNvPicPr>
-            <a:picLocks noChangeAspect="1" noChangeArrowheads="1"/>
+            <a:picLocks noGrp="1" noChangeAspect="1" noChangeArrowheads="1"/>
           </p:cNvPicPr>
-          <p:nvPr/>
+          <p:nvPr>
+            <p:ph sz="half" idx="1"/>
+          </p:nvPr>
         </p:nvPicPr>
-        <p:blipFill rotWithShape="1">
+        <p:blipFill>
           <a:blip r:embed="rId3">
             <a:extLst>
               <a:ext uri="{28A0092B-C50C-407E-A947-70E740481C1C}">
@@ -3912,13 +3900,15 @@
               </a:ext>
             </a:extLst>
           </a:blip>
-          <a:srcRect b="81149"/>
-          <a:stretch/>
+          <a:srcRect/>
+          <a:stretch>
+            <a:fillRect/>
+          </a:stretch>
         </p:blipFill>
         <p:spPr bwMode="auto">
           <a:xfrm>
-            <a:off x="4419600" y="5051601"/>
-            <a:ext cx="3939989" cy="750610"/>
+            <a:off x="838200" y="1676400"/>
+            <a:ext cx="3733800" cy="3276600"/>
           </a:xfrm>
           <a:prstGeom prst="rect">
             <a:avLst/>
@@ -3958,10 +3948,53 @@
           </a:extLst>
         </p:spPr>
       </p:pic>
+      <p:sp>
+        <p:nvSpPr>
+          <p:cNvPr id="6" name="TextBox 5"/>
+          <p:cNvSpPr txBox="1"/>
+          <p:nvPr/>
+        </p:nvSpPr>
+        <p:spPr>
+          <a:xfrm>
+            <a:off x="856129" y="5105400"/>
+            <a:ext cx="3733800" cy="646331"/>
+          </a:xfrm>
+          <a:prstGeom prst="rect">
+            <a:avLst/>
+          </a:prstGeom>
+        </p:spPr>
+        <p:style>
+          <a:lnRef idx="1">
+            <a:schemeClr val="accent2"/>
+          </a:lnRef>
+          <a:fillRef idx="2">
+            <a:schemeClr val="accent2"/>
+          </a:fillRef>
+          <a:effectRef idx="1">
+            <a:schemeClr val="accent2"/>
+          </a:effectRef>
+          <a:fontRef idx="minor">
+            <a:schemeClr val="dk1"/>
+          </a:fontRef>
+        </p:style>
+        <p:txBody>
+          <a:bodyPr wrap="square" rtlCol="0">
+            <a:spAutoFit/>
+          </a:bodyPr>
+          <a:lstStyle/>
+          <a:p>
+            <a:r>
+              <a:rPr lang="ro-RO" b="1" dirty="0" smtClean="0"/>
+              <a:t>Marcarea bilelor care au aceeasi culoare cu cea data de shooter</a:t>
+            </a:r>
+            <a:endParaRPr lang="en-US" b="1" dirty="0"/>
+          </a:p>
+        </p:txBody>
+      </p:sp>
     </p:spTree>
     <p:extLst>
       <p:ext uri="{BB962C8B-B14F-4D97-AF65-F5344CB8AC3E}">
-        <p14:creationId xmlns:p14="http://schemas.microsoft.com/office/powerpoint/2010/main" val="390489320"/>
+        <p14:creationId xmlns:p14="http://schemas.microsoft.com/office/powerpoint/2010/main" val="2796172894"/>
       </p:ext>
     </p:extLst>
   </p:cSld>
@@ -4007,8 +4040,8 @@
         </p:nvSpPr>
         <p:spPr>
           <a:xfrm>
-            <a:off x="762000" y="457200"/>
-            <a:ext cx="7543800" cy="762000"/>
+            <a:off x="766483" y="457200"/>
+            <a:ext cx="7559488" cy="762000"/>
           </a:xfrm>
         </p:spPr>
         <p:style>
@@ -4027,73 +4060,37 @@
         </p:style>
         <p:txBody>
           <a:bodyPr>
-            <a:normAutofit fontScale="90000"/>
+            <a:noAutofit/>
           </a:bodyPr>
           <a:lstStyle/>
           <a:p>
             <a:pPr algn="ctr"/>
             <a:r>
-              <a:rPr lang="ro-RO" sz="2800" b="1" dirty="0"/>
-              <a:t>Functionalitatea de salvare a scorului si al jucatorilor castigatori –Partea </a:t>
-            </a:r>
-            <a:r>
-              <a:rPr lang="ro-RO" sz="2800" b="1" dirty="0" smtClean="0"/>
-              <a:t>2</a:t>
-            </a:r>
-            <a:endParaRPr lang="en-US" sz="2800" dirty="0"/>
-          </a:p>
-        </p:txBody>
-      </p:sp>
-      <p:sp>
-        <p:nvSpPr>
-          <p:cNvPr id="3" name="Content Placeholder 2"/>
-          <p:cNvSpPr>
-            <a:spLocks noGrp="1"/>
-          </p:cNvSpPr>
-          <p:nvPr>
-            <p:ph sz="half" idx="1"/>
-          </p:nvPr>
-        </p:nvSpPr>
-        <p:spPr>
-          <a:xfrm>
-            <a:off x="762000" y="2057400"/>
-            <a:ext cx="3657600" cy="1676400"/>
-          </a:xfrm>
-        </p:spPr>
-        <p:style>
-          <a:lnRef idx="1">
-            <a:schemeClr val="accent2"/>
-          </a:lnRef>
-          <a:fillRef idx="2">
-            <a:schemeClr val="accent2"/>
-          </a:fillRef>
-          <a:effectRef idx="1">
-            <a:schemeClr val="accent2"/>
-          </a:effectRef>
-          <a:fontRef idx="minor">
-            <a:schemeClr val="dk1"/>
-          </a:fontRef>
-        </p:style>
-        <p:txBody>
-          <a:bodyPr>
-            <a:normAutofit/>
-          </a:bodyPr>
-          <a:lstStyle/>
-          <a:p>
-            <a:pPr marL="0" indent="0">
-              <a:buNone/>
-            </a:pPr>
-            <a:r>
-              <a:rPr lang="ro-RO" sz="1800" b="1" dirty="0" smtClean="0"/>
-              <a:t>Metodele pentru salvarea scorului intr-un fisier text si de incarcare din fisierul text apoi propagat in interfata grafica.</a:t>
-            </a:r>
-            <a:endParaRPr lang="en-US" sz="1800" b="1" dirty="0"/>
+              <a:rPr lang="ro-RO" sz="3600" dirty="0"/>
+              <a:t/>
+            </a:r>
+            <a:br>
+              <a:rPr lang="ro-RO" sz="3600" dirty="0"/>
+            </a:br>
+            <a:r>
+              <a:rPr lang="ro-RO" sz="2400" b="1" dirty="0" smtClean="0"/>
+              <a:t>Functionalitatea de salvare a </a:t>
+            </a:r>
+            <a:r>
+              <a:rPr lang="ro-RO" sz="2400" b="1" dirty="0"/>
+              <a:t>scorului si al jucatorilor </a:t>
+            </a:r>
+            <a:r>
+              <a:rPr lang="ro-RO" sz="2400" b="1" dirty="0" smtClean="0"/>
+              <a:t>castigatori –Partea 1</a:t>
+            </a:r>
+            <a:endParaRPr lang="en-US" sz="2400" b="1" dirty="0"/>
           </a:p>
         </p:txBody>
       </p:sp>
       <p:pic>
         <p:nvPicPr>
-          <p:cNvPr id="6146" name="Picture 2"/>
+          <p:cNvPr id="5122" name="Picture 2"/>
           <p:cNvPicPr>
             <a:picLocks noGrp="1" noChangeAspect="1" noChangeArrowheads="1"/>
           </p:cNvPicPr>
@@ -4116,8 +4113,8 @@
         </p:blipFill>
         <p:spPr bwMode="auto">
           <a:xfrm>
-            <a:off x="4572000" y="1524000"/>
-            <a:ext cx="3733800" cy="4267200"/>
+            <a:off x="4424722" y="1447800"/>
+            <a:ext cx="3918857" cy="3429000"/>
           </a:xfrm>
           <a:prstGeom prst="rect">
             <a:avLst/>
@@ -4157,67 +4154,29 @@
           </a:extLst>
         </p:spPr>
       </p:pic>
-    </p:spTree>
-    <p:extLst>
-      <p:ext uri="{BB962C8B-B14F-4D97-AF65-F5344CB8AC3E}">
-        <p14:creationId xmlns:p14="http://schemas.microsoft.com/office/powerpoint/2010/main" val="3452414315"/>
-      </p:ext>
-    </p:extLst>
-  </p:cSld>
-  <p:clrMapOvr>
-    <a:masterClrMapping/>
-  </p:clrMapOvr>
-  <p:timing>
-    <p:tnLst>
-      <p:par>
-        <p:cTn id="1" dur="indefinite" restart="never" nodeType="tmRoot"/>
-      </p:par>
-    </p:tnLst>
-  </p:timing>
-</p:sld>
-</file>
-
-<file path=ppt/slides/slide12.xml><?xml version="1.0" encoding="utf-8"?>
-<p:sld xmlns:a="http://schemas.openxmlformats.org/drawingml/2006/main" xmlns:r="http://schemas.openxmlformats.org/officeDocument/2006/relationships" xmlns:p="http://schemas.openxmlformats.org/presentationml/2006/main">
-  <p:cSld>
-    <p:spTree>
-      <p:nvGrpSpPr>
-        <p:cNvPr id="1" name=""/>
-        <p:cNvGrpSpPr/>
-        <p:nvPr/>
-      </p:nvGrpSpPr>
-      <p:grpSpPr>
-        <a:xfrm>
-          <a:off x="0" y="0"/>
-          <a:ext cx="0" cy="0"/>
-          <a:chOff x="0" y="0"/>
-          <a:chExt cx="0" cy="0"/>
-        </a:xfrm>
-      </p:grpSpPr>
-      <p:sp>
-        <p:nvSpPr>
-          <p:cNvPr id="2" name="Title 1"/>
-          <p:cNvSpPr>
-            <a:spLocks noGrp="1"/>
-          </p:cNvSpPr>
-          <p:nvPr>
-            <p:ph type="title"/>
-          </p:nvPr>
+      <p:sp>
+        <p:nvSpPr>
+          <p:cNvPr id="6" name="TextBox 5"/>
+          <p:cNvSpPr txBox="1"/>
+          <p:nvPr/>
         </p:nvSpPr>
         <p:spPr>
           <a:xfrm>
-            <a:off x="838200" y="457200"/>
-            <a:ext cx="7467600" cy="533400"/>
-          </a:xfrm>
+            <a:off x="746312" y="1676400"/>
+            <a:ext cx="3581400" cy="3970318"/>
+          </a:xfrm>
+          <a:prstGeom prst="rect">
+            <a:avLst/>
+          </a:prstGeom>
         </p:spPr>
         <p:style>
-          <a:lnRef idx="2">
+          <a:lnRef idx="1">
             <a:schemeClr val="accent2"/>
           </a:lnRef>
-          <a:fillRef idx="1">
-            <a:schemeClr val="lt1"/>
+          <a:fillRef idx="2">
+            <a:schemeClr val="accent2"/>
           </a:fillRef>
-          <a:effectRef idx="0">
+          <a:effectRef idx="1">
             <a:schemeClr val="accent2"/>
           </a:effectRef>
           <a:fontRef idx="minor">
@@ -4225,80 +4184,51 @@
           </a:fontRef>
         </p:style>
         <p:txBody>
-          <a:bodyPr>
-            <a:normAutofit fontScale="90000"/>
+          <a:bodyPr wrap="square" rtlCol="0">
+            <a:spAutoFit/>
           </a:bodyPr>
           <a:lstStyle/>
           <a:p>
-            <a:pPr algn="ctr"/>
-            <a:r>
-              <a:rPr lang="ro-RO" sz="3600" b="1" dirty="0" smtClean="0"/>
-              <a:t/>
-            </a:r>
-            <a:br>
-              <a:rPr lang="ro-RO" sz="3600" b="1" dirty="0" smtClean="0"/>
-            </a:br>
-            <a:r>
-              <a:rPr lang="ro-RO" sz="3600" b="1" dirty="0" smtClean="0"/>
-              <a:t/>
-            </a:r>
-            <a:br>
-              <a:rPr lang="ro-RO" sz="3600" b="1" dirty="0" smtClean="0"/>
-            </a:br>
-            <a:r>
-              <a:rPr lang="ro-RO" sz="3600" b="1" dirty="0"/>
-              <a:t/>
-            </a:r>
-            <a:br>
-              <a:rPr lang="ro-RO" sz="3600" b="1" dirty="0"/>
-            </a:br>
-            <a:r>
-              <a:rPr lang="ro-RO" sz="3600" b="1" dirty="0" smtClean="0"/>
-              <a:t/>
-            </a:r>
-            <a:br>
-              <a:rPr lang="ro-RO" sz="3600" b="1" dirty="0" smtClean="0"/>
-            </a:br>
-            <a:r>
-              <a:rPr lang="en-US" b="1" dirty="0"/>
-              <a:t/>
-            </a:r>
-            <a:br>
-              <a:rPr lang="en-US" b="1" dirty="0"/>
-            </a:br>
-            <a:r>
-              <a:rPr lang="ro-RO" sz="3100" b="1" dirty="0"/>
-              <a:t>Functionalitatea de oprire a jocului</a:t>
-            </a:r>
-            <a:endParaRPr lang="en-US" sz="3600" dirty="0"/>
+            <a:r>
+              <a:rPr lang="ro-RO" b="1" dirty="0" smtClean="0"/>
+              <a:t>La finalizarea jocului, va aparea un modal cu mesajul You win!, unde utilizatorul va trebui sa isi introduca numele pentru a fi inregistrat in clasament. </a:t>
+            </a:r>
+          </a:p>
+          <a:p>
+            <a:endParaRPr lang="ro-RO" b="1" dirty="0"/>
+          </a:p>
+          <a:p>
+            <a:r>
+              <a:rPr lang="ro-RO" b="1" dirty="0" smtClean="0"/>
+              <a:t>De altfel, aceste informatii vor fi salvate si intr-un fisier extern .text, astfel incat pe viitor la o noua sesiune de joc noii utilizatori sa poata vedea direct in interfata scorurile salvate, cat si numele jucatorilor castigatori, ca in a doua imagine atasata de jos.</a:t>
+            </a:r>
+            <a:endParaRPr lang="en-US" b="1" dirty="0"/>
           </a:p>
         </p:txBody>
       </p:sp>
       <p:pic>
         <p:nvPicPr>
-          <p:cNvPr id="7170" name="Picture 2"/>
+          <p:cNvPr id="5123" name="Picture 3"/>
           <p:cNvPicPr>
-            <a:picLocks noGrp="1" noChangeAspect="1" noChangeArrowheads="1"/>
+            <a:picLocks noChangeAspect="1" noChangeArrowheads="1"/>
           </p:cNvPicPr>
-          <p:nvPr>
-            <p:ph sz="half" idx="2"/>
-          </p:nvPr>
+          <p:nvPr/>
         </p:nvPicPr>
         <p:blipFill rotWithShape="1">
-          <a:blip r:embed="rId2">
+          <a:blip r:embed="rId3">
             <a:extLst>
               <a:ext uri="{28A0092B-C50C-407E-A947-70E740481C1C}">
                 <a14:useLocalDpi xmlns:a14="http://schemas.microsoft.com/office/drawing/2010/main" val="0"/>
               </a:ext>
             </a:extLst>
           </a:blip>
-          <a:srcRect l="1042" t="1615" r="981"/>
+          <a:srcRect b="81149"/>
           <a:stretch/>
         </p:blipFill>
         <p:spPr bwMode="auto">
           <a:xfrm>
-            <a:off x="4724400" y="1219200"/>
-            <a:ext cx="3583641" cy="3429000"/>
+            <a:off x="4419600" y="5051601"/>
+            <a:ext cx="3939989" cy="750610"/>
           </a:xfrm>
           <a:prstGeom prst="rect">
             <a:avLst/>
@@ -4338,29 +4268,67 @@
           </a:extLst>
         </p:spPr>
       </p:pic>
-      <p:sp>
-        <p:nvSpPr>
-          <p:cNvPr id="8" name="TextBox 7"/>
-          <p:cNvSpPr txBox="1"/>
-          <p:nvPr/>
+    </p:spTree>
+    <p:extLst>
+      <p:ext uri="{BB962C8B-B14F-4D97-AF65-F5344CB8AC3E}">
+        <p14:creationId xmlns:p14="http://schemas.microsoft.com/office/powerpoint/2010/main" val="390489320"/>
+      </p:ext>
+    </p:extLst>
+  </p:cSld>
+  <p:clrMapOvr>
+    <a:masterClrMapping/>
+  </p:clrMapOvr>
+  <p:timing>
+    <p:tnLst>
+      <p:par>
+        <p:cTn id="1" dur="indefinite" restart="never" nodeType="tmRoot"/>
+      </p:par>
+    </p:tnLst>
+  </p:timing>
+</p:sld>
+</file>
+
+<file path=ppt/slides/slide12.xml><?xml version="1.0" encoding="utf-8"?>
+<p:sld xmlns:a="http://schemas.openxmlformats.org/drawingml/2006/main" xmlns:r="http://schemas.openxmlformats.org/officeDocument/2006/relationships" xmlns:p="http://schemas.openxmlformats.org/presentationml/2006/main">
+  <p:cSld>
+    <p:spTree>
+      <p:nvGrpSpPr>
+        <p:cNvPr id="1" name=""/>
+        <p:cNvGrpSpPr/>
+        <p:nvPr/>
+      </p:nvGrpSpPr>
+      <p:grpSpPr>
+        <a:xfrm>
+          <a:off x="0" y="0"/>
+          <a:ext cx="0" cy="0"/>
+          <a:chOff x="0" y="0"/>
+          <a:chExt cx="0" cy="0"/>
+        </a:xfrm>
+      </p:grpSpPr>
+      <p:sp>
+        <p:nvSpPr>
+          <p:cNvPr id="2" name="Title 1"/>
+          <p:cNvSpPr>
+            <a:spLocks noGrp="1"/>
+          </p:cNvSpPr>
+          <p:nvPr>
+            <p:ph type="title"/>
+          </p:nvPr>
         </p:nvSpPr>
         <p:spPr>
           <a:xfrm>
-            <a:off x="838200" y="1371600"/>
-            <a:ext cx="3733800" cy="923330"/>
-          </a:xfrm>
-          <a:prstGeom prst="rect">
-            <a:avLst/>
-          </a:prstGeom>
+            <a:off x="762000" y="457200"/>
+            <a:ext cx="7543800" cy="762000"/>
+          </a:xfrm>
         </p:spPr>
         <p:style>
-          <a:lnRef idx="1">
+          <a:lnRef idx="2">
             <a:schemeClr val="accent2"/>
           </a:lnRef>
-          <a:fillRef idx="2">
-            <a:schemeClr val="accent2"/>
+          <a:fillRef idx="1">
+            <a:schemeClr val="lt1"/>
           </a:fillRef>
-          <a:effectRef idx="1">
+          <a:effectRef idx="0">
             <a:schemeClr val="accent2"/>
           </a:effectRef>
           <a:fontRef idx="minor">
@@ -4368,33 +4336,83 @@
           </a:fontRef>
         </p:style>
         <p:txBody>
-          <a:bodyPr wrap="square" rtlCol="0">
-            <a:spAutoFit/>
+          <a:bodyPr>
+            <a:normAutofit fontScale="90000"/>
           </a:bodyPr>
           <a:lstStyle/>
           <a:p>
-            <a:r>
-              <a:rPr lang="ro-RO" b="1" dirty="0"/>
-              <a:t>Pentru a opri fortat un joc utilizatorul va apasa pe butonul Stop </a:t>
-            </a:r>
-            <a:r>
-              <a:rPr lang="ro-RO" b="1" dirty="0" smtClean="0"/>
-              <a:t>Game din imaginea alaturata.</a:t>
-            </a:r>
-            <a:endParaRPr lang="en-US" b="1" dirty="0"/>
+            <a:pPr algn="ctr"/>
+            <a:r>
+              <a:rPr lang="ro-RO" sz="2800" b="1" dirty="0"/>
+              <a:t>Functionalitatea de salvare a scorului si al jucatorilor castigatori –Partea </a:t>
+            </a:r>
+            <a:r>
+              <a:rPr lang="ro-RO" sz="2800" b="1" dirty="0" smtClean="0"/>
+              <a:t>2</a:t>
+            </a:r>
+            <a:endParaRPr lang="en-US" sz="2800" dirty="0"/>
+          </a:p>
+        </p:txBody>
+      </p:sp>
+      <p:sp>
+        <p:nvSpPr>
+          <p:cNvPr id="3" name="Content Placeholder 2"/>
+          <p:cNvSpPr>
+            <a:spLocks noGrp="1"/>
+          </p:cNvSpPr>
+          <p:nvPr>
+            <p:ph sz="half" idx="1"/>
+          </p:nvPr>
+        </p:nvSpPr>
+        <p:spPr>
+          <a:xfrm>
+            <a:off x="762000" y="2057400"/>
+            <a:ext cx="3657600" cy="1676400"/>
+          </a:xfrm>
+        </p:spPr>
+        <p:style>
+          <a:lnRef idx="1">
+            <a:schemeClr val="accent2"/>
+          </a:lnRef>
+          <a:fillRef idx="2">
+            <a:schemeClr val="accent2"/>
+          </a:fillRef>
+          <a:effectRef idx="1">
+            <a:schemeClr val="accent2"/>
+          </a:effectRef>
+          <a:fontRef idx="minor">
+            <a:schemeClr val="dk1"/>
+          </a:fontRef>
+        </p:style>
+        <p:txBody>
+          <a:bodyPr>
+            <a:normAutofit/>
+          </a:bodyPr>
+          <a:lstStyle/>
+          <a:p>
+            <a:pPr marL="0" indent="0">
+              <a:buNone/>
+            </a:pPr>
+            <a:r>
+              <a:rPr lang="ro-RO" sz="1800" b="1" dirty="0" smtClean="0"/>
+              <a:t>Metodele pentru salvarea scorului intr-un fisier text si de incarcare din fisierul text apoi propagat in interfata grafica.</a:t>
+            </a:r>
+            <a:endParaRPr lang="en-US" sz="1800" b="1" dirty="0"/>
           </a:p>
         </p:txBody>
       </p:sp>
       <p:pic>
         <p:nvPicPr>
-          <p:cNvPr id="7171" name="Picture 3"/>
+          <p:cNvPr id="6146" name="Picture 2"/>
           <p:cNvPicPr>
-            <a:picLocks noChangeAspect="1" noChangeArrowheads="1"/>
+            <a:picLocks noGrp="1" noChangeAspect="1" noChangeArrowheads="1"/>
           </p:cNvPicPr>
-          <p:nvPr/>
+          <p:nvPr>
+            <p:ph sz="half" idx="2"/>
+          </p:nvPr>
         </p:nvPicPr>
         <p:blipFill>
-          <a:blip r:embed="rId3">
+          <a:blip r:embed="rId2">
             <a:extLst>
               <a:ext uri="{28A0092B-C50C-407E-A947-70E740481C1C}">
                 <a14:useLocalDpi xmlns:a14="http://schemas.microsoft.com/office/drawing/2010/main" val="0"/>
@@ -4408,8 +4426,8 @@
         </p:blipFill>
         <p:spPr bwMode="auto">
           <a:xfrm>
-            <a:off x="990600" y="4572000"/>
-            <a:ext cx="3689056" cy="1120776"/>
+            <a:off x="4572000" y="1524000"/>
+            <a:ext cx="3733800" cy="4267200"/>
           </a:xfrm>
           <a:prstGeom prst="rect">
             <a:avLst/>
@@ -4449,64 +4467,23 @@
           </a:extLst>
         </p:spPr>
       </p:pic>
-      <p:sp>
-        <p:nvSpPr>
-          <p:cNvPr id="10" name="Rectangle 9"/>
-          <p:cNvSpPr/>
-          <p:nvPr/>
-        </p:nvSpPr>
-        <p:spPr>
-          <a:xfrm>
-            <a:off x="956072" y="5715000"/>
-            <a:ext cx="3723584" cy="369332"/>
-          </a:xfrm>
-          <a:prstGeom prst="rect">
-            <a:avLst/>
-          </a:prstGeom>
-        </p:spPr>
-        <p:style>
-          <a:lnRef idx="1">
-            <a:schemeClr val="accent2"/>
-          </a:lnRef>
-          <a:fillRef idx="2">
-            <a:schemeClr val="accent2"/>
-          </a:fillRef>
-          <a:effectRef idx="1">
-            <a:schemeClr val="accent2"/>
-          </a:effectRef>
-          <a:fontRef idx="minor">
-            <a:schemeClr val="dk1"/>
-          </a:fontRef>
-        </p:style>
-        <p:txBody>
-          <a:bodyPr wrap="none">
-            <a:spAutoFit/>
-          </a:bodyPr>
-          <a:lstStyle/>
-          <a:p>
-            <a:pPr algn="ctr"/>
-            <a:r>
-              <a:rPr lang="ro-RO" b="1" dirty="0"/>
-              <a:t>Initializarea butonului de </a:t>
-            </a:r>
-            <a:r>
-              <a:rPr lang="ro-RO" b="1" dirty="0" smtClean="0"/>
-              <a:t>Stop Game</a:t>
-            </a:r>
-            <a:endParaRPr lang="en-US" b="1" dirty="0"/>
-          </a:p>
-        </p:txBody>
-      </p:sp>
     </p:spTree>
     <p:extLst>
       <p:ext uri="{BB962C8B-B14F-4D97-AF65-F5344CB8AC3E}">
-        <p14:creationId xmlns:p14="http://schemas.microsoft.com/office/powerpoint/2010/main" val="1839665857"/>
+        <p14:creationId xmlns:p14="http://schemas.microsoft.com/office/powerpoint/2010/main" val="3452414315"/>
       </p:ext>
     </p:extLst>
   </p:cSld>
   <p:clrMapOvr>
     <a:masterClrMapping/>
   </p:clrMapOvr>
+  <p:timing>
+    <p:tnLst>
+      <p:par>
+        <p:cTn id="1" dur="indefinite" restart="never" nodeType="tmRoot"/>
+      </p:par>
+    </p:tnLst>
+  </p:timing>
 </p:sld>
 </file>
 
@@ -4539,19 +4516,19 @@
         </p:nvSpPr>
         <p:spPr>
           <a:xfrm>
-            <a:off x="762000" y="457200"/>
-            <a:ext cx="7543800" cy="533400"/>
+            <a:off x="838200" y="457200"/>
+            <a:ext cx="7467600" cy="533400"/>
           </a:xfrm>
         </p:spPr>
         <p:style>
           <a:lnRef idx="2">
-            <a:schemeClr val="accent1"/>
+            <a:schemeClr val="accent2"/>
           </a:lnRef>
           <a:fillRef idx="1">
             <a:schemeClr val="lt1"/>
           </a:fillRef>
           <a:effectRef idx="0">
-            <a:schemeClr val="accent1"/>
+            <a:schemeClr val="accent2"/>
           </a:effectRef>
           <a:fontRef idx="minor">
             <a:schemeClr val="dk1"/>
@@ -4559,202 +4536,79 @@
         </p:style>
         <p:txBody>
           <a:bodyPr>
-            <a:noAutofit/>
+            <a:normAutofit fontScale="90000"/>
           </a:bodyPr>
           <a:lstStyle/>
           <a:p>
             <a:pPr algn="ctr"/>
             <a:r>
-              <a:rPr lang="en-US" sz="2800" b="1" dirty="0">
-                <a:latin typeface="+mn-lt"/>
-              </a:rPr>
-              <a:t>Legatura </a:t>
-            </a:r>
-            <a:r>
-              <a:rPr lang="ro-RO" sz="2800" b="1" dirty="0" smtClean="0">
-                <a:latin typeface="+mn-lt"/>
-              </a:rPr>
-              <a:t>dintre PC </a:t>
-            </a:r>
-            <a:r>
-              <a:rPr lang="en-US" sz="2800" b="1" dirty="0" smtClean="0">
-                <a:latin typeface="+mn-lt"/>
-              </a:rPr>
-              <a:t>cu </a:t>
-            </a:r>
-            <a:r>
-              <a:rPr lang="en-US" sz="2800" b="1" dirty="0">
-                <a:latin typeface="+mn-lt"/>
-              </a:rPr>
-              <a:t>un controller </a:t>
-            </a:r>
-            <a:r>
-              <a:rPr lang="en-US" sz="2800" b="1" dirty="0" smtClean="0">
-                <a:latin typeface="+mn-lt"/>
-              </a:rPr>
-              <a:t>extern</a:t>
-            </a:r>
-            <a:endParaRPr lang="en-US" sz="2800" b="1" dirty="0">
-              <a:latin typeface="+mn-lt"/>
-            </a:endParaRPr>
+              <a:rPr lang="ro-RO" sz="3600" b="1" dirty="0" smtClean="0"/>
+              <a:t/>
+            </a:r>
+            <a:br>
+              <a:rPr lang="ro-RO" sz="3600" b="1" dirty="0" smtClean="0"/>
+            </a:br>
+            <a:r>
+              <a:rPr lang="ro-RO" sz="3600" b="1" dirty="0" smtClean="0"/>
+              <a:t/>
+            </a:r>
+            <a:br>
+              <a:rPr lang="ro-RO" sz="3600" b="1" dirty="0" smtClean="0"/>
+            </a:br>
+            <a:r>
+              <a:rPr lang="ro-RO" sz="3600" b="1" dirty="0"/>
+              <a:t/>
+            </a:r>
+            <a:br>
+              <a:rPr lang="ro-RO" sz="3600" b="1" dirty="0"/>
+            </a:br>
+            <a:r>
+              <a:rPr lang="ro-RO" sz="3600" b="1" dirty="0" smtClean="0"/>
+              <a:t/>
+            </a:r>
+            <a:br>
+              <a:rPr lang="ro-RO" sz="3600" b="1" dirty="0" smtClean="0"/>
+            </a:br>
+            <a:r>
+              <a:rPr lang="en-US" b="1" dirty="0"/>
+              <a:t/>
+            </a:r>
+            <a:br>
+              <a:rPr lang="en-US" b="1" dirty="0"/>
+            </a:br>
+            <a:r>
+              <a:rPr lang="ro-RO" sz="3100" b="1" dirty="0"/>
+              <a:t>Functionalitatea de oprire a jocului</a:t>
+            </a:r>
+            <a:endParaRPr lang="en-US" sz="3600" dirty="0"/>
           </a:p>
         </p:txBody>
       </p:sp>
       <p:pic>
         <p:nvPicPr>
-          <p:cNvPr id="6" name="Content Placeholder 5"/>
+          <p:cNvPr id="7170" name="Picture 2"/>
           <p:cNvPicPr>
-            <a:picLocks noGrp="1" noChangeAspect="1"/>
+            <a:picLocks noGrp="1" noChangeAspect="1" noChangeArrowheads="1"/>
           </p:cNvPicPr>
           <p:nvPr>
             <p:ph sz="half" idx="2"/>
           </p:nvPr>
         </p:nvPicPr>
-        <p:blipFill>
-          <a:blip r:embed="rId2" cstate="print">
+        <p:blipFill rotWithShape="1">
+          <a:blip r:embed="rId2">
             <a:extLst>
               <a:ext uri="{28A0092B-C50C-407E-A947-70E740481C1C}">
                 <a14:useLocalDpi xmlns:a14="http://schemas.microsoft.com/office/drawing/2010/main" val="0"/>
               </a:ext>
             </a:extLst>
           </a:blip>
-          <a:stretch>
-            <a:fillRect/>
-          </a:stretch>
-        </p:blipFill>
-        <p:spPr>
-          <a:xfrm>
-            <a:off x="6172200" y="1371600"/>
-            <a:ext cx="2119015" cy="3767138"/>
-          </a:xfrm>
-        </p:spPr>
-      </p:pic>
-      <p:sp>
-        <p:nvSpPr>
-          <p:cNvPr id="11" name="TextBox 10"/>
-          <p:cNvSpPr txBox="1"/>
-          <p:nvPr/>
-        </p:nvSpPr>
-        <p:spPr>
-          <a:xfrm>
-            <a:off x="762000" y="1371600"/>
-            <a:ext cx="5257800" cy="1200329"/>
-          </a:xfrm>
-          <a:prstGeom prst="rect">
-            <a:avLst/>
-          </a:prstGeom>
-        </p:spPr>
-        <p:style>
-          <a:lnRef idx="1">
-            <a:schemeClr val="accent2"/>
-          </a:lnRef>
-          <a:fillRef idx="2">
-            <a:schemeClr val="accent2"/>
-          </a:fillRef>
-          <a:effectRef idx="1">
-            <a:schemeClr val="accent2"/>
-          </a:effectRef>
-          <a:fontRef idx="minor">
-            <a:schemeClr val="dk1"/>
-          </a:fontRef>
-        </p:style>
-        <p:txBody>
-          <a:bodyPr wrap="square" rtlCol="0">
-            <a:spAutoFit/>
-          </a:bodyPr>
-          <a:lstStyle/>
-          <a:p>
-            <a:r>
-              <a:rPr lang="ro-RO" b="1" dirty="0"/>
-              <a:t>Legatura interfetei grafice cu controller-ul extern se face via </a:t>
-            </a:r>
-            <a:r>
-              <a:rPr lang="en-US" b="1" dirty="0">
-                <a:solidFill>
-                  <a:srgbClr val="FF0000"/>
-                </a:solidFill>
-              </a:rPr>
-              <a:t>U</a:t>
-            </a:r>
-            <a:r>
-              <a:rPr lang="en-US" b="1" dirty="0"/>
-              <a:t>niversal </a:t>
-            </a:r>
-            <a:r>
-              <a:rPr lang="en-US" b="1" dirty="0">
-                <a:solidFill>
-                  <a:srgbClr val="FF0000"/>
-                </a:solidFill>
-              </a:rPr>
-              <a:t>S</a:t>
-            </a:r>
-            <a:r>
-              <a:rPr lang="en-US" b="1" dirty="0"/>
-              <a:t>erial </a:t>
-            </a:r>
-            <a:r>
-              <a:rPr lang="en-US" b="1" dirty="0">
-                <a:solidFill>
-                  <a:srgbClr val="FF0000"/>
-                </a:solidFill>
-              </a:rPr>
-              <a:t>B</a:t>
-            </a:r>
-            <a:r>
-              <a:rPr lang="en-US" b="1" dirty="0"/>
-              <a:t>us 3.0</a:t>
-            </a:r>
-            <a:r>
-              <a:rPr lang="ro-RO" b="1" dirty="0" smtClean="0"/>
-              <a:t>, </a:t>
-            </a:r>
-            <a:r>
-              <a:rPr lang="ro-RO" b="1" dirty="0"/>
-              <a:t>acesta </a:t>
-            </a:r>
-            <a:r>
-              <a:rPr lang="ro-RO" b="1" dirty="0" smtClean="0"/>
-              <a:t>arata </a:t>
-            </a:r>
-            <a:r>
-              <a:rPr lang="ro-RO" b="1" dirty="0"/>
-              <a:t>ca in figura alaturata</a:t>
-            </a:r>
-            <a:r>
-              <a:rPr lang="ro-RO" b="1" dirty="0" smtClean="0"/>
-              <a:t>.</a:t>
-            </a:r>
-          </a:p>
-          <a:p>
-            <a:endParaRPr lang="en-US" b="1" dirty="0"/>
-          </a:p>
-        </p:txBody>
-      </p:sp>
-      <p:pic>
-        <p:nvPicPr>
-          <p:cNvPr id="1026" name="Picture 2"/>
-          <p:cNvPicPr>
-            <a:picLocks noChangeAspect="1" noChangeArrowheads="1"/>
-          </p:cNvPicPr>
-          <p:nvPr/>
-        </p:nvPicPr>
-        <p:blipFill>
-          <a:blip r:embed="rId3">
-            <a:extLst>
-              <a:ext uri="{28A0092B-C50C-407E-A947-70E740481C1C}">
-                <a14:useLocalDpi xmlns:a14="http://schemas.microsoft.com/office/drawing/2010/main" val="0"/>
-              </a:ext>
-            </a:extLst>
-          </a:blip>
-          <a:srcRect/>
-          <a:stretch>
-            <a:fillRect/>
-          </a:stretch>
+          <a:srcRect l="1042" t="1615" r="981"/>
+          <a:stretch/>
         </p:blipFill>
         <p:spPr bwMode="auto">
           <a:xfrm>
-            <a:off x="769272" y="2967317"/>
-            <a:ext cx="5252769" cy="3048000"/>
+            <a:off x="4724400" y="1219200"/>
+            <a:ext cx="3583641" cy="3429000"/>
           </a:xfrm>
           <a:prstGeom prst="rect">
             <a:avLst/>
@@ -4796,14 +4650,14 @@
       </p:pic>
       <p:sp>
         <p:nvSpPr>
-          <p:cNvPr id="13" name="TextBox 12"/>
+          <p:cNvPr id="8" name="TextBox 7"/>
           <p:cNvSpPr txBox="1"/>
           <p:nvPr/>
         </p:nvSpPr>
         <p:spPr>
           <a:xfrm>
-            <a:off x="6172200" y="5725777"/>
-            <a:ext cx="2133600" cy="276999"/>
+            <a:off x="838200" y="1371600"/>
+            <a:ext cx="3733800" cy="923330"/>
           </a:xfrm>
           <a:prstGeom prst="rect">
             <a:avLst/>
@@ -4830,649 +4684,27 @@
           <a:lstStyle/>
           <a:p>
             <a:r>
-              <a:rPr lang="ro-RO" sz="1200" b="1" dirty="0" smtClean="0"/>
-              <a:t>Cod pentru reactiile de baza</a:t>
-            </a:r>
-            <a:endParaRPr lang="en-US" sz="1200" b="1" dirty="0"/>
-          </a:p>
-        </p:txBody>
-      </p:sp>
-    </p:spTree>
-    <p:extLst>
-      <p:ext uri="{BB962C8B-B14F-4D97-AF65-F5344CB8AC3E}">
-        <p14:creationId xmlns:p14="http://schemas.microsoft.com/office/powerpoint/2010/main" val="3827987516"/>
-      </p:ext>
-    </p:extLst>
-  </p:cSld>
-  <p:clrMapOvr>
-    <a:masterClrMapping/>
-  </p:clrMapOvr>
-</p:sld>
-</file>
-
-<file path=ppt/slides/slide2.xml><?xml version="1.0" encoding="utf-8"?>
-<p:sld xmlns:a="http://schemas.openxmlformats.org/drawingml/2006/main" xmlns:r="http://schemas.openxmlformats.org/officeDocument/2006/relationships" xmlns:p="http://schemas.openxmlformats.org/presentationml/2006/main">
-  <p:cSld>
-    <p:spTree>
-      <p:nvGrpSpPr>
-        <p:cNvPr id="1" name=""/>
-        <p:cNvGrpSpPr/>
-        <p:nvPr/>
-      </p:nvGrpSpPr>
-      <p:grpSpPr>
-        <a:xfrm>
-          <a:off x="0" y="0"/>
-          <a:ext cx="0" cy="0"/>
-          <a:chOff x="0" y="0"/>
-          <a:chExt cx="0" cy="0"/>
-        </a:xfrm>
-      </p:grpSpPr>
-      <p:sp>
-        <p:nvSpPr>
-          <p:cNvPr id="2" name="Title 1"/>
-          <p:cNvSpPr>
-            <a:spLocks noGrp="1"/>
-          </p:cNvSpPr>
-          <p:nvPr>
-            <p:ph type="title"/>
-          </p:nvPr>
-        </p:nvSpPr>
-        <p:spPr>
-          <a:xfrm>
-            <a:off x="1295400" y="457200"/>
-            <a:ext cx="6096000" cy="762000"/>
-          </a:xfrm>
-        </p:spPr>
-        <p:style>
-          <a:lnRef idx="2">
-            <a:schemeClr val="accent2"/>
-          </a:lnRef>
-          <a:fillRef idx="1">
-            <a:schemeClr val="lt1"/>
-          </a:fillRef>
-          <a:effectRef idx="0">
-            <a:schemeClr val="accent2"/>
-          </a:effectRef>
-          <a:fontRef idx="minor">
-            <a:schemeClr val="dk1"/>
-          </a:fontRef>
-        </p:style>
-        <p:txBody>
-          <a:bodyPr>
-            <a:normAutofit/>
-          </a:bodyPr>
-          <a:lstStyle/>
-          <a:p>
-            <a:pPr algn="ctr"/>
-            <a:r>
-              <a:rPr lang="en-US" sz="4400" b="1" dirty="0" smtClean="0"/>
-              <a:t>Tehnologii utilizate</a:t>
-            </a:r>
-            <a:endParaRPr lang="en-US" sz="4400" b="1" dirty="0"/>
-          </a:p>
-        </p:txBody>
-      </p:sp>
-      <p:sp>
-        <p:nvSpPr>
-          <p:cNvPr id="3" name="Content Placeholder 2"/>
-          <p:cNvSpPr>
-            <a:spLocks noGrp="1"/>
-          </p:cNvSpPr>
-          <p:nvPr>
-            <p:ph idx="1"/>
-          </p:nvPr>
-        </p:nvSpPr>
-        <p:spPr>
-          <a:xfrm>
-            <a:off x="762000" y="1447800"/>
-            <a:ext cx="7543800" cy="4419600"/>
-          </a:xfrm>
-        </p:spPr>
-        <p:style>
-          <a:lnRef idx="1">
-            <a:schemeClr val="accent2"/>
-          </a:lnRef>
-          <a:fillRef idx="2">
-            <a:schemeClr val="accent2"/>
-          </a:fillRef>
-          <a:effectRef idx="1">
-            <a:schemeClr val="accent2"/>
-          </a:effectRef>
-          <a:fontRef idx="minor">
-            <a:schemeClr val="dk1"/>
-          </a:fontRef>
-        </p:style>
-        <p:txBody>
-          <a:bodyPr/>
-          <a:lstStyle/>
-          <a:p>
-            <a:endParaRPr lang="en-US" dirty="0" smtClean="0"/>
-          </a:p>
-          <a:p>
-            <a:pPr marL="0" indent="0">
-              <a:buNone/>
-            </a:pPr>
-            <a:endParaRPr lang="en-US" dirty="0" smtClean="0"/>
-          </a:p>
-          <a:p>
-            <a:endParaRPr lang="en-US" dirty="0"/>
-          </a:p>
-          <a:p>
-            <a:pPr algn="just">
-              <a:buFont typeface="Wingdings" pitchFamily="2" charset="2"/>
-              <a:buChar char="§"/>
-            </a:pPr>
-            <a:r>
-              <a:rPr lang="en-US" b="1" dirty="0" smtClean="0">
-                <a:latin typeface="Arial" pitchFamily="34" charset="0"/>
-                <a:cs typeface="Arial" pitchFamily="34" charset="0"/>
-              </a:rPr>
-              <a:t>Limbajul de dezvoltare: Java si libraria Swing</a:t>
-            </a:r>
-          </a:p>
-          <a:p>
-            <a:pPr algn="just">
-              <a:buFont typeface="Wingdings" pitchFamily="2" charset="2"/>
-              <a:buChar char="§"/>
-            </a:pPr>
-            <a:r>
-              <a:rPr lang="en-US" b="1" dirty="0" smtClean="0">
-                <a:latin typeface="Arial" pitchFamily="34" charset="0"/>
-                <a:cs typeface="Arial" pitchFamily="34" charset="0"/>
-              </a:rPr>
-              <a:t>Mediul de dezvoltare: IntelliJ IDEA</a:t>
-            </a:r>
+              <a:rPr lang="ro-RO" b="1" dirty="0"/>
+              <a:t>Pentru a opri fortat un joc utilizatorul va apasa pe butonul Stop </a:t>
+            </a:r>
+            <a:r>
+              <a:rPr lang="ro-RO" b="1" dirty="0" smtClean="0"/>
+              <a:t>Game din imaginea alaturata.</a:t>
+            </a:r>
+            <a:endParaRPr lang="en-US" b="1" dirty="0"/>
           </a:p>
         </p:txBody>
       </p:sp>
       <p:pic>
         <p:nvPicPr>
-          <p:cNvPr id="4" name="Picture 3"/>
+          <p:cNvPr id="7171" name="Picture 3"/>
           <p:cNvPicPr>
-            <a:picLocks noChangeAspect="1"/>
-          </p:cNvPicPr>
-          <p:nvPr/>
-        </p:nvPicPr>
-        <p:blipFill rotWithShape="1">
-          <a:blip r:embed="rId2">
-            <a:extLst>
-              <a:ext uri="{28A0092B-C50C-407E-A947-70E740481C1C}">
-                <a14:useLocalDpi xmlns:a14="http://schemas.microsoft.com/office/drawing/2010/main" val="0"/>
-              </a:ext>
-            </a:extLst>
-          </a:blip>
-          <a:srcRect l="6309"/>
-          <a:stretch/>
-        </p:blipFill>
-        <p:spPr>
-          <a:xfrm>
-            <a:off x="1295400" y="2119832"/>
-            <a:ext cx="2057400" cy="1304685"/>
-          </a:xfrm>
-          <a:prstGeom prst="rect">
-            <a:avLst/>
-          </a:prstGeom>
-        </p:spPr>
-      </p:pic>
-      <p:pic>
-        <p:nvPicPr>
-          <p:cNvPr id="5" name="Picture 4"/>
-          <p:cNvPicPr>
-            <a:picLocks noChangeAspect="1"/>
+            <a:picLocks noChangeAspect="1" noChangeArrowheads="1"/>
           </p:cNvPicPr>
           <p:nvPr/>
         </p:nvPicPr>
         <p:blipFill>
-          <a:blip r:embed="rId3" cstate="print">
-            <a:extLst>
-              <a:ext uri="{28A0092B-C50C-407E-A947-70E740481C1C}">
-                <a14:useLocalDpi xmlns:a14="http://schemas.microsoft.com/office/drawing/2010/main" val="0"/>
-              </a:ext>
-            </a:extLst>
-          </a:blip>
-          <a:stretch>
-            <a:fillRect/>
-          </a:stretch>
-        </p:blipFill>
-        <p:spPr>
-          <a:xfrm>
-            <a:off x="5605182" y="2023782"/>
-            <a:ext cx="1481418" cy="1481418"/>
-          </a:xfrm>
-          <a:prstGeom prst="rect">
-            <a:avLst/>
-          </a:prstGeom>
-        </p:spPr>
-      </p:pic>
-    </p:spTree>
-    <p:extLst>
-      <p:ext uri="{BB962C8B-B14F-4D97-AF65-F5344CB8AC3E}">
-        <p14:creationId xmlns:p14="http://schemas.microsoft.com/office/powerpoint/2010/main" val="1594956022"/>
-      </p:ext>
-    </p:extLst>
-  </p:cSld>
-  <p:clrMapOvr>
-    <a:masterClrMapping/>
-  </p:clrMapOvr>
-  <p:timing>
-    <p:tnLst>
-      <p:par>
-        <p:cTn id="1" dur="indefinite" restart="never" nodeType="tmRoot"/>
-      </p:par>
-    </p:tnLst>
-  </p:timing>
-</p:sld>
-</file>
-
-<file path=ppt/slides/slide3.xml><?xml version="1.0" encoding="utf-8"?>
-<p:sld xmlns:a="http://schemas.openxmlformats.org/drawingml/2006/main" xmlns:r="http://schemas.openxmlformats.org/officeDocument/2006/relationships" xmlns:p="http://schemas.openxmlformats.org/presentationml/2006/main">
-  <p:cSld>
-    <p:spTree>
-      <p:nvGrpSpPr>
-        <p:cNvPr id="1" name=""/>
-        <p:cNvGrpSpPr/>
-        <p:nvPr/>
-      </p:nvGrpSpPr>
-      <p:grpSpPr>
-        <a:xfrm>
-          <a:off x="0" y="0"/>
-          <a:ext cx="0" cy="0"/>
-          <a:chOff x="0" y="0"/>
-          <a:chExt cx="0" cy="0"/>
-        </a:xfrm>
-      </p:grpSpPr>
-      <p:sp>
-        <p:nvSpPr>
-          <p:cNvPr id="2" name="Title 1"/>
-          <p:cNvSpPr>
-            <a:spLocks noGrp="1"/>
-          </p:cNvSpPr>
-          <p:nvPr>
-            <p:ph type="title"/>
-          </p:nvPr>
-        </p:nvSpPr>
-        <p:spPr>
-          <a:xfrm>
-            <a:off x="1828800" y="457200"/>
-            <a:ext cx="5257800" cy="609600"/>
-          </a:xfrm>
-        </p:spPr>
-        <p:style>
-          <a:lnRef idx="2">
-            <a:schemeClr val="accent2"/>
-          </a:lnRef>
-          <a:fillRef idx="1">
-            <a:schemeClr val="lt1"/>
-          </a:fillRef>
-          <a:effectRef idx="0">
-            <a:schemeClr val="accent2"/>
-          </a:effectRef>
-          <a:fontRef idx="minor">
-            <a:schemeClr val="dk1"/>
-          </a:fontRef>
-        </p:style>
-        <p:txBody>
-          <a:bodyPr>
-            <a:noAutofit/>
-          </a:bodyPr>
-          <a:lstStyle/>
-          <a:p>
-            <a:pPr algn="ctr"/>
-            <a:r>
-              <a:rPr lang="en-US" sz="4000" b="1" dirty="0" smtClean="0"/>
-              <a:t>Despre joc</a:t>
-            </a:r>
-            <a:endParaRPr lang="en-US" sz="4000" b="1" dirty="0"/>
-          </a:p>
-        </p:txBody>
-      </p:sp>
-      <p:sp>
-        <p:nvSpPr>
-          <p:cNvPr id="3" name="Content Placeholder 2"/>
-          <p:cNvSpPr>
-            <a:spLocks noGrp="1"/>
-          </p:cNvSpPr>
-          <p:nvPr>
-            <p:ph idx="1"/>
-          </p:nvPr>
-        </p:nvSpPr>
-        <p:spPr>
-          <a:xfrm>
-            <a:off x="838200" y="1524000"/>
-            <a:ext cx="7543800" cy="4343400"/>
-          </a:xfrm>
-        </p:spPr>
-        <p:style>
-          <a:lnRef idx="1">
-            <a:schemeClr val="accent2"/>
-          </a:lnRef>
-          <a:fillRef idx="2">
-            <a:schemeClr val="accent2"/>
-          </a:fillRef>
-          <a:effectRef idx="1">
-            <a:schemeClr val="accent2"/>
-          </a:effectRef>
-          <a:fontRef idx="minor">
-            <a:schemeClr val="dk1"/>
-          </a:fontRef>
-        </p:style>
-        <p:txBody>
-          <a:bodyPr/>
-          <a:lstStyle/>
-          <a:p>
-            <a:pPr>
-              <a:buFont typeface="Wingdings" pitchFamily="2" charset="2"/>
-              <a:buChar char="§"/>
-            </a:pPr>
-            <a:r>
-              <a:rPr lang="en-US" b="1" dirty="0" smtClean="0"/>
-              <a:t>Bubble Shooter este o aplicatie desktop dezvoltata utilizand limbajul de programare Java si mediul de dezvoltare IntelliJ IDEA.</a:t>
-            </a:r>
-          </a:p>
-          <a:p>
-            <a:pPr>
-              <a:buFont typeface="Wingdings" pitchFamily="2" charset="2"/>
-              <a:buChar char="§"/>
-            </a:pPr>
-            <a:endParaRPr lang="en-US" b="1" dirty="0" smtClean="0"/>
-          </a:p>
-          <a:p>
-            <a:pPr>
-              <a:buFont typeface="Wingdings" pitchFamily="2" charset="2"/>
-              <a:buChar char="§"/>
-            </a:pPr>
-            <a:r>
-              <a:rPr lang="en-US" b="1" dirty="0" smtClean="0"/>
-              <a:t>Pentru functionalitatea interfetei grafice cu utilizatorul s-au reutilizat elemente si obiecte grafice din libraria Java Swing pentru a crea interfata grafica si a reda functionalitate acesteia.</a:t>
-            </a:r>
-          </a:p>
-          <a:p>
-            <a:pPr marL="0" indent="0">
-              <a:buNone/>
-            </a:pPr>
-            <a:endParaRPr lang="en-US" dirty="0"/>
-          </a:p>
-        </p:txBody>
-      </p:sp>
-    </p:spTree>
-    <p:extLst>
-      <p:ext uri="{BB962C8B-B14F-4D97-AF65-F5344CB8AC3E}">
-        <p14:creationId xmlns:p14="http://schemas.microsoft.com/office/powerpoint/2010/main" val="4086893344"/>
-      </p:ext>
-    </p:extLst>
-  </p:cSld>
-  <p:clrMapOvr>
-    <a:masterClrMapping/>
-  </p:clrMapOvr>
-  <p:timing>
-    <p:tnLst>
-      <p:par>
-        <p:cTn id="1" dur="indefinite" restart="never" nodeType="tmRoot"/>
-      </p:par>
-    </p:tnLst>
-  </p:timing>
-</p:sld>
-</file>
-
-<file path=ppt/slides/slide4.xml><?xml version="1.0" encoding="utf-8"?>
-<p:sld xmlns:a="http://schemas.openxmlformats.org/drawingml/2006/main" xmlns:r="http://schemas.openxmlformats.org/officeDocument/2006/relationships" xmlns:p="http://schemas.openxmlformats.org/presentationml/2006/main">
-  <p:cSld>
-    <p:spTree>
-      <p:nvGrpSpPr>
-        <p:cNvPr id="1" name=""/>
-        <p:cNvGrpSpPr/>
-        <p:nvPr/>
-      </p:nvGrpSpPr>
-      <p:grpSpPr>
-        <a:xfrm>
-          <a:off x="0" y="0"/>
-          <a:ext cx="0" cy="0"/>
-          <a:chOff x="0" y="0"/>
-          <a:chExt cx="0" cy="0"/>
-        </a:xfrm>
-      </p:grpSpPr>
-      <p:sp>
-        <p:nvSpPr>
-          <p:cNvPr id="2" name="Title 1"/>
-          <p:cNvSpPr>
-            <a:spLocks noGrp="1"/>
-          </p:cNvSpPr>
-          <p:nvPr>
-            <p:ph type="title"/>
-          </p:nvPr>
-        </p:nvSpPr>
-        <p:spPr>
-          <a:xfrm>
-            <a:off x="838200" y="533400"/>
-            <a:ext cx="7467600" cy="609600"/>
-          </a:xfrm>
-        </p:spPr>
-        <p:style>
-          <a:lnRef idx="2">
-            <a:schemeClr val="accent2"/>
-          </a:lnRef>
-          <a:fillRef idx="1">
-            <a:schemeClr val="lt1"/>
-          </a:fillRef>
-          <a:effectRef idx="0">
-            <a:schemeClr val="accent2"/>
-          </a:effectRef>
-          <a:fontRef idx="minor">
-            <a:schemeClr val="dk1"/>
-          </a:fontRef>
-        </p:style>
-        <p:txBody>
-          <a:bodyPr>
-            <a:noAutofit/>
-          </a:bodyPr>
-          <a:lstStyle/>
-          <a:p>
-            <a:pPr algn="ctr"/>
-            <a:r>
-              <a:rPr lang="ro-RO" sz="3200" b="1" dirty="0" smtClean="0"/>
-              <a:t>Functionalitatile aplicatiei desktop</a:t>
-            </a:r>
-            <a:endParaRPr lang="en-US" sz="3200" b="1" dirty="0"/>
-          </a:p>
-        </p:txBody>
-      </p:sp>
-      <p:sp>
-        <p:nvSpPr>
-          <p:cNvPr id="3" name="Content Placeholder 2"/>
-          <p:cNvSpPr>
-            <a:spLocks noGrp="1"/>
-          </p:cNvSpPr>
-          <p:nvPr>
-            <p:ph idx="1"/>
-          </p:nvPr>
-        </p:nvSpPr>
-        <p:spPr>
-          <a:xfrm>
-            <a:off x="762000" y="1981200"/>
-            <a:ext cx="7620000" cy="3886200"/>
-          </a:xfrm>
-        </p:spPr>
-        <p:style>
-          <a:lnRef idx="1">
-            <a:schemeClr val="accent2"/>
-          </a:lnRef>
-          <a:fillRef idx="2">
-            <a:schemeClr val="accent2"/>
-          </a:fillRef>
-          <a:effectRef idx="1">
-            <a:schemeClr val="accent2"/>
-          </a:effectRef>
-          <a:fontRef idx="minor">
-            <a:schemeClr val="dk1"/>
-          </a:fontRef>
-        </p:style>
-        <p:txBody>
-          <a:bodyPr>
-            <a:normAutofit/>
-          </a:bodyPr>
-          <a:lstStyle/>
-          <a:p>
-            <a:pPr marL="0" indent="0">
-              <a:buNone/>
-            </a:pPr>
-            <a:r>
-              <a:rPr lang="ro-RO" b="1" dirty="0" smtClean="0"/>
-              <a:t>Aplicatia dezvoltata are la baza urmatoarele functionalitati:</a:t>
-            </a:r>
-          </a:p>
-          <a:p>
-            <a:pPr marL="0" indent="0">
-              <a:buNone/>
-            </a:pPr>
-            <a:endParaRPr lang="ro-RO" b="1" dirty="0" smtClean="0"/>
-          </a:p>
-          <a:p>
-            <a:pPr>
-              <a:buFont typeface="Wingdings" pitchFamily="2" charset="2"/>
-              <a:buChar char="§"/>
-            </a:pPr>
-            <a:r>
-              <a:rPr lang="ro-RO" b="1" dirty="0" smtClean="0"/>
-              <a:t>Inceputul jocului </a:t>
-            </a:r>
-          </a:p>
-          <a:p>
-            <a:pPr>
-              <a:buFont typeface="Wingdings" pitchFamily="2" charset="2"/>
-              <a:buChar char="§"/>
-            </a:pPr>
-            <a:r>
-              <a:rPr lang="ro-RO" b="1" dirty="0" smtClean="0"/>
-              <a:t>Setarile de configurare a culorilor pentru bile.</a:t>
-            </a:r>
-          </a:p>
-          <a:p>
-            <a:pPr>
-              <a:buFont typeface="Wingdings" pitchFamily="2" charset="2"/>
-              <a:buChar char="§"/>
-            </a:pPr>
-            <a:r>
-              <a:rPr lang="ro-RO" b="1" dirty="0" smtClean="0"/>
-              <a:t>Shooter-ul si incrementarea punctelor obtinute</a:t>
-            </a:r>
-          </a:p>
-          <a:p>
-            <a:pPr>
-              <a:buFont typeface="Wingdings" pitchFamily="2" charset="2"/>
-              <a:buChar char="§"/>
-            </a:pPr>
-            <a:r>
-              <a:rPr lang="ro-RO" b="1" dirty="0" smtClean="0"/>
-              <a:t>Salvarea scorului si al jucatorilor castigatori</a:t>
-            </a:r>
-          </a:p>
-          <a:p>
-            <a:pPr>
-              <a:buFont typeface="Wingdings" pitchFamily="2" charset="2"/>
-              <a:buChar char="§"/>
-            </a:pPr>
-            <a:r>
-              <a:rPr lang="ro-RO" b="1" dirty="0" smtClean="0"/>
-              <a:t>Oprirea jocului</a:t>
-            </a:r>
-            <a:endParaRPr lang="en-US" b="1" dirty="0"/>
-          </a:p>
-        </p:txBody>
-      </p:sp>
-    </p:spTree>
-    <p:extLst>
-      <p:ext uri="{BB962C8B-B14F-4D97-AF65-F5344CB8AC3E}">
-        <p14:creationId xmlns:p14="http://schemas.microsoft.com/office/powerpoint/2010/main" val="2460102969"/>
-      </p:ext>
-    </p:extLst>
-  </p:cSld>
-  <p:clrMapOvr>
-    <a:masterClrMapping/>
-  </p:clrMapOvr>
-  <p:timing>
-    <p:tnLst>
-      <p:par>
-        <p:cTn id="1" dur="indefinite" restart="never" nodeType="tmRoot"/>
-      </p:par>
-    </p:tnLst>
-  </p:timing>
-</p:sld>
-</file>
-
-<file path=ppt/slides/slide5.xml><?xml version="1.0" encoding="utf-8"?>
-<p:sld xmlns:a="http://schemas.openxmlformats.org/drawingml/2006/main" xmlns:r="http://schemas.openxmlformats.org/officeDocument/2006/relationships" xmlns:p="http://schemas.openxmlformats.org/presentationml/2006/main">
-  <p:cSld>
-    <p:spTree>
-      <p:nvGrpSpPr>
-        <p:cNvPr id="1" name=""/>
-        <p:cNvGrpSpPr/>
-        <p:nvPr/>
-      </p:nvGrpSpPr>
-      <p:grpSpPr>
-        <a:xfrm>
-          <a:off x="0" y="0"/>
-          <a:ext cx="0" cy="0"/>
-          <a:chOff x="0" y="0"/>
-          <a:chExt cx="0" cy="0"/>
-        </a:xfrm>
-      </p:grpSpPr>
-      <p:sp>
-        <p:nvSpPr>
-          <p:cNvPr id="2" name="Title 1"/>
-          <p:cNvSpPr>
-            <a:spLocks noGrp="1"/>
-          </p:cNvSpPr>
-          <p:nvPr>
-            <p:ph type="title"/>
-          </p:nvPr>
-        </p:nvSpPr>
-        <p:spPr>
-          <a:xfrm>
-            <a:off x="838200" y="457200"/>
-            <a:ext cx="7467600" cy="762000"/>
-          </a:xfrm>
-        </p:spPr>
-        <p:style>
-          <a:lnRef idx="2">
-            <a:schemeClr val="accent2"/>
-          </a:lnRef>
-          <a:fillRef idx="1">
-            <a:schemeClr val="lt1"/>
-          </a:fillRef>
-          <a:effectRef idx="0">
-            <a:schemeClr val="accent2"/>
-          </a:effectRef>
-          <a:fontRef idx="minor">
-            <a:schemeClr val="dk1"/>
-          </a:fontRef>
-        </p:style>
-        <p:txBody>
-          <a:bodyPr>
-            <a:normAutofit/>
-          </a:bodyPr>
-          <a:lstStyle/>
-          <a:p>
-            <a:pPr algn="ctr"/>
-            <a:r>
-              <a:rPr lang="ro-RO" sz="3600" b="1" dirty="0" smtClean="0"/>
-              <a:t>Functionalitatea de incepere a jocului</a:t>
-            </a:r>
-            <a:endParaRPr lang="en-US" sz="3600" b="1" dirty="0"/>
-          </a:p>
-        </p:txBody>
-      </p:sp>
-      <p:pic>
-        <p:nvPicPr>
-          <p:cNvPr id="1026" name="Picture 2"/>
-          <p:cNvPicPr>
-            <a:picLocks noGrp="1" noChangeAspect="1" noChangeArrowheads="1"/>
-          </p:cNvPicPr>
-          <p:nvPr>
-            <p:ph idx="1"/>
-          </p:nvPr>
-        </p:nvPicPr>
-        <p:blipFill>
-          <a:blip r:embed="rId2">
+          <a:blip r:embed="rId3">
             <a:extLst>
               <a:ext uri="{28A0092B-C50C-407E-A947-70E740481C1C}">
                 <a14:useLocalDpi xmlns:a14="http://schemas.microsoft.com/office/drawing/2010/main" val="0"/>
@@ -5486,8 +4718,8 @@
         </p:blipFill>
         <p:spPr bwMode="auto">
           <a:xfrm>
-            <a:off x="4343400" y="1524000"/>
-            <a:ext cx="3996244" cy="3223533"/>
+            <a:off x="990600" y="4572000"/>
+            <a:ext cx="3689056" cy="1120776"/>
           </a:xfrm>
           <a:prstGeom prst="rect">
             <a:avLst/>
@@ -5529,14 +4761,14 @@
       </p:pic>
       <p:sp>
         <p:nvSpPr>
-          <p:cNvPr id="4" name="TextBox 3"/>
-          <p:cNvSpPr txBox="1"/>
+          <p:cNvPr id="10" name="Rectangle 9"/>
+          <p:cNvSpPr/>
           <p:nvPr/>
         </p:nvSpPr>
         <p:spPr>
           <a:xfrm>
-            <a:off x="925606" y="1524000"/>
-            <a:ext cx="3200400" cy="2246769"/>
+            <a:off x="956072" y="5715000"/>
+            <a:ext cx="3723584" cy="369332"/>
           </a:xfrm>
           <a:prstGeom prst="rect">
             <a:avLst/>
@@ -5557,31 +4789,335 @@
           </a:fontRef>
         </p:style>
         <p:txBody>
+          <a:bodyPr wrap="none">
+            <a:spAutoFit/>
+          </a:bodyPr>
+          <a:lstStyle/>
+          <a:p>
+            <a:pPr algn="ctr"/>
+            <a:r>
+              <a:rPr lang="ro-RO" b="1" dirty="0"/>
+              <a:t>Initializarea butonului de </a:t>
+            </a:r>
+            <a:r>
+              <a:rPr lang="ro-RO" b="1" dirty="0" smtClean="0"/>
+              <a:t>Stop Game</a:t>
+            </a:r>
+            <a:endParaRPr lang="en-US" b="1" dirty="0"/>
+          </a:p>
+        </p:txBody>
+      </p:sp>
+    </p:spTree>
+    <p:extLst>
+      <p:ext uri="{BB962C8B-B14F-4D97-AF65-F5344CB8AC3E}">
+        <p14:creationId xmlns:p14="http://schemas.microsoft.com/office/powerpoint/2010/main" val="1839665857"/>
+      </p:ext>
+    </p:extLst>
+  </p:cSld>
+  <p:clrMapOvr>
+    <a:masterClrMapping/>
+  </p:clrMapOvr>
+</p:sld>
+</file>
+
+<file path=ppt/slides/slide14.xml><?xml version="1.0" encoding="utf-8"?>
+<p:sld xmlns:a="http://schemas.openxmlformats.org/drawingml/2006/main" xmlns:r="http://schemas.openxmlformats.org/officeDocument/2006/relationships" xmlns:p="http://schemas.openxmlformats.org/presentationml/2006/main">
+  <p:cSld>
+    <p:spTree>
+      <p:nvGrpSpPr>
+        <p:cNvPr id="1" name=""/>
+        <p:cNvGrpSpPr/>
+        <p:nvPr/>
+      </p:nvGrpSpPr>
+      <p:grpSpPr>
+        <a:xfrm>
+          <a:off x="0" y="0"/>
+          <a:ext cx="0" cy="0"/>
+          <a:chOff x="0" y="0"/>
+          <a:chExt cx="0" cy="0"/>
+        </a:xfrm>
+      </p:grpSpPr>
+      <p:sp>
+        <p:nvSpPr>
+          <p:cNvPr id="2" name="Title 1"/>
+          <p:cNvSpPr>
+            <a:spLocks noGrp="1"/>
+          </p:cNvSpPr>
+          <p:nvPr>
+            <p:ph type="title"/>
+          </p:nvPr>
+        </p:nvSpPr>
+        <p:spPr>
+          <a:xfrm>
+            <a:off x="990600" y="2819400"/>
+            <a:ext cx="7162800" cy="838200"/>
+          </a:xfrm>
+        </p:spPr>
+        <p:style>
+          <a:lnRef idx="2">
+            <a:schemeClr val="accent2"/>
+          </a:lnRef>
+          <a:fillRef idx="1">
+            <a:schemeClr val="lt1"/>
+          </a:fillRef>
+          <a:effectRef idx="0">
+            <a:schemeClr val="accent2"/>
+          </a:effectRef>
+          <a:fontRef idx="minor">
+            <a:schemeClr val="dk1"/>
+          </a:fontRef>
+        </p:style>
+        <p:txBody>
+          <a:bodyPr>
+            <a:normAutofit/>
+          </a:bodyPr>
+          <a:lstStyle/>
+          <a:p>
+            <a:pPr algn="ctr"/>
+            <a:r>
+              <a:rPr lang="en-US" sz="4000" b="1" dirty="0" smtClean="0"/>
+              <a:t>Cuprins -&gt; Assignment 2</a:t>
+            </a:r>
+            <a:endParaRPr lang="en-US" sz="4000" b="1" dirty="0"/>
+          </a:p>
+        </p:txBody>
+      </p:sp>
+    </p:spTree>
+    <p:extLst>
+      <p:ext uri="{BB962C8B-B14F-4D97-AF65-F5344CB8AC3E}">
+        <p14:creationId xmlns:p14="http://schemas.microsoft.com/office/powerpoint/2010/main" val="2692009152"/>
+      </p:ext>
+    </p:extLst>
+  </p:cSld>
+  <p:clrMapOvr>
+    <a:masterClrMapping/>
+  </p:clrMapOvr>
+</p:sld>
+</file>
+
+<file path=ppt/slides/slide15.xml><?xml version="1.0" encoding="utf-8"?>
+<p:sld xmlns:a="http://schemas.openxmlformats.org/drawingml/2006/main" xmlns:r="http://schemas.openxmlformats.org/officeDocument/2006/relationships" xmlns:p="http://schemas.openxmlformats.org/presentationml/2006/main">
+  <p:cSld>
+    <p:spTree>
+      <p:nvGrpSpPr>
+        <p:cNvPr id="1" name=""/>
+        <p:cNvGrpSpPr/>
+        <p:nvPr/>
+      </p:nvGrpSpPr>
+      <p:grpSpPr>
+        <a:xfrm>
+          <a:off x="0" y="0"/>
+          <a:ext cx="0" cy="0"/>
+          <a:chOff x="0" y="0"/>
+          <a:chExt cx="0" cy="0"/>
+        </a:xfrm>
+      </p:grpSpPr>
+      <p:sp>
+        <p:nvSpPr>
+          <p:cNvPr id="2" name="Title 1"/>
+          <p:cNvSpPr>
+            <a:spLocks noGrp="1"/>
+          </p:cNvSpPr>
+          <p:nvPr>
+            <p:ph type="title"/>
+          </p:nvPr>
+        </p:nvSpPr>
+        <p:spPr>
+          <a:xfrm>
+            <a:off x="762000" y="457200"/>
+            <a:ext cx="7543800" cy="533400"/>
+          </a:xfrm>
+        </p:spPr>
+        <p:style>
+          <a:lnRef idx="2">
+            <a:schemeClr val="accent1"/>
+          </a:lnRef>
+          <a:fillRef idx="1">
+            <a:schemeClr val="lt1"/>
+          </a:fillRef>
+          <a:effectRef idx="0">
+            <a:schemeClr val="accent1"/>
+          </a:effectRef>
+          <a:fontRef idx="minor">
+            <a:schemeClr val="dk1"/>
+          </a:fontRef>
+        </p:style>
+        <p:txBody>
+          <a:bodyPr>
+            <a:noAutofit/>
+          </a:bodyPr>
+          <a:lstStyle/>
+          <a:p>
+            <a:pPr algn="ctr"/>
+            <a:r>
+              <a:rPr lang="en-US" sz="2800" b="1" dirty="0">
+                <a:latin typeface="+mn-lt"/>
+              </a:rPr>
+              <a:t>Legatura </a:t>
+            </a:r>
+            <a:r>
+              <a:rPr lang="ro-RO" sz="2800" b="1" dirty="0" smtClean="0">
+                <a:latin typeface="+mn-lt"/>
+              </a:rPr>
+              <a:t>dintre PC </a:t>
+            </a:r>
+            <a:r>
+              <a:rPr lang="en-US" sz="2800" b="1" dirty="0" smtClean="0">
+                <a:latin typeface="+mn-lt"/>
+              </a:rPr>
+              <a:t>cu </a:t>
+            </a:r>
+            <a:r>
+              <a:rPr lang="en-US" sz="2800" b="1" dirty="0">
+                <a:latin typeface="+mn-lt"/>
+              </a:rPr>
+              <a:t>un controller </a:t>
+            </a:r>
+            <a:r>
+              <a:rPr lang="en-US" sz="2800" b="1" dirty="0" smtClean="0">
+                <a:latin typeface="+mn-lt"/>
+              </a:rPr>
+              <a:t>extern</a:t>
+            </a:r>
+            <a:endParaRPr lang="en-US" sz="2800" b="1" dirty="0">
+              <a:latin typeface="+mn-lt"/>
+            </a:endParaRPr>
+          </a:p>
+        </p:txBody>
+      </p:sp>
+      <p:pic>
+        <p:nvPicPr>
+          <p:cNvPr id="6" name="Content Placeholder 5"/>
+          <p:cNvPicPr>
+            <a:picLocks noGrp="1" noChangeAspect="1"/>
+          </p:cNvPicPr>
+          <p:nvPr>
+            <p:ph sz="half" idx="2"/>
+          </p:nvPr>
+        </p:nvPicPr>
+        <p:blipFill>
+          <a:blip r:embed="rId2" cstate="print">
+            <a:extLst>
+              <a:ext uri="{28A0092B-C50C-407E-A947-70E740481C1C}">
+                <a14:useLocalDpi xmlns:a14="http://schemas.microsoft.com/office/drawing/2010/main" val="0"/>
+              </a:ext>
+            </a:extLst>
+          </a:blip>
+          <a:stretch>
+            <a:fillRect/>
+          </a:stretch>
+        </p:blipFill>
+        <p:spPr>
+          <a:xfrm>
+            <a:off x="6172200" y="1371600"/>
+            <a:ext cx="2119015" cy="3767138"/>
+          </a:xfrm>
+        </p:spPr>
+      </p:pic>
+      <p:sp>
+        <p:nvSpPr>
+          <p:cNvPr id="11" name="TextBox 10"/>
+          <p:cNvSpPr txBox="1"/>
+          <p:nvPr/>
+        </p:nvSpPr>
+        <p:spPr>
+          <a:xfrm>
+            <a:off x="762000" y="1371600"/>
+            <a:ext cx="5257800" cy="1200329"/>
+          </a:xfrm>
+          <a:prstGeom prst="rect">
+            <a:avLst/>
+          </a:prstGeom>
+        </p:spPr>
+        <p:style>
+          <a:lnRef idx="1">
+            <a:schemeClr val="accent2"/>
+          </a:lnRef>
+          <a:fillRef idx="2">
+            <a:schemeClr val="accent2"/>
+          </a:fillRef>
+          <a:effectRef idx="1">
+            <a:schemeClr val="accent2"/>
+          </a:effectRef>
+          <a:fontRef idx="minor">
+            <a:schemeClr val="dk1"/>
+          </a:fontRef>
+        </p:style>
+        <p:txBody>
           <a:bodyPr wrap="square" rtlCol="0">
             <a:spAutoFit/>
           </a:bodyPr>
           <a:lstStyle/>
           <a:p>
             <a:r>
-              <a:rPr lang="ro-RO" sz="2000" b="1" dirty="0" smtClean="0"/>
-              <a:t>Pagina principala a aplicatiei este reprezentata in imaginea alaturata:</a:t>
-            </a:r>
-          </a:p>
-          <a:p>
-            <a:endParaRPr lang="ro-RO" sz="2000" b="1" dirty="0"/>
-          </a:p>
-          <a:p>
-            <a:r>
-              <a:rPr lang="ro-RO" sz="2000" b="1" dirty="0" smtClean="0"/>
-              <a:t>Pentru a incepe un joc nou utilizatorul va apasa pe butonul New Game.</a:t>
-            </a:r>
-            <a:endParaRPr lang="en-US" sz="2000" b="1" dirty="0"/>
+              <a:rPr lang="ro-RO" b="1" dirty="0"/>
+              <a:t>Legatura interfetei grafice cu controller-ul extern se face via </a:t>
+            </a:r>
+            <a:r>
+              <a:rPr lang="en-US" b="1" dirty="0">
+                <a:solidFill>
+                  <a:srgbClr val="FF0000"/>
+                </a:solidFill>
+              </a:rPr>
+              <a:t>U</a:t>
+            </a:r>
+            <a:r>
+              <a:rPr lang="en-US" b="1" dirty="0"/>
+              <a:t>niversal </a:t>
+            </a:r>
+            <a:r>
+              <a:rPr lang="en-US" b="1" dirty="0">
+                <a:solidFill>
+                  <a:srgbClr val="FF0000"/>
+                </a:solidFill>
+              </a:rPr>
+              <a:t>S</a:t>
+            </a:r>
+            <a:r>
+              <a:rPr lang="en-US" b="1" dirty="0"/>
+              <a:t>erial </a:t>
+            </a:r>
+            <a:r>
+              <a:rPr lang="en-US" b="1" dirty="0">
+                <a:solidFill>
+                  <a:srgbClr val="FF0000"/>
+                </a:solidFill>
+              </a:rPr>
+              <a:t>B</a:t>
+            </a:r>
+            <a:r>
+              <a:rPr lang="en-US" b="1" dirty="0"/>
+              <a:t>us 3.0</a:t>
+            </a:r>
+            <a:r>
+              <a:rPr lang="ro-RO" b="1" dirty="0" smtClean="0"/>
+              <a:t>, </a:t>
+            </a:r>
+            <a:r>
+              <a:rPr lang="ro-RO" b="1" dirty="0"/>
+              <a:t>acesta </a:t>
+            </a:r>
+            <a:r>
+              <a:rPr lang="ro-RO" b="1" dirty="0" smtClean="0"/>
+              <a:t>arata </a:t>
+            </a:r>
+            <a:r>
+              <a:rPr lang="ro-RO" b="1" dirty="0"/>
+              <a:t>ca in figura alaturata</a:t>
+            </a:r>
+            <a:r>
+              <a:rPr lang="ro-RO" b="1" dirty="0" smtClean="0"/>
+              <a:t>.</a:t>
+            </a:r>
+          </a:p>
+          <a:p>
+            <a:endParaRPr lang="en-US" b="1" dirty="0"/>
           </a:p>
         </p:txBody>
       </p:sp>
       <p:pic>
         <p:nvPicPr>
-          <p:cNvPr id="1027" name="Picture 3"/>
+          <p:cNvPr id="1026" name="Picture 2"/>
           <p:cNvPicPr>
             <a:picLocks noChangeAspect="1" noChangeArrowheads="1"/>
           </p:cNvPicPr>
@@ -5602,8 +5138,8 @@
         </p:blipFill>
         <p:spPr bwMode="auto">
           <a:xfrm>
-            <a:off x="925606" y="4724400"/>
-            <a:ext cx="3364006" cy="815975"/>
+            <a:off x="769272" y="2967317"/>
+            <a:ext cx="5252769" cy="3048000"/>
           </a:xfrm>
           <a:prstGeom prst="rect">
             <a:avLst/>
@@ -5645,14 +5181,14 @@
       </p:pic>
       <p:sp>
         <p:nvSpPr>
-          <p:cNvPr id="5" name="TextBox 4"/>
+          <p:cNvPr id="13" name="TextBox 12"/>
           <p:cNvSpPr txBox="1"/>
           <p:nvPr/>
         </p:nvSpPr>
         <p:spPr>
           <a:xfrm>
-            <a:off x="925606" y="5638800"/>
-            <a:ext cx="3733800" cy="369332"/>
+            <a:off x="6172200" y="5725777"/>
+            <a:ext cx="2133600" cy="276999"/>
           </a:xfrm>
           <a:prstGeom prst="rect">
             <a:avLst/>
@@ -5678,36 +5214,28 @@
           </a:bodyPr>
           <a:lstStyle/>
           <a:p>
-            <a:pPr algn="ctr"/>
-            <a:r>
-              <a:rPr lang="ro-RO" b="1" dirty="0" smtClean="0"/>
-              <a:t>Initializarea butonului de New Game</a:t>
-            </a:r>
-            <a:endParaRPr lang="en-US" b="1" dirty="0"/>
+            <a:r>
+              <a:rPr lang="ro-RO" sz="1200" b="1" dirty="0" smtClean="0"/>
+              <a:t>Cod pentru reactiile de baza</a:t>
+            </a:r>
+            <a:endParaRPr lang="en-US" sz="1200" b="1" dirty="0"/>
           </a:p>
         </p:txBody>
       </p:sp>
     </p:spTree>
     <p:extLst>
       <p:ext uri="{BB962C8B-B14F-4D97-AF65-F5344CB8AC3E}">
-        <p14:creationId xmlns:p14="http://schemas.microsoft.com/office/powerpoint/2010/main" val="3551194238"/>
+        <p14:creationId xmlns:p14="http://schemas.microsoft.com/office/powerpoint/2010/main" val="3827987516"/>
       </p:ext>
     </p:extLst>
   </p:cSld>
   <p:clrMapOvr>
     <a:masterClrMapping/>
   </p:clrMapOvr>
-  <p:timing>
-    <p:tnLst>
-      <p:par>
-        <p:cTn id="1" dur="indefinite" restart="never" nodeType="tmRoot"/>
-      </p:par>
-    </p:tnLst>
-  </p:timing>
 </p:sld>
 </file>
 
-<file path=ppt/slides/slide6.xml><?xml version="1.0" encoding="utf-8"?>
+<file path=ppt/slides/slide16.xml><?xml version="1.0" encoding="utf-8"?>
 <p:sld xmlns:a="http://schemas.openxmlformats.org/drawingml/2006/main" xmlns:r="http://schemas.openxmlformats.org/officeDocument/2006/relationships" xmlns:p="http://schemas.openxmlformats.org/presentationml/2006/main">
   <p:cSld>
     <p:spTree>
@@ -5736,8 +5264,8 @@
         </p:nvSpPr>
         <p:spPr>
           <a:xfrm>
-            <a:off x="762000" y="457200"/>
-            <a:ext cx="7543800" cy="1066800"/>
+            <a:off x="838200" y="2590800"/>
+            <a:ext cx="7239000" cy="838200"/>
           </a:xfrm>
         </p:spPr>
         <p:style>
@@ -5756,46 +5284,492 @@
         </p:style>
         <p:txBody>
           <a:bodyPr>
-            <a:noAutofit/>
+            <a:normAutofit/>
           </a:bodyPr>
           <a:lstStyle/>
           <a:p>
             <a:pPr algn="ctr"/>
             <a:r>
-              <a:rPr lang="ro-RO" sz="2800" b="1" dirty="0" smtClean="0"/>
-              <a:t>Functionalitatea de configurare a culorilor pentru bile – Partea 1</a:t>
-            </a:r>
-            <a:endParaRPr lang="en-US" sz="2800" b="1" dirty="0"/>
+              <a:rPr lang="en-US" sz="4000" b="1" dirty="0" smtClean="0"/>
+              <a:t>Cuprins -&gt; Assignment 3</a:t>
+            </a:r>
+            <a:endParaRPr lang="en-US" sz="4000" b="1" dirty="0"/>
+          </a:p>
+        </p:txBody>
+      </p:sp>
+    </p:spTree>
+    <p:extLst>
+      <p:ext uri="{BB962C8B-B14F-4D97-AF65-F5344CB8AC3E}">
+        <p14:creationId xmlns:p14="http://schemas.microsoft.com/office/powerpoint/2010/main" val="2726170965"/>
+      </p:ext>
+    </p:extLst>
+  </p:cSld>
+  <p:clrMapOvr>
+    <a:masterClrMapping/>
+  </p:clrMapOvr>
+</p:sld>
+</file>
+
+<file path=ppt/slides/slide17.xml><?xml version="1.0" encoding="utf-8"?>
+<p:sld xmlns:a="http://schemas.openxmlformats.org/drawingml/2006/main" xmlns:r="http://schemas.openxmlformats.org/officeDocument/2006/relationships" xmlns:p="http://schemas.openxmlformats.org/presentationml/2006/main">
+  <p:cSld>
+    <p:spTree>
+      <p:nvGrpSpPr>
+        <p:cNvPr id="1" name=""/>
+        <p:cNvGrpSpPr/>
+        <p:nvPr/>
+      </p:nvGrpSpPr>
+      <p:grpSpPr>
+        <a:xfrm>
+          <a:off x="0" y="0"/>
+          <a:ext cx="0" cy="0"/>
+          <a:chOff x="0" y="0"/>
+          <a:chExt cx="0" cy="0"/>
+        </a:xfrm>
+      </p:grpSpPr>
+      <p:sp>
+        <p:nvSpPr>
+          <p:cNvPr id="2" name="Title 1"/>
+          <p:cNvSpPr>
+            <a:spLocks noGrp="1"/>
+          </p:cNvSpPr>
+          <p:nvPr>
+            <p:ph type="title"/>
+          </p:nvPr>
+        </p:nvSpPr>
+        <p:spPr>
+          <a:xfrm>
+            <a:off x="762000" y="457200"/>
+            <a:ext cx="7543800" cy="533400"/>
+          </a:xfrm>
+          <a:ln/>
+        </p:spPr>
+        <p:style>
+          <a:lnRef idx="2">
+            <a:schemeClr val="accent2"/>
+          </a:lnRef>
+          <a:fillRef idx="1">
+            <a:schemeClr val="lt1"/>
+          </a:fillRef>
+          <a:effectRef idx="0">
+            <a:schemeClr val="accent2"/>
+          </a:effectRef>
+          <a:fontRef idx="minor">
+            <a:schemeClr val="dk1"/>
+          </a:fontRef>
+        </p:style>
+        <p:txBody>
+          <a:bodyPr>
+            <a:normAutofit/>
+          </a:bodyPr>
+          <a:lstStyle/>
+          <a:p>
+            <a:pPr algn="ctr"/>
+            <a:r>
+              <a:rPr lang="en-US" sz="2800" b="1" dirty="0" smtClean="0">
+                <a:latin typeface="+mn-lt"/>
+              </a:rPr>
+              <a:t>Specificatii tehnice despre </a:t>
+            </a:r>
+            <a:r>
+              <a:rPr lang="en-US" sz="2800" b="1" dirty="0" smtClean="0">
+                <a:latin typeface="+mn-lt"/>
+                <a:hlinkClick r:id="rId2"/>
+              </a:rPr>
+              <a:t>Joystick</a:t>
+            </a:r>
+            <a:endParaRPr lang="en-US" sz="2800" b="1" dirty="0">
+              <a:latin typeface="+mn-lt"/>
+            </a:endParaRPr>
           </a:p>
         </p:txBody>
       </p:sp>
       <p:pic>
         <p:nvPicPr>
-          <p:cNvPr id="1027" name="Picture 3"/>
+          <p:cNvPr id="5" name="Content Placeholder 4"/>
           <p:cNvPicPr>
-            <a:picLocks noGrp="1" noChangeAspect="1" noChangeArrowheads="1"/>
+            <a:picLocks noGrp="1" noChangeAspect="1"/>
           </p:cNvPicPr>
           <p:nvPr>
             <p:ph sz="half" idx="2"/>
           </p:nvPr>
         </p:nvPicPr>
-        <p:blipFill>
-          <a:blip r:embed="rId2">
+        <p:blipFill rotWithShape="1">
+          <a:blip r:embed="rId3" cstate="print">
             <a:extLst>
               <a:ext uri="{28A0092B-C50C-407E-A947-70E740481C1C}">
                 <a14:useLocalDpi xmlns:a14="http://schemas.microsoft.com/office/drawing/2010/main" val="0"/>
               </a:ext>
             </a:extLst>
           </a:blip>
-          <a:srcRect/>
-          <a:stretch>
-            <a:fillRect/>
-          </a:stretch>
+          <a:srcRect t="28794"/>
+          <a:stretch/>
+        </p:blipFill>
+        <p:spPr>
+          <a:xfrm>
+            <a:off x="5334000" y="1371600"/>
+            <a:ext cx="2963733" cy="3733800"/>
+          </a:xfrm>
+        </p:spPr>
+      </p:pic>
+      <p:sp>
+        <p:nvSpPr>
+          <p:cNvPr id="10" name="TextBox 9"/>
+          <p:cNvSpPr txBox="1"/>
+          <p:nvPr/>
+        </p:nvSpPr>
+        <p:spPr>
+          <a:xfrm flipH="1">
+            <a:off x="762000" y="1524000"/>
+            <a:ext cx="4419600" cy="4247317"/>
+          </a:xfrm>
+          <a:prstGeom prst="rect">
+            <a:avLst/>
+          </a:prstGeom>
+        </p:spPr>
+        <p:style>
+          <a:lnRef idx="1">
+            <a:schemeClr val="accent2"/>
+          </a:lnRef>
+          <a:fillRef idx="2">
+            <a:schemeClr val="accent2"/>
+          </a:fillRef>
+          <a:effectRef idx="1">
+            <a:schemeClr val="accent2"/>
+          </a:effectRef>
+          <a:fontRef idx="minor">
+            <a:schemeClr val="dk1"/>
+          </a:fontRef>
+        </p:style>
+        <p:txBody>
+          <a:bodyPr wrap="square" rtlCol="0">
+            <a:spAutoFit/>
+          </a:bodyPr>
+          <a:lstStyle/>
+          <a:p>
+            <a:r>
+              <a:rPr lang="en-US" b="1" dirty="0" smtClean="0">
+                <a:solidFill>
+                  <a:srgbClr val="FF0000"/>
+                </a:solidFill>
+              </a:rPr>
+              <a:t>Tip produs: </a:t>
+            </a:r>
+            <a:r>
+              <a:rPr lang="en-US" b="1" dirty="0" smtClean="0"/>
+              <a:t>Controller Myria</a:t>
+            </a:r>
+          </a:p>
+          <a:p>
+            <a:r>
+              <a:rPr lang="en-US" b="1" dirty="0" smtClean="0">
+                <a:solidFill>
+                  <a:srgbClr val="FF0000"/>
+                </a:solidFill>
+              </a:rPr>
+              <a:t>Compatibilitate: </a:t>
+            </a:r>
+            <a:r>
+              <a:rPr lang="en-US" b="1" dirty="0" smtClean="0"/>
+              <a:t>PC, Android, PS3.</a:t>
+            </a:r>
+          </a:p>
+          <a:p>
+            <a:r>
+              <a:rPr lang="en-US" b="1" dirty="0" smtClean="0">
+                <a:solidFill>
+                  <a:srgbClr val="FF0000"/>
+                </a:solidFill>
+              </a:rPr>
+              <a:t>Model: </a:t>
+            </a:r>
+            <a:r>
+              <a:rPr lang="en-US" b="1" dirty="0" smtClean="0"/>
+              <a:t>MG7413 TIBER X13.</a:t>
+            </a:r>
+          </a:p>
+          <a:p>
+            <a:r>
+              <a:rPr lang="en-US" b="1" dirty="0" smtClean="0">
+                <a:solidFill>
+                  <a:srgbClr val="FF0000"/>
+                </a:solidFill>
+              </a:rPr>
+              <a:t>Conectivitate: </a:t>
+            </a:r>
+            <a:r>
+              <a:rPr lang="en-US" b="1" dirty="0" smtClean="0"/>
+              <a:t>cu fir.</a:t>
+            </a:r>
+          </a:p>
+          <a:p>
+            <a:r>
+              <a:rPr lang="en-US" b="1" dirty="0" smtClean="0">
+                <a:solidFill>
+                  <a:srgbClr val="FF0000"/>
+                </a:solidFill>
+              </a:rPr>
+              <a:t>Interfata: </a:t>
+            </a:r>
+            <a:r>
+              <a:rPr lang="en-US" b="1" dirty="0" smtClean="0"/>
+              <a:t>USB tip 3.0.</a:t>
+            </a:r>
+          </a:p>
+          <a:p>
+            <a:r>
+              <a:rPr lang="en-US" b="1" dirty="0" smtClean="0">
+                <a:solidFill>
+                  <a:srgbClr val="FF0000"/>
+                </a:solidFill>
+              </a:rPr>
+              <a:t>Senzori: </a:t>
+            </a:r>
+            <a:r>
+              <a:rPr lang="en-US" b="1" dirty="0" smtClean="0"/>
+              <a:t>Double Shock.</a:t>
+            </a:r>
+          </a:p>
+          <a:p>
+            <a:r>
+              <a:rPr lang="en-US" b="1" dirty="0" smtClean="0">
+                <a:solidFill>
+                  <a:srgbClr val="FF0000"/>
+                </a:solidFill>
+              </a:rPr>
+              <a:t>Pad: </a:t>
+            </a:r>
+            <a:r>
+              <a:rPr lang="en-US" b="1" dirty="0" smtClean="0"/>
+              <a:t>D-pad de precizie.</a:t>
+            </a:r>
+          </a:p>
+          <a:p>
+            <a:r>
+              <a:rPr lang="en-US" b="1" dirty="0" smtClean="0">
+                <a:solidFill>
+                  <a:srgbClr val="FF0000"/>
+                </a:solidFill>
+              </a:rPr>
+              <a:t>Butoane: </a:t>
+            </a:r>
+            <a:r>
+              <a:rPr lang="en-US" b="1" dirty="0" smtClean="0"/>
+              <a:t>stick-uri analogice.</a:t>
+            </a:r>
+          </a:p>
+          <a:p>
+            <a:r>
+              <a:rPr lang="en-US" b="1" dirty="0" smtClean="0">
+                <a:solidFill>
+                  <a:srgbClr val="FF0000"/>
+                </a:solidFill>
+              </a:rPr>
+              <a:t>Numar butoane: </a:t>
+            </a:r>
+            <a:r>
+              <a:rPr lang="en-US" b="1" dirty="0" smtClean="0"/>
+              <a:t>10.</a:t>
+            </a:r>
+          </a:p>
+          <a:p>
+            <a:r>
+              <a:rPr lang="en-US" b="1" dirty="0" smtClean="0">
+                <a:solidFill>
+                  <a:srgbClr val="FF0000"/>
+                </a:solidFill>
+              </a:rPr>
+              <a:t>Alimentare: </a:t>
+            </a:r>
+            <a:r>
+              <a:rPr lang="en-US" b="1" dirty="0" smtClean="0"/>
+              <a:t>via USB.</a:t>
+            </a:r>
+          </a:p>
+          <a:p>
+            <a:r>
+              <a:rPr lang="en-US" b="1" dirty="0" smtClean="0">
+                <a:solidFill>
+                  <a:srgbClr val="FF0000"/>
+                </a:solidFill>
+              </a:rPr>
+              <a:t>Facilitati: </a:t>
+            </a:r>
+            <a:r>
+              <a:rPr lang="en-US" b="1" dirty="0" smtClean="0"/>
+              <a:t>Plug and Play.</a:t>
+            </a:r>
+          </a:p>
+          <a:p>
+            <a:r>
+              <a:rPr lang="en-US" b="1" dirty="0" smtClean="0">
+                <a:solidFill>
+                  <a:srgbClr val="FF0000"/>
+                </a:solidFill>
+              </a:rPr>
+              <a:t>Greutate: </a:t>
+            </a:r>
+            <a:r>
+              <a:rPr lang="en-US" b="1" dirty="0" smtClean="0"/>
+              <a:t>0.245 (Kg).</a:t>
+            </a:r>
+          </a:p>
+          <a:p>
+            <a:r>
+              <a:rPr lang="en-US" b="1" dirty="0" smtClean="0">
+                <a:solidFill>
+                  <a:srgbClr val="FF0000"/>
+                </a:solidFill>
+              </a:rPr>
+              <a:t>Culoare: </a:t>
+            </a:r>
+            <a:r>
+              <a:rPr lang="en-US" b="1" dirty="0" smtClean="0"/>
+              <a:t>Negru cu verde.</a:t>
+            </a:r>
+          </a:p>
+          <a:p>
+            <a:r>
+              <a:rPr lang="en-US" b="1" dirty="0" smtClean="0">
+                <a:solidFill>
+                  <a:srgbClr val="FF0000"/>
+                </a:solidFill>
+              </a:rPr>
+              <a:t>Lungime cablu: </a:t>
+            </a:r>
+            <a:r>
+              <a:rPr lang="en-US" b="1" dirty="0" smtClean="0"/>
+              <a:t>1.8 (m).</a:t>
+            </a:r>
+          </a:p>
+          <a:p>
+            <a:r>
+              <a:rPr lang="en-US" b="1" dirty="0" smtClean="0">
+                <a:solidFill>
+                  <a:srgbClr val="FF0000"/>
+                </a:solidFill>
+              </a:rPr>
+              <a:t>Dimensiuni: </a:t>
+            </a:r>
+            <a:r>
+              <a:rPr lang="en-US" b="1" dirty="0" smtClean="0"/>
+              <a:t>15.5 x 10.5 x 6.3 ( L x A x I cm).</a:t>
+            </a:r>
+            <a:endParaRPr lang="en-US" b="1" dirty="0"/>
+          </a:p>
+        </p:txBody>
+      </p:sp>
+    </p:spTree>
+    <p:extLst>
+      <p:ext uri="{BB962C8B-B14F-4D97-AF65-F5344CB8AC3E}">
+        <p14:creationId xmlns:p14="http://schemas.microsoft.com/office/powerpoint/2010/main" val="1485340076"/>
+      </p:ext>
+    </p:extLst>
+  </p:cSld>
+  <p:clrMapOvr>
+    <a:masterClrMapping/>
+  </p:clrMapOvr>
+</p:sld>
+</file>
+
+<file path=ppt/slides/slide18.xml><?xml version="1.0" encoding="utf-8"?>
+<p:sld xmlns:a="http://schemas.openxmlformats.org/drawingml/2006/main" xmlns:r="http://schemas.openxmlformats.org/officeDocument/2006/relationships" xmlns:p="http://schemas.openxmlformats.org/presentationml/2006/main">
+  <p:cSld>
+    <p:spTree>
+      <p:nvGrpSpPr>
+        <p:cNvPr id="1" name=""/>
+        <p:cNvGrpSpPr/>
+        <p:nvPr/>
+      </p:nvGrpSpPr>
+      <p:grpSpPr>
+        <a:xfrm>
+          <a:off x="0" y="0"/>
+          <a:ext cx="0" cy="0"/>
+          <a:chOff x="0" y="0"/>
+          <a:chExt cx="0" cy="0"/>
+        </a:xfrm>
+      </p:grpSpPr>
+      <p:sp>
+        <p:nvSpPr>
+          <p:cNvPr id="2" name="Title 1"/>
+          <p:cNvSpPr>
+            <a:spLocks noGrp="1"/>
+          </p:cNvSpPr>
+          <p:nvPr>
+            <p:ph type="title"/>
+          </p:nvPr>
+        </p:nvSpPr>
+        <p:spPr>
+          <a:xfrm>
+            <a:off x="762000" y="533400"/>
+            <a:ext cx="7543800" cy="533400"/>
+          </a:xfrm>
+        </p:spPr>
+        <p:style>
+          <a:lnRef idx="2">
+            <a:schemeClr val="accent2"/>
+          </a:lnRef>
+          <a:fillRef idx="1">
+            <a:schemeClr val="lt1"/>
+          </a:fillRef>
+          <a:effectRef idx="0">
+            <a:schemeClr val="accent2"/>
+          </a:effectRef>
+          <a:fontRef idx="minor">
+            <a:schemeClr val="dk1"/>
+          </a:fontRef>
+        </p:style>
+        <p:txBody>
+          <a:bodyPr>
+            <a:normAutofit/>
+          </a:bodyPr>
+          <a:lstStyle/>
+          <a:p>
+            <a:pPr algn="ctr"/>
+            <a:r>
+              <a:rPr lang="en-US" sz="2800" b="1" dirty="0" smtClean="0">
+                <a:latin typeface="+mn-lt"/>
+                <a:hlinkClick r:id="rId2"/>
+              </a:rPr>
+              <a:t>Conectarea </a:t>
+            </a:r>
+            <a:r>
+              <a:rPr lang="en-US" sz="2800" b="1" dirty="0" smtClean="0">
+                <a:latin typeface="+mn-lt"/>
+              </a:rPr>
+              <a:t>cu Joystick-ul</a:t>
+            </a:r>
+            <a:endParaRPr lang="en-US" sz="2800" b="1" dirty="0">
+              <a:latin typeface="+mn-lt"/>
+            </a:endParaRPr>
+          </a:p>
+        </p:txBody>
+      </p:sp>
+      <p:pic>
+        <p:nvPicPr>
+          <p:cNvPr id="1026" name="Picture 2"/>
+          <p:cNvPicPr>
+            <a:picLocks noGrp="1" noChangeAspect="1" noChangeArrowheads="1"/>
+          </p:cNvPicPr>
+          <p:nvPr>
+            <p:ph sz="half" idx="2"/>
+          </p:nvPr>
+        </p:nvPicPr>
+        <p:blipFill rotWithShape="1">
+          <a:blip r:embed="rId3">
+            <a:extLst>
+              <a:ext uri="{28A0092B-C50C-407E-A947-70E740481C1C}">
+                <a14:useLocalDpi xmlns:a14="http://schemas.microsoft.com/office/drawing/2010/main" val="0"/>
+              </a:ext>
+            </a:extLst>
+          </a:blip>
+          <a:srcRect b="2667"/>
+          <a:stretch/>
         </p:blipFill>
         <p:spPr bwMode="auto">
           <a:xfrm>
-            <a:off x="4648200" y="1705451"/>
-            <a:ext cx="3657600" cy="2943225"/>
+            <a:off x="6172200" y="1398280"/>
+            <a:ext cx="2141280" cy="2698769"/>
           </a:xfrm>
           <a:prstGeom prst="rect">
             <a:avLst/>
@@ -5837,14 +5811,14 @@
       </p:pic>
       <p:sp>
         <p:nvSpPr>
-          <p:cNvPr id="13" name="TextBox 12"/>
+          <p:cNvPr id="5" name="TextBox 4"/>
           <p:cNvSpPr txBox="1"/>
           <p:nvPr/>
         </p:nvSpPr>
         <p:spPr>
           <a:xfrm>
-            <a:off x="759760" y="2438400"/>
-            <a:ext cx="3810000" cy="1477328"/>
+            <a:off x="768724" y="2286000"/>
+            <a:ext cx="5181600" cy="923330"/>
           </a:xfrm>
           <a:prstGeom prst="rect">
             <a:avLst/>
@@ -5871,30 +5845,250 @@
           <a:lstStyle/>
           <a:p>
             <a:r>
-              <a:rPr lang="ro-RO" b="1" dirty="0"/>
-              <a:t>Inainte de a incepe un nou joc, utilizatorul poate selecta initial numarul maxim sau minim de culori </a:t>
-            </a:r>
-            <a:r>
-              <a:rPr lang="ro-RO" b="1" dirty="0" smtClean="0"/>
-              <a:t>dorit ca in imaginea alaturata.</a:t>
+              <a:rPr lang="en-US" b="1" dirty="0" err="1"/>
+              <a:t>Adaugarea</a:t>
+            </a:r>
+            <a:r>
+              <a:rPr lang="en-US" b="1" dirty="0"/>
+              <a:t> </a:t>
+            </a:r>
+            <a:r>
+              <a:rPr lang="en-US" b="1" dirty="0" err="1"/>
+              <a:t>librariei</a:t>
+            </a:r>
+            <a:r>
+              <a:rPr lang="en-US" b="1" dirty="0"/>
+              <a:t> </a:t>
+            </a:r>
+            <a:r>
+              <a:rPr lang="en-US" b="1" dirty="0" smtClean="0"/>
+              <a:t>JInput </a:t>
+            </a:r>
+            <a:r>
+              <a:rPr lang="en-US" b="1" dirty="0"/>
+              <a:t>in IntelliJ IDEA, cat si a </a:t>
+            </a:r>
+            <a:r>
+              <a:rPr lang="en-US" b="1" dirty="0" err="1"/>
+              <a:t>dll-urilor</a:t>
+            </a:r>
+            <a:r>
+              <a:rPr lang="en-US" b="1" dirty="0"/>
+              <a:t> </a:t>
+            </a:r>
+            <a:r>
+              <a:rPr lang="en-US" b="1" dirty="0" err="1" smtClean="0"/>
+              <a:t>necesare</a:t>
+            </a:r>
+            <a:r>
+              <a:rPr lang="en-US" b="1" dirty="0" smtClean="0"/>
+              <a:t>.</a:t>
             </a:r>
             <a:endParaRPr lang="en-US" b="1" dirty="0"/>
           </a:p>
           <a:p>
             <a:endParaRPr lang="en-US" dirty="0"/>
+          </a:p>
+        </p:txBody>
+      </p:sp>
+      <p:sp>
+        <p:nvSpPr>
+          <p:cNvPr id="7" name="TextBox 6"/>
+          <p:cNvSpPr txBox="1"/>
+          <p:nvPr/>
+        </p:nvSpPr>
+        <p:spPr>
+          <a:xfrm>
+            <a:off x="737348" y="3581400"/>
+            <a:ext cx="5181600" cy="1477328"/>
+          </a:xfrm>
+          <a:prstGeom prst="rect">
+            <a:avLst/>
+          </a:prstGeom>
+        </p:spPr>
+        <p:style>
+          <a:lnRef idx="1">
+            <a:schemeClr val="accent2"/>
+          </a:lnRef>
+          <a:fillRef idx="2">
+            <a:schemeClr val="accent2"/>
+          </a:fillRef>
+          <a:effectRef idx="1">
+            <a:schemeClr val="accent2"/>
+          </a:effectRef>
+          <a:fontRef idx="minor">
+            <a:schemeClr val="dk1"/>
+          </a:fontRef>
+        </p:style>
+        <p:txBody>
+          <a:bodyPr wrap="square" rtlCol="0">
+            <a:spAutoFit/>
+          </a:bodyPr>
+          <a:lstStyle/>
+          <a:p>
+            <a:r>
+              <a:rPr lang="en-US" b="1" dirty="0" smtClean="0"/>
+              <a:t>Mai exact este un API Java, ce are in spate </a:t>
+            </a:r>
+            <a:r>
+              <a:rPr lang="en-US" b="1" dirty="0" err="1" smtClean="0"/>
+              <a:t>implementate</a:t>
+            </a:r>
+            <a:r>
+              <a:rPr lang="en-US" b="1" dirty="0" smtClean="0"/>
+              <a:t> metode pentru </a:t>
+            </a:r>
+            <a:r>
+              <a:rPr lang="en-US" b="1" dirty="0" err="1" smtClean="0"/>
+              <a:t>descoperirea</a:t>
+            </a:r>
+            <a:r>
+              <a:rPr lang="en-US" b="1" dirty="0" smtClean="0"/>
+              <a:t> controller-ului, conectarea la </a:t>
+            </a:r>
+            <a:r>
+              <a:rPr lang="en-US" b="1" dirty="0" err="1" smtClean="0"/>
+              <a:t>acesta</a:t>
+            </a:r>
+            <a:r>
+              <a:rPr lang="en-US" b="1" dirty="0" smtClean="0"/>
+              <a:t> si </a:t>
+            </a:r>
+            <a:r>
+              <a:rPr lang="en-US" b="1" dirty="0" err="1" smtClean="0"/>
+              <a:t>intrarea</a:t>
+            </a:r>
+            <a:r>
+              <a:rPr lang="en-US" b="1" dirty="0" smtClean="0"/>
+              <a:t> </a:t>
+            </a:r>
+            <a:r>
+              <a:rPr lang="en-US" b="1" dirty="0" err="1" smtClean="0"/>
+              <a:t>interogata</a:t>
+            </a:r>
+            <a:r>
+              <a:rPr lang="en-US" b="1" dirty="0" smtClean="0"/>
+              <a:t>. Include Plugin-uri care permite </a:t>
+            </a:r>
+            <a:r>
+              <a:rPr lang="en-US" b="1" dirty="0" err="1" smtClean="0"/>
+              <a:t>adaptarea</a:t>
+            </a:r>
+            <a:r>
+              <a:rPr lang="en-US" b="1" dirty="0" smtClean="0"/>
+              <a:t> </a:t>
+            </a:r>
+            <a:r>
+              <a:rPr lang="en-US" b="1" dirty="0" err="1" smtClean="0"/>
+              <a:t>acestuia</a:t>
+            </a:r>
+            <a:r>
+              <a:rPr lang="en-US" b="1" dirty="0" smtClean="0"/>
+              <a:t> la diferite </a:t>
+            </a:r>
+            <a:r>
+              <a:rPr lang="en-US" b="1" dirty="0" err="1" smtClean="0"/>
+              <a:t>platforme</a:t>
+            </a:r>
+            <a:r>
+              <a:rPr lang="en-US" b="1" dirty="0" smtClean="0"/>
+              <a:t> specifice.</a:t>
+            </a:r>
+            <a:endParaRPr lang="en-US" b="1" dirty="0"/>
+          </a:p>
+        </p:txBody>
+      </p:sp>
+    </p:spTree>
+    <p:extLst>
+      <p:ext uri="{BB962C8B-B14F-4D97-AF65-F5344CB8AC3E}">
+        <p14:creationId xmlns:p14="http://schemas.microsoft.com/office/powerpoint/2010/main" val="204978342"/>
+      </p:ext>
+    </p:extLst>
+  </p:cSld>
+  <p:clrMapOvr>
+    <a:masterClrMapping/>
+  </p:clrMapOvr>
+</p:sld>
+</file>
+
+<file path=ppt/slides/slide19.xml><?xml version="1.0" encoding="utf-8"?>
+<p:sld xmlns:a="http://schemas.openxmlformats.org/drawingml/2006/main" xmlns:r="http://schemas.openxmlformats.org/officeDocument/2006/relationships" xmlns:p="http://schemas.openxmlformats.org/presentationml/2006/main">
+  <p:cSld>
+    <p:spTree>
+      <p:nvGrpSpPr>
+        <p:cNvPr id="1" name=""/>
+        <p:cNvGrpSpPr/>
+        <p:nvPr/>
+      </p:nvGrpSpPr>
+      <p:grpSpPr>
+        <a:xfrm>
+          <a:off x="0" y="0"/>
+          <a:ext cx="0" cy="0"/>
+          <a:chOff x="0" y="0"/>
+          <a:chExt cx="0" cy="0"/>
+        </a:xfrm>
+      </p:grpSpPr>
+      <p:sp>
+        <p:nvSpPr>
+          <p:cNvPr id="2" name="Title 1"/>
+          <p:cNvSpPr>
+            <a:spLocks noGrp="1"/>
+          </p:cNvSpPr>
+          <p:nvPr>
+            <p:ph type="title"/>
+          </p:nvPr>
+        </p:nvSpPr>
+        <p:spPr>
+          <a:xfrm>
+            <a:off x="762000" y="457200"/>
+            <a:ext cx="7543800" cy="533400"/>
+          </a:xfrm>
+        </p:spPr>
+        <p:style>
+          <a:lnRef idx="2">
+            <a:schemeClr val="accent2"/>
+          </a:lnRef>
+          <a:fillRef idx="1">
+            <a:schemeClr val="lt1"/>
+          </a:fillRef>
+          <a:effectRef idx="0">
+            <a:schemeClr val="accent2"/>
+          </a:effectRef>
+          <a:fontRef idx="minor">
+            <a:schemeClr val="dk1"/>
+          </a:fontRef>
+        </p:style>
+        <p:txBody>
+          <a:bodyPr>
+            <a:normAutofit/>
+          </a:bodyPr>
+          <a:lstStyle/>
+          <a:p>
+            <a:pPr algn="ctr"/>
+            <a:r>
+              <a:rPr lang="en-US" sz="2800" b="1" dirty="0" smtClean="0">
+                <a:latin typeface="+mn-lt"/>
+              </a:rPr>
+              <a:t>Utilizare API JInput</a:t>
+            </a:r>
+            <a:endParaRPr lang="en-US" sz="2800" b="1" dirty="0">
+              <a:latin typeface="+mn-lt"/>
+            </a:endParaRPr>
           </a:p>
         </p:txBody>
       </p:sp>
       <p:pic>
         <p:nvPicPr>
-          <p:cNvPr id="1028" name="Picture 4"/>
+          <p:cNvPr id="2050" name="Picture 2"/>
           <p:cNvPicPr>
-            <a:picLocks noChangeAspect="1" noChangeArrowheads="1"/>
+            <a:picLocks noGrp="1" noChangeAspect="1" noChangeArrowheads="1"/>
           </p:cNvPicPr>
-          <p:nvPr/>
+          <p:nvPr>
+            <p:ph sz="half" idx="1"/>
+          </p:nvPr>
         </p:nvPicPr>
         <p:blipFill>
-          <a:blip r:embed="rId3">
+          <a:blip r:embed="rId2">
             <a:extLst>
               <a:ext uri="{28A0092B-C50C-407E-A947-70E740481C1C}">
                 <a14:useLocalDpi xmlns:a14="http://schemas.microsoft.com/office/drawing/2010/main" val="0"/>
@@ -5908,8 +6102,8 @@
         </p:blipFill>
         <p:spPr bwMode="auto">
           <a:xfrm>
-            <a:off x="784413" y="4800600"/>
-            <a:ext cx="5174876" cy="1264527"/>
+            <a:off x="838200" y="1295400"/>
+            <a:ext cx="4855029" cy="4114800"/>
           </a:xfrm>
           <a:prstGeom prst="rect">
             <a:avLst/>
@@ -5951,14 +6145,14 @@
       </p:pic>
       <p:sp>
         <p:nvSpPr>
-          <p:cNvPr id="17" name="TextBox 16"/>
+          <p:cNvPr id="5" name="TextBox 4"/>
           <p:cNvSpPr txBox="1"/>
           <p:nvPr/>
         </p:nvSpPr>
         <p:spPr>
           <a:xfrm>
-            <a:off x="6096000" y="5140475"/>
-            <a:ext cx="1981199" cy="584775"/>
+            <a:off x="5334000" y="5484888"/>
+            <a:ext cx="2895600" cy="584775"/>
           </a:xfrm>
           <a:prstGeom prst="rect">
             <a:avLst/>
@@ -5984,9 +6178,10 @@
           </a:bodyPr>
           <a:lstStyle/>
           <a:p>
-            <a:r>
-              <a:rPr lang="ro-RO" sz="1600" b="1" dirty="0" smtClean="0"/>
-              <a:t>Initalizarea culorilor pentru bile</a:t>
+            <a:pPr algn="ctr"/>
+            <a:r>
+              <a:rPr lang="en-US" sz="1600" b="1" dirty="0" smtClean="0"/>
+              <a:t>Cod pentru detectarea si conectarea controller-ului</a:t>
             </a:r>
             <a:endParaRPr lang="en-US" sz="1600" b="1" dirty="0"/>
           </a:p>
@@ -5995,7 +6190,293 @@
     </p:spTree>
     <p:extLst>
       <p:ext uri="{BB962C8B-B14F-4D97-AF65-F5344CB8AC3E}">
-        <p14:creationId xmlns:p14="http://schemas.microsoft.com/office/powerpoint/2010/main" val="3673873426"/>
+        <p14:creationId xmlns:p14="http://schemas.microsoft.com/office/powerpoint/2010/main" val="3489070620"/>
+      </p:ext>
+    </p:extLst>
+  </p:cSld>
+  <p:clrMapOvr>
+    <a:masterClrMapping/>
+  </p:clrMapOvr>
+</p:sld>
+</file>
+
+<file path=ppt/slides/slide2.xml><?xml version="1.0" encoding="utf-8"?>
+<p:sld xmlns:a="http://schemas.openxmlformats.org/drawingml/2006/main" xmlns:r="http://schemas.openxmlformats.org/officeDocument/2006/relationships" xmlns:p="http://schemas.openxmlformats.org/presentationml/2006/main">
+  <p:cSld>
+    <p:spTree>
+      <p:nvGrpSpPr>
+        <p:cNvPr id="1" name=""/>
+        <p:cNvGrpSpPr/>
+        <p:nvPr/>
+      </p:nvGrpSpPr>
+      <p:grpSpPr>
+        <a:xfrm>
+          <a:off x="0" y="0"/>
+          <a:ext cx="0" cy="0"/>
+          <a:chOff x="0" y="0"/>
+          <a:chExt cx="0" cy="0"/>
+        </a:xfrm>
+      </p:grpSpPr>
+      <p:sp>
+        <p:nvSpPr>
+          <p:cNvPr id="2" name="Title 1"/>
+          <p:cNvSpPr>
+            <a:spLocks noGrp="1"/>
+          </p:cNvSpPr>
+          <p:nvPr>
+            <p:ph type="title"/>
+          </p:nvPr>
+        </p:nvSpPr>
+        <p:spPr>
+          <a:xfrm>
+            <a:off x="838200" y="3124200"/>
+            <a:ext cx="7467600" cy="838200"/>
+          </a:xfrm>
+        </p:spPr>
+        <p:style>
+          <a:lnRef idx="2">
+            <a:schemeClr val="accent2"/>
+          </a:lnRef>
+          <a:fillRef idx="1">
+            <a:schemeClr val="lt1"/>
+          </a:fillRef>
+          <a:effectRef idx="0">
+            <a:schemeClr val="accent2"/>
+          </a:effectRef>
+          <a:fontRef idx="minor">
+            <a:schemeClr val="dk1"/>
+          </a:fontRef>
+        </p:style>
+        <p:txBody>
+          <a:bodyPr>
+            <a:normAutofit/>
+          </a:bodyPr>
+          <a:lstStyle/>
+          <a:p>
+            <a:pPr algn="ctr"/>
+            <a:r>
+              <a:rPr lang="en-US" sz="4000" b="1" dirty="0"/>
+              <a:t>Cuprins -&gt; Assignment </a:t>
+            </a:r>
+            <a:r>
+              <a:rPr lang="en-US" sz="4000" b="1" dirty="0" smtClean="0"/>
+              <a:t>1</a:t>
+            </a:r>
+            <a:endParaRPr lang="en-US" sz="4000" dirty="0"/>
+          </a:p>
+        </p:txBody>
+      </p:sp>
+    </p:spTree>
+    <p:extLst>
+      <p:ext uri="{BB962C8B-B14F-4D97-AF65-F5344CB8AC3E}">
+        <p14:creationId xmlns:p14="http://schemas.microsoft.com/office/powerpoint/2010/main" val="2036088643"/>
+      </p:ext>
+    </p:extLst>
+  </p:cSld>
+  <p:clrMapOvr>
+    <a:masterClrMapping/>
+  </p:clrMapOvr>
+</p:sld>
+</file>
+
+<file path=ppt/slides/slide3.xml><?xml version="1.0" encoding="utf-8"?>
+<p:sld xmlns:a="http://schemas.openxmlformats.org/drawingml/2006/main" xmlns:r="http://schemas.openxmlformats.org/officeDocument/2006/relationships" xmlns:p="http://schemas.openxmlformats.org/presentationml/2006/main">
+  <p:cSld>
+    <p:spTree>
+      <p:nvGrpSpPr>
+        <p:cNvPr id="1" name=""/>
+        <p:cNvGrpSpPr/>
+        <p:nvPr/>
+      </p:nvGrpSpPr>
+      <p:grpSpPr>
+        <a:xfrm>
+          <a:off x="0" y="0"/>
+          <a:ext cx="0" cy="0"/>
+          <a:chOff x="0" y="0"/>
+          <a:chExt cx="0" cy="0"/>
+        </a:xfrm>
+      </p:grpSpPr>
+      <p:sp>
+        <p:nvSpPr>
+          <p:cNvPr id="2" name="Title 1"/>
+          <p:cNvSpPr>
+            <a:spLocks noGrp="1"/>
+          </p:cNvSpPr>
+          <p:nvPr>
+            <p:ph type="title"/>
+          </p:nvPr>
+        </p:nvSpPr>
+        <p:spPr>
+          <a:xfrm>
+            <a:off x="1295400" y="457200"/>
+            <a:ext cx="6096000" cy="762000"/>
+          </a:xfrm>
+        </p:spPr>
+        <p:style>
+          <a:lnRef idx="2">
+            <a:schemeClr val="accent2"/>
+          </a:lnRef>
+          <a:fillRef idx="1">
+            <a:schemeClr val="lt1"/>
+          </a:fillRef>
+          <a:effectRef idx="0">
+            <a:schemeClr val="accent2"/>
+          </a:effectRef>
+          <a:fontRef idx="minor">
+            <a:schemeClr val="dk1"/>
+          </a:fontRef>
+        </p:style>
+        <p:txBody>
+          <a:bodyPr>
+            <a:normAutofit/>
+          </a:bodyPr>
+          <a:lstStyle/>
+          <a:p>
+            <a:pPr algn="ctr"/>
+            <a:r>
+              <a:rPr lang="en-US" sz="4400" b="1" dirty="0" smtClean="0"/>
+              <a:t>Tehnologii utilizate</a:t>
+            </a:r>
+            <a:endParaRPr lang="en-US" sz="4400" b="1" dirty="0"/>
+          </a:p>
+        </p:txBody>
+      </p:sp>
+      <p:sp>
+        <p:nvSpPr>
+          <p:cNvPr id="3" name="Content Placeholder 2"/>
+          <p:cNvSpPr>
+            <a:spLocks noGrp="1"/>
+          </p:cNvSpPr>
+          <p:nvPr>
+            <p:ph idx="1"/>
+          </p:nvPr>
+        </p:nvSpPr>
+        <p:spPr>
+          <a:xfrm>
+            <a:off x="762000" y="1447800"/>
+            <a:ext cx="7543800" cy="4419600"/>
+          </a:xfrm>
+        </p:spPr>
+        <p:style>
+          <a:lnRef idx="1">
+            <a:schemeClr val="accent2"/>
+          </a:lnRef>
+          <a:fillRef idx="2">
+            <a:schemeClr val="accent2"/>
+          </a:fillRef>
+          <a:effectRef idx="1">
+            <a:schemeClr val="accent2"/>
+          </a:effectRef>
+          <a:fontRef idx="minor">
+            <a:schemeClr val="dk1"/>
+          </a:fontRef>
+        </p:style>
+        <p:txBody>
+          <a:bodyPr/>
+          <a:lstStyle/>
+          <a:p>
+            <a:endParaRPr lang="en-US" dirty="0" smtClean="0"/>
+          </a:p>
+          <a:p>
+            <a:pPr marL="0" indent="0">
+              <a:buNone/>
+            </a:pPr>
+            <a:endParaRPr lang="en-US" dirty="0" smtClean="0"/>
+          </a:p>
+          <a:p>
+            <a:endParaRPr lang="en-US" dirty="0"/>
+          </a:p>
+          <a:p>
+            <a:pPr algn="just">
+              <a:buFont typeface="Wingdings" pitchFamily="2" charset="2"/>
+              <a:buChar char="§"/>
+            </a:pPr>
+            <a:r>
+              <a:rPr lang="en-US" b="1" dirty="0" smtClean="0">
+                <a:latin typeface="Arial" pitchFamily="34" charset="0"/>
+                <a:cs typeface="Arial" pitchFamily="34" charset="0"/>
+              </a:rPr>
+              <a:t>Limbajul de dezvoltare: Java si libraria Swing</a:t>
+            </a:r>
+          </a:p>
+          <a:p>
+            <a:pPr algn="just">
+              <a:buFont typeface="Wingdings" pitchFamily="2" charset="2"/>
+              <a:buChar char="§"/>
+            </a:pPr>
+            <a:r>
+              <a:rPr lang="en-US" b="1" dirty="0" smtClean="0">
+                <a:latin typeface="Arial" pitchFamily="34" charset="0"/>
+                <a:cs typeface="Arial" pitchFamily="34" charset="0"/>
+              </a:rPr>
+              <a:t>Mediul de dezvoltare: IntelliJ IDEA</a:t>
+            </a:r>
+          </a:p>
+        </p:txBody>
+      </p:sp>
+      <p:pic>
+        <p:nvPicPr>
+          <p:cNvPr id="4" name="Picture 3"/>
+          <p:cNvPicPr>
+            <a:picLocks noChangeAspect="1"/>
+          </p:cNvPicPr>
+          <p:nvPr/>
+        </p:nvPicPr>
+        <p:blipFill rotWithShape="1">
+          <a:blip r:embed="rId2">
+            <a:extLst>
+              <a:ext uri="{28A0092B-C50C-407E-A947-70E740481C1C}">
+                <a14:useLocalDpi xmlns:a14="http://schemas.microsoft.com/office/drawing/2010/main" val="0"/>
+              </a:ext>
+            </a:extLst>
+          </a:blip>
+          <a:srcRect l="6309"/>
+          <a:stretch/>
+        </p:blipFill>
+        <p:spPr>
+          <a:xfrm>
+            <a:off x="1295400" y="2119832"/>
+            <a:ext cx="2057400" cy="1304685"/>
+          </a:xfrm>
+          <a:prstGeom prst="rect">
+            <a:avLst/>
+          </a:prstGeom>
+        </p:spPr>
+      </p:pic>
+      <p:pic>
+        <p:nvPicPr>
+          <p:cNvPr id="5" name="Picture 4"/>
+          <p:cNvPicPr>
+            <a:picLocks noChangeAspect="1"/>
+          </p:cNvPicPr>
+          <p:nvPr/>
+        </p:nvPicPr>
+        <p:blipFill>
+          <a:blip r:embed="rId3" cstate="print">
+            <a:extLst>
+              <a:ext uri="{28A0092B-C50C-407E-A947-70E740481C1C}">
+                <a14:useLocalDpi xmlns:a14="http://schemas.microsoft.com/office/drawing/2010/main" val="0"/>
+              </a:ext>
+            </a:extLst>
+          </a:blip>
+          <a:stretch>
+            <a:fillRect/>
+          </a:stretch>
+        </p:blipFill>
+        <p:spPr>
+          <a:xfrm>
+            <a:off x="5605182" y="2023782"/>
+            <a:ext cx="1481418" cy="1481418"/>
+          </a:xfrm>
+          <a:prstGeom prst="rect">
+            <a:avLst/>
+          </a:prstGeom>
+        </p:spPr>
+      </p:pic>
+    </p:spTree>
+    <p:extLst>
+      <p:ext uri="{BB962C8B-B14F-4D97-AF65-F5344CB8AC3E}">
+        <p14:creationId xmlns:p14="http://schemas.microsoft.com/office/powerpoint/2010/main" val="1594956022"/>
       </p:ext>
     </p:extLst>
   </p:cSld>
@@ -6012,7 +6493,7 @@
 </p:sld>
 </file>
 
-<file path=ppt/slides/slide7.xml><?xml version="1.0" encoding="utf-8"?>
+<file path=ppt/slides/slide4.xml><?xml version="1.0" encoding="utf-8"?>
 <p:sld xmlns:a="http://schemas.openxmlformats.org/drawingml/2006/main" xmlns:r="http://schemas.openxmlformats.org/officeDocument/2006/relationships" xmlns:p="http://schemas.openxmlformats.org/presentationml/2006/main">
   <p:cSld>
     <p:spTree>
@@ -6041,8 +6522,8 @@
         </p:nvSpPr>
         <p:spPr>
           <a:xfrm>
-            <a:off x="762000" y="457200"/>
-            <a:ext cx="7543800" cy="1066800"/>
+            <a:off x="1828800" y="457200"/>
+            <a:ext cx="5257800" cy="609600"/>
           </a:xfrm>
         </p:spPr>
         <p:style>
@@ -6067,25 +6548,356 @@
           <a:p>
             <a:pPr algn="ctr"/>
             <a:r>
-              <a:rPr lang="ro-RO" sz="2800" b="1" dirty="0"/>
-              <a:t>Functionalitatea de configurare a culorilor pentru bile – Partea </a:t>
-            </a:r>
-            <a:r>
-              <a:rPr lang="ro-RO" sz="2800" b="1" dirty="0" smtClean="0"/>
-              <a:t>2</a:t>
-            </a:r>
-            <a:endParaRPr lang="en-US" sz="2800" dirty="0"/>
+              <a:rPr lang="en-US" sz="4000" b="1" dirty="0" smtClean="0"/>
+              <a:t>Despre joc</a:t>
+            </a:r>
+            <a:endParaRPr lang="en-US" sz="4000" b="1" dirty="0"/>
+          </a:p>
+        </p:txBody>
+      </p:sp>
+      <p:sp>
+        <p:nvSpPr>
+          <p:cNvPr id="3" name="Content Placeholder 2"/>
+          <p:cNvSpPr>
+            <a:spLocks noGrp="1"/>
+          </p:cNvSpPr>
+          <p:nvPr>
+            <p:ph idx="1"/>
+          </p:nvPr>
+        </p:nvSpPr>
+        <p:spPr>
+          <a:xfrm>
+            <a:off x="838200" y="1524000"/>
+            <a:ext cx="7543800" cy="4343400"/>
+          </a:xfrm>
+        </p:spPr>
+        <p:style>
+          <a:lnRef idx="1">
+            <a:schemeClr val="accent2"/>
+          </a:lnRef>
+          <a:fillRef idx="2">
+            <a:schemeClr val="accent2"/>
+          </a:fillRef>
+          <a:effectRef idx="1">
+            <a:schemeClr val="accent2"/>
+          </a:effectRef>
+          <a:fontRef idx="minor">
+            <a:schemeClr val="dk1"/>
+          </a:fontRef>
+        </p:style>
+        <p:txBody>
+          <a:bodyPr/>
+          <a:lstStyle/>
+          <a:p>
+            <a:pPr>
+              <a:buFont typeface="Wingdings" pitchFamily="2" charset="2"/>
+              <a:buChar char="§"/>
+            </a:pPr>
+            <a:r>
+              <a:rPr lang="en-US" b="1" dirty="0" smtClean="0"/>
+              <a:t>Bubble Shooter este o aplicatie desktop dezvoltata utilizand limbajul de programare Java si mediul de dezvoltare IntelliJ IDEA.</a:t>
+            </a:r>
+          </a:p>
+          <a:p>
+            <a:pPr>
+              <a:buFont typeface="Wingdings" pitchFamily="2" charset="2"/>
+              <a:buChar char="§"/>
+            </a:pPr>
+            <a:endParaRPr lang="en-US" b="1" dirty="0" smtClean="0"/>
+          </a:p>
+          <a:p>
+            <a:pPr>
+              <a:buFont typeface="Wingdings" pitchFamily="2" charset="2"/>
+              <a:buChar char="§"/>
+            </a:pPr>
+            <a:r>
+              <a:rPr lang="en-US" b="1" dirty="0" smtClean="0"/>
+              <a:t>Pentru functionalitatea interfetei grafice cu utilizatorul s-au reutilizat elemente si obiecte grafice din libraria Java Swing pentru a crea interfata grafica si a reda functionalitate acesteia.</a:t>
+            </a:r>
+          </a:p>
+          <a:p>
+            <a:pPr marL="0" indent="0">
+              <a:buNone/>
+            </a:pPr>
+            <a:endParaRPr lang="en-US" dirty="0"/>
+          </a:p>
+        </p:txBody>
+      </p:sp>
+    </p:spTree>
+    <p:extLst>
+      <p:ext uri="{BB962C8B-B14F-4D97-AF65-F5344CB8AC3E}">
+        <p14:creationId xmlns:p14="http://schemas.microsoft.com/office/powerpoint/2010/main" val="4086893344"/>
+      </p:ext>
+    </p:extLst>
+  </p:cSld>
+  <p:clrMapOvr>
+    <a:masterClrMapping/>
+  </p:clrMapOvr>
+  <p:timing>
+    <p:tnLst>
+      <p:par>
+        <p:cTn id="1" dur="indefinite" restart="never" nodeType="tmRoot"/>
+      </p:par>
+    </p:tnLst>
+  </p:timing>
+</p:sld>
+</file>
+
+<file path=ppt/slides/slide5.xml><?xml version="1.0" encoding="utf-8"?>
+<p:sld xmlns:a="http://schemas.openxmlformats.org/drawingml/2006/main" xmlns:r="http://schemas.openxmlformats.org/officeDocument/2006/relationships" xmlns:p="http://schemas.openxmlformats.org/presentationml/2006/main">
+  <p:cSld>
+    <p:spTree>
+      <p:nvGrpSpPr>
+        <p:cNvPr id="1" name=""/>
+        <p:cNvGrpSpPr/>
+        <p:nvPr/>
+      </p:nvGrpSpPr>
+      <p:grpSpPr>
+        <a:xfrm>
+          <a:off x="0" y="0"/>
+          <a:ext cx="0" cy="0"/>
+          <a:chOff x="0" y="0"/>
+          <a:chExt cx="0" cy="0"/>
+        </a:xfrm>
+      </p:grpSpPr>
+      <p:sp>
+        <p:nvSpPr>
+          <p:cNvPr id="2" name="Title 1"/>
+          <p:cNvSpPr>
+            <a:spLocks noGrp="1"/>
+          </p:cNvSpPr>
+          <p:nvPr>
+            <p:ph type="title"/>
+          </p:nvPr>
+        </p:nvSpPr>
+        <p:spPr>
+          <a:xfrm>
+            <a:off x="838200" y="533400"/>
+            <a:ext cx="7467600" cy="609600"/>
+          </a:xfrm>
+        </p:spPr>
+        <p:style>
+          <a:lnRef idx="2">
+            <a:schemeClr val="accent2"/>
+          </a:lnRef>
+          <a:fillRef idx="1">
+            <a:schemeClr val="lt1"/>
+          </a:fillRef>
+          <a:effectRef idx="0">
+            <a:schemeClr val="accent2"/>
+          </a:effectRef>
+          <a:fontRef idx="minor">
+            <a:schemeClr val="dk1"/>
+          </a:fontRef>
+        </p:style>
+        <p:txBody>
+          <a:bodyPr>
+            <a:noAutofit/>
+          </a:bodyPr>
+          <a:lstStyle/>
+          <a:p>
+            <a:pPr algn="ctr"/>
+            <a:r>
+              <a:rPr lang="ro-RO" sz="3200" b="1" dirty="0" smtClean="0"/>
+              <a:t>Functionalitatile aplicatiei desktop</a:t>
+            </a:r>
+            <a:endParaRPr lang="en-US" sz="3200" b="1" dirty="0"/>
+          </a:p>
+        </p:txBody>
+      </p:sp>
+      <p:sp>
+        <p:nvSpPr>
+          <p:cNvPr id="3" name="Content Placeholder 2"/>
+          <p:cNvSpPr>
+            <a:spLocks noGrp="1"/>
+          </p:cNvSpPr>
+          <p:nvPr>
+            <p:ph idx="1"/>
+          </p:nvPr>
+        </p:nvSpPr>
+        <p:spPr>
+          <a:xfrm>
+            <a:off x="762000" y="1981200"/>
+            <a:ext cx="7620000" cy="3886200"/>
+          </a:xfrm>
+        </p:spPr>
+        <p:style>
+          <a:lnRef idx="1">
+            <a:schemeClr val="accent2"/>
+          </a:lnRef>
+          <a:fillRef idx="2">
+            <a:schemeClr val="accent2"/>
+          </a:fillRef>
+          <a:effectRef idx="1">
+            <a:schemeClr val="accent2"/>
+          </a:effectRef>
+          <a:fontRef idx="minor">
+            <a:schemeClr val="dk1"/>
+          </a:fontRef>
+        </p:style>
+        <p:txBody>
+          <a:bodyPr>
+            <a:normAutofit/>
+          </a:bodyPr>
+          <a:lstStyle/>
+          <a:p>
+            <a:pPr marL="0" indent="0">
+              <a:buNone/>
+            </a:pPr>
+            <a:r>
+              <a:rPr lang="ro-RO" b="1" dirty="0" smtClean="0"/>
+              <a:t>Aplicatia dezvoltata are la baza urmatoarele functionalitati:</a:t>
+            </a:r>
+          </a:p>
+          <a:p>
+            <a:pPr marL="0" indent="0">
+              <a:buNone/>
+            </a:pPr>
+            <a:endParaRPr lang="ro-RO" b="1" dirty="0" smtClean="0"/>
+          </a:p>
+          <a:p>
+            <a:pPr>
+              <a:buFont typeface="Wingdings" pitchFamily="2" charset="2"/>
+              <a:buChar char="§"/>
+            </a:pPr>
+            <a:r>
+              <a:rPr lang="ro-RO" b="1" dirty="0" smtClean="0"/>
+              <a:t>Inceputul jocului </a:t>
+            </a:r>
+          </a:p>
+          <a:p>
+            <a:pPr>
+              <a:buFont typeface="Wingdings" pitchFamily="2" charset="2"/>
+              <a:buChar char="§"/>
+            </a:pPr>
+            <a:r>
+              <a:rPr lang="ro-RO" b="1" dirty="0" smtClean="0"/>
+              <a:t>Setarile de configurare a culorilor pentru bile.</a:t>
+            </a:r>
+          </a:p>
+          <a:p>
+            <a:pPr>
+              <a:buFont typeface="Wingdings" pitchFamily="2" charset="2"/>
+              <a:buChar char="§"/>
+            </a:pPr>
+            <a:r>
+              <a:rPr lang="ro-RO" b="1" dirty="0" smtClean="0"/>
+              <a:t>Shooter-ul si incrementarea punctelor obtinute</a:t>
+            </a:r>
+          </a:p>
+          <a:p>
+            <a:pPr>
+              <a:buFont typeface="Wingdings" pitchFamily="2" charset="2"/>
+              <a:buChar char="§"/>
+            </a:pPr>
+            <a:r>
+              <a:rPr lang="ro-RO" b="1" dirty="0" smtClean="0"/>
+              <a:t>Salvarea scorului si al jucatorilor castigatori</a:t>
+            </a:r>
+          </a:p>
+          <a:p>
+            <a:pPr>
+              <a:buFont typeface="Wingdings" pitchFamily="2" charset="2"/>
+              <a:buChar char="§"/>
+            </a:pPr>
+            <a:r>
+              <a:rPr lang="ro-RO" b="1" dirty="0" smtClean="0"/>
+              <a:t>Oprirea jocului</a:t>
+            </a:r>
+            <a:endParaRPr lang="en-US" b="1" dirty="0"/>
+          </a:p>
+        </p:txBody>
+      </p:sp>
+    </p:spTree>
+    <p:extLst>
+      <p:ext uri="{BB962C8B-B14F-4D97-AF65-F5344CB8AC3E}">
+        <p14:creationId xmlns:p14="http://schemas.microsoft.com/office/powerpoint/2010/main" val="2460102969"/>
+      </p:ext>
+    </p:extLst>
+  </p:cSld>
+  <p:clrMapOvr>
+    <a:masterClrMapping/>
+  </p:clrMapOvr>
+  <p:timing>
+    <p:tnLst>
+      <p:par>
+        <p:cTn id="1" dur="indefinite" restart="never" nodeType="tmRoot"/>
+      </p:par>
+    </p:tnLst>
+  </p:timing>
+</p:sld>
+</file>
+
+<file path=ppt/slides/slide6.xml><?xml version="1.0" encoding="utf-8"?>
+<p:sld xmlns:a="http://schemas.openxmlformats.org/drawingml/2006/main" xmlns:r="http://schemas.openxmlformats.org/officeDocument/2006/relationships" xmlns:p="http://schemas.openxmlformats.org/presentationml/2006/main">
+  <p:cSld>
+    <p:spTree>
+      <p:nvGrpSpPr>
+        <p:cNvPr id="1" name=""/>
+        <p:cNvGrpSpPr/>
+        <p:nvPr/>
+      </p:nvGrpSpPr>
+      <p:grpSpPr>
+        <a:xfrm>
+          <a:off x="0" y="0"/>
+          <a:ext cx="0" cy="0"/>
+          <a:chOff x="0" y="0"/>
+          <a:chExt cx="0" cy="0"/>
+        </a:xfrm>
+      </p:grpSpPr>
+      <p:sp>
+        <p:nvSpPr>
+          <p:cNvPr id="2" name="Title 1"/>
+          <p:cNvSpPr>
+            <a:spLocks noGrp="1"/>
+          </p:cNvSpPr>
+          <p:nvPr>
+            <p:ph type="title"/>
+          </p:nvPr>
+        </p:nvSpPr>
+        <p:spPr>
+          <a:xfrm>
+            <a:off x="838200" y="457200"/>
+            <a:ext cx="7467600" cy="762000"/>
+          </a:xfrm>
+        </p:spPr>
+        <p:style>
+          <a:lnRef idx="2">
+            <a:schemeClr val="accent2"/>
+          </a:lnRef>
+          <a:fillRef idx="1">
+            <a:schemeClr val="lt1"/>
+          </a:fillRef>
+          <a:effectRef idx="0">
+            <a:schemeClr val="accent2"/>
+          </a:effectRef>
+          <a:fontRef idx="minor">
+            <a:schemeClr val="dk1"/>
+          </a:fontRef>
+        </p:style>
+        <p:txBody>
+          <a:bodyPr>
+            <a:normAutofit/>
+          </a:bodyPr>
+          <a:lstStyle/>
+          <a:p>
+            <a:pPr algn="ctr"/>
+            <a:r>
+              <a:rPr lang="ro-RO" sz="3600" b="1" dirty="0" smtClean="0"/>
+              <a:t>Functionalitatea de incepere a jocului</a:t>
+            </a:r>
+            <a:endParaRPr lang="en-US" sz="3600" b="1" dirty="0"/>
           </a:p>
         </p:txBody>
       </p:sp>
       <p:pic>
         <p:nvPicPr>
-          <p:cNvPr id="2050" name="Picture 2"/>
+          <p:cNvPr id="1026" name="Picture 2"/>
           <p:cNvPicPr>
             <a:picLocks noGrp="1" noChangeAspect="1" noChangeArrowheads="1"/>
           </p:cNvPicPr>
           <p:nvPr>
-            <p:ph sz="half" idx="2"/>
+            <p:ph idx="1"/>
           </p:nvPr>
         </p:nvPicPr>
         <p:blipFill>
@@ -6103,8 +6915,8 @@
         </p:blipFill>
         <p:spPr bwMode="auto">
           <a:xfrm>
-            <a:off x="4684840" y="1676400"/>
-            <a:ext cx="3620960" cy="4267200"/>
+            <a:off x="4343400" y="1524000"/>
+            <a:ext cx="3996244" cy="3223533"/>
           </a:xfrm>
           <a:prstGeom prst="rect">
             <a:avLst/>
@@ -6146,14 +6958,14 @@
       </p:pic>
       <p:sp>
         <p:nvSpPr>
-          <p:cNvPr id="5" name="TextBox 4"/>
+          <p:cNvPr id="4" name="TextBox 3"/>
           <p:cNvSpPr txBox="1"/>
           <p:nvPr/>
         </p:nvSpPr>
         <p:spPr>
           <a:xfrm>
-            <a:off x="768724" y="2057400"/>
-            <a:ext cx="3733800" cy="3416320"/>
+            <a:off x="925606" y="1524000"/>
+            <a:ext cx="3200400" cy="2246769"/>
           </a:xfrm>
           <a:prstGeom prst="rect">
             <a:avLst/>
@@ -6180,125 +6992,32 @@
           <a:lstStyle/>
           <a:p>
             <a:r>
-              <a:rPr lang="ro-RO" b="1" dirty="0" smtClean="0"/>
-              <a:t>Culorile pentru bile sunt generate aleatoru de algoritmul din imaginea atasata.</a:t>
-            </a:r>
-          </a:p>
-          <a:p>
-            <a:endParaRPr lang="ro-RO" b="1" dirty="0"/>
-          </a:p>
-          <a:p>
-            <a:r>
-              <a:rPr lang="ro-RO" b="1" dirty="0" smtClean="0"/>
-              <a:t>Numarul maxim de posibilitati pentru culori este 8, iar numarul minim este 2. </a:t>
-            </a:r>
-          </a:p>
-          <a:p>
-            <a:endParaRPr lang="ro-RO" b="1" dirty="0"/>
-          </a:p>
-          <a:p>
-            <a:r>
-              <a:rPr lang="ro-RO" b="1" dirty="0" smtClean="0"/>
-              <a:t>Astfel in functie de dorinta utilizatorului, se vor genera culorile in functie de cate isi doreste acesta in intervalul (2,8).</a:t>
-            </a:r>
-            <a:endParaRPr lang="en-US" b="1" dirty="0"/>
-          </a:p>
-        </p:txBody>
-      </p:sp>
-    </p:spTree>
-    <p:extLst>
-      <p:ext uri="{BB962C8B-B14F-4D97-AF65-F5344CB8AC3E}">
-        <p14:creationId xmlns:p14="http://schemas.microsoft.com/office/powerpoint/2010/main" val="493938646"/>
-      </p:ext>
-    </p:extLst>
-  </p:cSld>
-  <p:clrMapOvr>
-    <a:masterClrMapping/>
-  </p:clrMapOvr>
-  <p:timing>
-    <p:tnLst>
-      <p:par>
-        <p:cTn id="1" dur="indefinite" restart="never" nodeType="tmRoot"/>
-      </p:par>
-    </p:tnLst>
-  </p:timing>
-</p:sld>
-</file>
-
-<file path=ppt/slides/slide8.xml><?xml version="1.0" encoding="utf-8"?>
-<p:sld xmlns:a="http://schemas.openxmlformats.org/drawingml/2006/main" xmlns:r="http://schemas.openxmlformats.org/officeDocument/2006/relationships" xmlns:p="http://schemas.openxmlformats.org/presentationml/2006/main">
-  <p:cSld>
-    <p:spTree>
-      <p:nvGrpSpPr>
-        <p:cNvPr id="1" name=""/>
-        <p:cNvGrpSpPr/>
-        <p:nvPr/>
-      </p:nvGrpSpPr>
-      <p:grpSpPr>
-        <a:xfrm>
-          <a:off x="0" y="0"/>
-          <a:ext cx="0" cy="0"/>
-          <a:chOff x="0" y="0"/>
-          <a:chExt cx="0" cy="0"/>
-        </a:xfrm>
-      </p:grpSpPr>
-      <p:sp>
-        <p:nvSpPr>
-          <p:cNvPr id="2" name="Title 1"/>
-          <p:cNvSpPr>
-            <a:spLocks noGrp="1"/>
-          </p:cNvSpPr>
-          <p:nvPr>
-            <p:ph type="title"/>
-          </p:nvPr>
-        </p:nvSpPr>
-        <p:spPr>
-          <a:xfrm>
-            <a:off x="762000" y="457200"/>
-            <a:ext cx="7620000" cy="914400"/>
-          </a:xfrm>
-        </p:spPr>
-        <p:style>
-          <a:lnRef idx="2">
-            <a:schemeClr val="accent2"/>
-          </a:lnRef>
-          <a:fillRef idx="1">
-            <a:schemeClr val="lt1"/>
-          </a:fillRef>
-          <a:effectRef idx="0">
-            <a:schemeClr val="accent2"/>
-          </a:effectRef>
-          <a:fontRef idx="minor">
-            <a:schemeClr val="dk1"/>
-          </a:fontRef>
-        </p:style>
-        <p:txBody>
-          <a:bodyPr>
-            <a:noAutofit/>
-          </a:bodyPr>
-          <a:lstStyle/>
-          <a:p>
-            <a:pPr algn="ctr"/>
-            <a:r>
-              <a:rPr lang="ro-RO" sz="2400" b="1" dirty="0" smtClean="0"/>
-              <a:t>Functionalitatea pentru shooter si incrementarea punctelor – Partea 1</a:t>
-            </a:r>
-            <a:endParaRPr lang="en-US" sz="2400" b="1" dirty="0"/>
+              <a:rPr lang="ro-RO" sz="2000" b="1" dirty="0" smtClean="0"/>
+              <a:t>Pagina principala a aplicatiei este reprezentata in imaginea alaturata:</a:t>
+            </a:r>
+          </a:p>
+          <a:p>
+            <a:endParaRPr lang="ro-RO" sz="2000" b="1" dirty="0"/>
+          </a:p>
+          <a:p>
+            <a:r>
+              <a:rPr lang="ro-RO" sz="2000" b="1" dirty="0" smtClean="0"/>
+              <a:t>Pentru a incepe un joc nou utilizatorul va apasa pe butonul New Game.</a:t>
+            </a:r>
+            <a:endParaRPr lang="en-US" sz="2000" b="1" dirty="0"/>
           </a:p>
         </p:txBody>
       </p:sp>
       <p:pic>
         <p:nvPicPr>
-          <p:cNvPr id="3074" name="Picture 2"/>
+          <p:cNvPr id="1027" name="Picture 3"/>
           <p:cNvPicPr>
-            <a:picLocks noGrp="1" noChangeAspect="1" noChangeArrowheads="1"/>
+            <a:picLocks noChangeAspect="1" noChangeArrowheads="1"/>
           </p:cNvPicPr>
-          <p:nvPr>
-            <p:ph sz="half" idx="2"/>
-          </p:nvPr>
+          <p:nvPr/>
         </p:nvPicPr>
         <p:blipFill>
-          <a:blip r:embed="rId2">
+          <a:blip r:embed="rId3">
             <a:extLst>
               <a:ext uri="{28A0092B-C50C-407E-A947-70E740481C1C}">
                 <a14:useLocalDpi xmlns:a14="http://schemas.microsoft.com/office/drawing/2010/main" val="0"/>
@@ -6312,8 +7031,8 @@
         </p:blipFill>
         <p:spPr bwMode="auto">
           <a:xfrm>
-            <a:off x="4800600" y="1524000"/>
-            <a:ext cx="3551200" cy="3124200"/>
+            <a:off x="925606" y="4724400"/>
+            <a:ext cx="3364006" cy="815975"/>
           </a:xfrm>
           <a:prstGeom prst="rect">
             <a:avLst/>
@@ -6361,34 +7080,8 @@
         </p:nvSpPr>
         <p:spPr>
           <a:xfrm>
-            <a:off x="838200" y="1828800"/>
-            <a:ext cx="184731" cy="369332"/>
-          </a:xfrm>
-          <a:prstGeom prst="rect">
-            <a:avLst/>
-          </a:prstGeom>
-          <a:noFill/>
-        </p:spPr>
-        <p:txBody>
-          <a:bodyPr wrap="none" rtlCol="0">
-            <a:spAutoFit/>
-          </a:bodyPr>
-          <a:lstStyle/>
-          <a:p>
-            <a:endParaRPr lang="en-US" dirty="0"/>
-          </a:p>
-        </p:txBody>
-      </p:sp>
-      <p:sp>
-        <p:nvSpPr>
-          <p:cNvPr id="6" name="TextBox 5"/>
-          <p:cNvSpPr txBox="1"/>
-          <p:nvPr/>
-        </p:nvSpPr>
-        <p:spPr>
-          <a:xfrm>
-            <a:off x="685800" y="3135406"/>
-            <a:ext cx="4014538" cy="2862322"/>
+            <a:off x="925606" y="5638800"/>
+            <a:ext cx="3733800" cy="369332"/>
           </a:xfrm>
           <a:prstGeom prst="rect">
             <a:avLst/>
@@ -6414,18 +7107,10 @@
           </a:bodyPr>
           <a:lstStyle/>
           <a:p>
+            <a:pPr algn="ctr"/>
             <a:r>
               <a:rPr lang="ro-RO" b="1" dirty="0" smtClean="0"/>
-              <a:t>Shooter-ul este redat de catre sageata din imaginea alaturata, utilizatorul poate trage catre o grupare de doua sau mai multe bile.</a:t>
-            </a:r>
-          </a:p>
-          <a:p>
-            <a:endParaRPr lang="ro-RO" b="1" dirty="0"/>
-          </a:p>
-          <a:p>
-            <a:r>
-              <a:rPr lang="ro-RO" b="1" dirty="0" smtClean="0"/>
-              <a:t>O data tintita grupa de bile de aceeasi culoare cu bila, aceasta dispare si punctele se incrementeaza si afisate in sectiunea de sus din stanga a imaginii alaturate.</a:t>
+              <a:t>Initializarea butonului de New Game</a:t>
             </a:r>
             <a:endParaRPr lang="en-US" b="1" dirty="0"/>
           </a:p>
@@ -6434,7 +7119,7 @@
     </p:spTree>
     <p:extLst>
       <p:ext uri="{BB962C8B-B14F-4D97-AF65-F5344CB8AC3E}">
-        <p14:creationId xmlns:p14="http://schemas.microsoft.com/office/powerpoint/2010/main" val="3745293928"/>
+        <p14:creationId xmlns:p14="http://schemas.microsoft.com/office/powerpoint/2010/main" val="3551194238"/>
       </p:ext>
     </p:extLst>
   </p:cSld>
@@ -6451,7 +7136,7 @@
 </p:sld>
 </file>
 
-<file path=ppt/slides/slide9.xml><?xml version="1.0" encoding="utf-8"?>
+<file path=ppt/slides/slide7.xml><?xml version="1.0" encoding="utf-8"?>
 <p:sld xmlns:a="http://schemas.openxmlformats.org/drawingml/2006/main" xmlns:r="http://schemas.openxmlformats.org/officeDocument/2006/relationships" xmlns:p="http://schemas.openxmlformats.org/presentationml/2006/main">
   <p:cSld>
     <p:spTree>
@@ -6480,8 +7165,8 @@
         </p:nvSpPr>
         <p:spPr>
           <a:xfrm>
-            <a:off x="800100" y="457200"/>
-            <a:ext cx="7543800" cy="838200"/>
+            <a:off x="762000" y="457200"/>
+            <a:ext cx="7543800" cy="1066800"/>
           </a:xfrm>
         </p:spPr>
         <p:style>
@@ -6506,20 +7191,16 @@
           <a:p>
             <a:pPr algn="ctr"/>
             <a:r>
-              <a:rPr lang="ro-RO" sz="2400" b="1" dirty="0"/>
-              <a:t>Functionalitatea pentru shooter si incrementarea punctelor – Partea </a:t>
-            </a:r>
-            <a:r>
-              <a:rPr lang="ro-RO" sz="2400" b="1" dirty="0" smtClean="0"/>
-              <a:t>2</a:t>
-            </a:r>
-            <a:endParaRPr lang="en-US" sz="2400" dirty="0"/>
+              <a:rPr lang="ro-RO" sz="2800" b="1" dirty="0" smtClean="0"/>
+              <a:t>Functionalitatea de configurare a culorilor pentru bile – Partea 1</a:t>
+            </a:r>
+            <a:endParaRPr lang="en-US" sz="2800" b="1" dirty="0"/>
           </a:p>
         </p:txBody>
       </p:sp>
       <p:pic>
         <p:nvPicPr>
-          <p:cNvPr id="4098" name="Picture 2"/>
+          <p:cNvPr id="1027" name="Picture 3"/>
           <p:cNvPicPr>
             <a:picLocks noGrp="1" noChangeAspect="1" noChangeArrowheads="1"/>
           </p:cNvPicPr>
@@ -6542,8 +7223,8 @@
         </p:blipFill>
         <p:spPr bwMode="auto">
           <a:xfrm>
-            <a:off x="4670684" y="2286000"/>
-            <a:ext cx="3647148" cy="3048000"/>
+            <a:off x="4648200" y="1705451"/>
+            <a:ext cx="3657600" cy="2943225"/>
           </a:xfrm>
           <a:prstGeom prst="rect">
             <a:avLst/>
@@ -6585,14 +7266,14 @@
       </p:pic>
       <p:sp>
         <p:nvSpPr>
-          <p:cNvPr id="5" name="TextBox 4"/>
+          <p:cNvPr id="13" name="TextBox 12"/>
           <p:cNvSpPr txBox="1"/>
           <p:nvPr/>
         </p:nvSpPr>
         <p:spPr>
           <a:xfrm>
-            <a:off x="4657165" y="1524000"/>
-            <a:ext cx="3669632" cy="646331"/>
+            <a:off x="759760" y="2438400"/>
+            <a:ext cx="3810000" cy="1477328"/>
           </a:xfrm>
           <a:prstGeom prst="rect">
             <a:avLst/>
@@ -6619,22 +7300,27 @@
           <a:lstStyle/>
           <a:p>
             <a:r>
+              <a:rPr lang="ro-RO" b="1" dirty="0"/>
+              <a:t>Inainte de a incepe un nou joc, utilizatorul poate selecta initial numarul maxim sau minim de culori </a:t>
+            </a:r>
+            <a:r>
               <a:rPr lang="ro-RO" b="1" dirty="0" smtClean="0"/>
-              <a:t>Contorizarea bilelor marcate de aceeasi culoare </a:t>
+              <a:t>dorit ca in imaginea alaturata.</a:t>
             </a:r>
             <a:endParaRPr lang="en-US" b="1" dirty="0"/>
+          </a:p>
+          <a:p>
+            <a:endParaRPr lang="en-US" dirty="0"/>
           </a:p>
         </p:txBody>
       </p:sp>
       <p:pic>
         <p:nvPicPr>
-          <p:cNvPr id="4099" name="Picture 3"/>
+          <p:cNvPr id="1028" name="Picture 4"/>
           <p:cNvPicPr>
-            <a:picLocks noGrp="1" noChangeAspect="1" noChangeArrowheads="1"/>
+            <a:picLocks noChangeAspect="1" noChangeArrowheads="1"/>
           </p:cNvPicPr>
-          <p:nvPr>
-            <p:ph sz="half" idx="1"/>
-          </p:nvPr>
+          <p:nvPr/>
         </p:nvPicPr>
         <p:blipFill>
           <a:blip r:embed="rId3">
@@ -6651,8 +7337,8 @@
         </p:blipFill>
         <p:spPr bwMode="auto">
           <a:xfrm>
-            <a:off x="838200" y="1676400"/>
-            <a:ext cx="3733800" cy="3276600"/>
+            <a:off x="784413" y="4800600"/>
+            <a:ext cx="5174876" cy="1264527"/>
           </a:xfrm>
           <a:prstGeom prst="rect">
             <a:avLst/>
@@ -6694,14 +7380,14 @@
       </p:pic>
       <p:sp>
         <p:nvSpPr>
-          <p:cNvPr id="6" name="TextBox 5"/>
+          <p:cNvPr id="17" name="TextBox 16"/>
           <p:cNvSpPr txBox="1"/>
           <p:nvPr/>
         </p:nvSpPr>
         <p:spPr>
           <a:xfrm>
-            <a:off x="856129" y="5105400"/>
-            <a:ext cx="3733800" cy="646331"/>
+            <a:off x="6096000" y="5140475"/>
+            <a:ext cx="1981199" cy="584775"/>
           </a:xfrm>
           <a:prstGeom prst="rect">
             <a:avLst/>
@@ -6728,17 +7414,456 @@
           <a:lstStyle/>
           <a:p>
             <a:r>
-              <a:rPr lang="ro-RO" b="1" dirty="0" smtClean="0"/>
-              <a:t>Marcarea bilelor care au aceeasi culoare cu cea data de shooter</a:t>
-            </a:r>
-            <a:endParaRPr lang="en-US" b="1" dirty="0"/>
+              <a:rPr lang="ro-RO" sz="1600" b="1" dirty="0" smtClean="0"/>
+              <a:t>Initalizarea culorilor pentru bile</a:t>
+            </a:r>
+            <a:endParaRPr lang="en-US" sz="1600" b="1" dirty="0"/>
           </a:p>
         </p:txBody>
       </p:sp>
     </p:spTree>
     <p:extLst>
       <p:ext uri="{BB962C8B-B14F-4D97-AF65-F5344CB8AC3E}">
-        <p14:creationId xmlns:p14="http://schemas.microsoft.com/office/powerpoint/2010/main" val="2796172894"/>
+        <p14:creationId xmlns:p14="http://schemas.microsoft.com/office/powerpoint/2010/main" val="3673873426"/>
+      </p:ext>
+    </p:extLst>
+  </p:cSld>
+  <p:clrMapOvr>
+    <a:masterClrMapping/>
+  </p:clrMapOvr>
+  <p:timing>
+    <p:tnLst>
+      <p:par>
+        <p:cTn id="1" dur="indefinite" restart="never" nodeType="tmRoot"/>
+      </p:par>
+    </p:tnLst>
+  </p:timing>
+</p:sld>
+</file>
+
+<file path=ppt/slides/slide8.xml><?xml version="1.0" encoding="utf-8"?>
+<p:sld xmlns:a="http://schemas.openxmlformats.org/drawingml/2006/main" xmlns:r="http://schemas.openxmlformats.org/officeDocument/2006/relationships" xmlns:p="http://schemas.openxmlformats.org/presentationml/2006/main">
+  <p:cSld>
+    <p:spTree>
+      <p:nvGrpSpPr>
+        <p:cNvPr id="1" name=""/>
+        <p:cNvGrpSpPr/>
+        <p:nvPr/>
+      </p:nvGrpSpPr>
+      <p:grpSpPr>
+        <a:xfrm>
+          <a:off x="0" y="0"/>
+          <a:ext cx="0" cy="0"/>
+          <a:chOff x="0" y="0"/>
+          <a:chExt cx="0" cy="0"/>
+        </a:xfrm>
+      </p:grpSpPr>
+      <p:sp>
+        <p:nvSpPr>
+          <p:cNvPr id="2" name="Title 1"/>
+          <p:cNvSpPr>
+            <a:spLocks noGrp="1"/>
+          </p:cNvSpPr>
+          <p:nvPr>
+            <p:ph type="title"/>
+          </p:nvPr>
+        </p:nvSpPr>
+        <p:spPr>
+          <a:xfrm>
+            <a:off x="762000" y="457200"/>
+            <a:ext cx="7543800" cy="1066800"/>
+          </a:xfrm>
+        </p:spPr>
+        <p:style>
+          <a:lnRef idx="2">
+            <a:schemeClr val="accent2"/>
+          </a:lnRef>
+          <a:fillRef idx="1">
+            <a:schemeClr val="lt1"/>
+          </a:fillRef>
+          <a:effectRef idx="0">
+            <a:schemeClr val="accent2"/>
+          </a:effectRef>
+          <a:fontRef idx="minor">
+            <a:schemeClr val="dk1"/>
+          </a:fontRef>
+        </p:style>
+        <p:txBody>
+          <a:bodyPr>
+            <a:noAutofit/>
+          </a:bodyPr>
+          <a:lstStyle/>
+          <a:p>
+            <a:pPr algn="ctr"/>
+            <a:r>
+              <a:rPr lang="ro-RO" sz="2800" b="1" dirty="0"/>
+              <a:t>Functionalitatea de configurare a culorilor pentru bile – Partea </a:t>
+            </a:r>
+            <a:r>
+              <a:rPr lang="ro-RO" sz="2800" b="1" dirty="0" smtClean="0"/>
+              <a:t>2</a:t>
+            </a:r>
+            <a:endParaRPr lang="en-US" sz="2800" dirty="0"/>
+          </a:p>
+        </p:txBody>
+      </p:sp>
+      <p:pic>
+        <p:nvPicPr>
+          <p:cNvPr id="2050" name="Picture 2"/>
+          <p:cNvPicPr>
+            <a:picLocks noGrp="1" noChangeAspect="1" noChangeArrowheads="1"/>
+          </p:cNvPicPr>
+          <p:nvPr>
+            <p:ph sz="half" idx="2"/>
+          </p:nvPr>
+        </p:nvPicPr>
+        <p:blipFill>
+          <a:blip r:embed="rId2">
+            <a:extLst>
+              <a:ext uri="{28A0092B-C50C-407E-A947-70E740481C1C}">
+                <a14:useLocalDpi xmlns:a14="http://schemas.microsoft.com/office/drawing/2010/main" val="0"/>
+              </a:ext>
+            </a:extLst>
+          </a:blip>
+          <a:srcRect/>
+          <a:stretch>
+            <a:fillRect/>
+          </a:stretch>
+        </p:blipFill>
+        <p:spPr bwMode="auto">
+          <a:xfrm>
+            <a:off x="4684840" y="1676400"/>
+            <a:ext cx="3620960" cy="4267200"/>
+          </a:xfrm>
+          <a:prstGeom prst="rect">
+            <a:avLst/>
+          </a:prstGeom>
+          <a:noFill/>
+          <a:ln>
+            <a:noFill/>
+          </a:ln>
+          <a:effectLst/>
+          <a:extLst>
+            <a:ext uri="{909E8E84-426E-40DD-AFC4-6F175D3DCCD1}">
+              <a14:hiddenFill xmlns:a14="http://schemas.microsoft.com/office/drawing/2010/main">
+                <a:solidFill>
+                  <a:schemeClr val="accent1"/>
+                </a:solidFill>
+              </a14:hiddenFill>
+            </a:ext>
+            <a:ext uri="{91240B29-F687-4F45-9708-019B960494DF}">
+              <a14:hiddenLine xmlns:a14="http://schemas.microsoft.com/office/drawing/2010/main" w="9525">
+                <a:solidFill>
+                  <a:schemeClr val="tx1"/>
+                </a:solidFill>
+                <a:miter lim="800000"/>
+                <a:headEnd/>
+                <a:tailEnd/>
+              </a14:hiddenLine>
+            </a:ext>
+            <a:ext uri="{AF507438-7753-43E0-B8FC-AC1667EBCBE1}">
+              <a14:hiddenEffects xmlns:a14="http://schemas.microsoft.com/office/drawing/2010/main">
+                <a:effectLst>
+                  <a:outerShdw dist="35921" dir="2700000" algn="ctr" rotWithShape="0">
+                    <a:schemeClr val="bg2"/>
+                  </a:outerShdw>
+                </a:effectLst>
+              </a14:hiddenEffects>
+            </a:ext>
+          </a:extLst>
+        </p:spPr>
+      </p:pic>
+      <p:sp>
+        <p:nvSpPr>
+          <p:cNvPr id="5" name="TextBox 4"/>
+          <p:cNvSpPr txBox="1"/>
+          <p:nvPr/>
+        </p:nvSpPr>
+        <p:spPr>
+          <a:xfrm>
+            <a:off x="768724" y="2057400"/>
+            <a:ext cx="3733800" cy="3416320"/>
+          </a:xfrm>
+          <a:prstGeom prst="rect">
+            <a:avLst/>
+          </a:prstGeom>
+        </p:spPr>
+        <p:style>
+          <a:lnRef idx="1">
+            <a:schemeClr val="accent2"/>
+          </a:lnRef>
+          <a:fillRef idx="2">
+            <a:schemeClr val="accent2"/>
+          </a:fillRef>
+          <a:effectRef idx="1">
+            <a:schemeClr val="accent2"/>
+          </a:effectRef>
+          <a:fontRef idx="minor">
+            <a:schemeClr val="dk1"/>
+          </a:fontRef>
+        </p:style>
+        <p:txBody>
+          <a:bodyPr wrap="square" rtlCol="0">
+            <a:spAutoFit/>
+          </a:bodyPr>
+          <a:lstStyle/>
+          <a:p>
+            <a:r>
+              <a:rPr lang="ro-RO" b="1" dirty="0" smtClean="0"/>
+              <a:t>Culorile pentru bile sunt generate aleatoru de algoritmul din imaginea atasata.</a:t>
+            </a:r>
+          </a:p>
+          <a:p>
+            <a:endParaRPr lang="ro-RO" b="1" dirty="0"/>
+          </a:p>
+          <a:p>
+            <a:r>
+              <a:rPr lang="ro-RO" b="1" dirty="0" smtClean="0"/>
+              <a:t>Numarul maxim de posibilitati pentru culori este 8, iar numarul minim este 2. </a:t>
+            </a:r>
+          </a:p>
+          <a:p>
+            <a:endParaRPr lang="ro-RO" b="1" dirty="0"/>
+          </a:p>
+          <a:p>
+            <a:r>
+              <a:rPr lang="ro-RO" b="1" dirty="0" smtClean="0"/>
+              <a:t>Astfel in functie de dorinta utilizatorului, se vor genera culorile in functie de cate isi doreste acesta in intervalul (2,8).</a:t>
+            </a:r>
+            <a:endParaRPr lang="en-US" b="1" dirty="0"/>
+          </a:p>
+        </p:txBody>
+      </p:sp>
+    </p:spTree>
+    <p:extLst>
+      <p:ext uri="{BB962C8B-B14F-4D97-AF65-F5344CB8AC3E}">
+        <p14:creationId xmlns:p14="http://schemas.microsoft.com/office/powerpoint/2010/main" val="493938646"/>
+      </p:ext>
+    </p:extLst>
+  </p:cSld>
+  <p:clrMapOvr>
+    <a:masterClrMapping/>
+  </p:clrMapOvr>
+  <p:timing>
+    <p:tnLst>
+      <p:par>
+        <p:cTn id="1" dur="indefinite" restart="never" nodeType="tmRoot"/>
+      </p:par>
+    </p:tnLst>
+  </p:timing>
+</p:sld>
+</file>
+
+<file path=ppt/slides/slide9.xml><?xml version="1.0" encoding="utf-8"?>
+<p:sld xmlns:a="http://schemas.openxmlformats.org/drawingml/2006/main" xmlns:r="http://schemas.openxmlformats.org/officeDocument/2006/relationships" xmlns:p="http://schemas.openxmlformats.org/presentationml/2006/main">
+  <p:cSld>
+    <p:spTree>
+      <p:nvGrpSpPr>
+        <p:cNvPr id="1" name=""/>
+        <p:cNvGrpSpPr/>
+        <p:nvPr/>
+      </p:nvGrpSpPr>
+      <p:grpSpPr>
+        <a:xfrm>
+          <a:off x="0" y="0"/>
+          <a:ext cx="0" cy="0"/>
+          <a:chOff x="0" y="0"/>
+          <a:chExt cx="0" cy="0"/>
+        </a:xfrm>
+      </p:grpSpPr>
+      <p:sp>
+        <p:nvSpPr>
+          <p:cNvPr id="2" name="Title 1"/>
+          <p:cNvSpPr>
+            <a:spLocks noGrp="1"/>
+          </p:cNvSpPr>
+          <p:nvPr>
+            <p:ph type="title"/>
+          </p:nvPr>
+        </p:nvSpPr>
+        <p:spPr>
+          <a:xfrm>
+            <a:off x="762000" y="457200"/>
+            <a:ext cx="7620000" cy="914400"/>
+          </a:xfrm>
+        </p:spPr>
+        <p:style>
+          <a:lnRef idx="2">
+            <a:schemeClr val="accent2"/>
+          </a:lnRef>
+          <a:fillRef idx="1">
+            <a:schemeClr val="lt1"/>
+          </a:fillRef>
+          <a:effectRef idx="0">
+            <a:schemeClr val="accent2"/>
+          </a:effectRef>
+          <a:fontRef idx="minor">
+            <a:schemeClr val="dk1"/>
+          </a:fontRef>
+        </p:style>
+        <p:txBody>
+          <a:bodyPr>
+            <a:noAutofit/>
+          </a:bodyPr>
+          <a:lstStyle/>
+          <a:p>
+            <a:pPr algn="ctr"/>
+            <a:r>
+              <a:rPr lang="ro-RO" sz="2400" b="1" dirty="0" smtClean="0"/>
+              <a:t>Functionalitatea pentru shooter si incrementarea punctelor – Partea 1</a:t>
+            </a:r>
+            <a:endParaRPr lang="en-US" sz="2400" b="1" dirty="0"/>
+          </a:p>
+        </p:txBody>
+      </p:sp>
+      <p:pic>
+        <p:nvPicPr>
+          <p:cNvPr id="3074" name="Picture 2"/>
+          <p:cNvPicPr>
+            <a:picLocks noGrp="1" noChangeAspect="1" noChangeArrowheads="1"/>
+          </p:cNvPicPr>
+          <p:nvPr>
+            <p:ph sz="half" idx="2"/>
+          </p:nvPr>
+        </p:nvPicPr>
+        <p:blipFill>
+          <a:blip r:embed="rId2">
+            <a:extLst>
+              <a:ext uri="{28A0092B-C50C-407E-A947-70E740481C1C}">
+                <a14:useLocalDpi xmlns:a14="http://schemas.microsoft.com/office/drawing/2010/main" val="0"/>
+              </a:ext>
+            </a:extLst>
+          </a:blip>
+          <a:srcRect/>
+          <a:stretch>
+            <a:fillRect/>
+          </a:stretch>
+        </p:blipFill>
+        <p:spPr bwMode="auto">
+          <a:xfrm>
+            <a:off x="4800600" y="1524000"/>
+            <a:ext cx="3551200" cy="3124200"/>
+          </a:xfrm>
+          <a:prstGeom prst="rect">
+            <a:avLst/>
+          </a:prstGeom>
+          <a:noFill/>
+          <a:ln>
+            <a:noFill/>
+          </a:ln>
+          <a:effectLst/>
+          <a:extLst>
+            <a:ext uri="{909E8E84-426E-40DD-AFC4-6F175D3DCCD1}">
+              <a14:hiddenFill xmlns:a14="http://schemas.microsoft.com/office/drawing/2010/main">
+                <a:solidFill>
+                  <a:schemeClr val="accent1"/>
+                </a:solidFill>
+              </a14:hiddenFill>
+            </a:ext>
+            <a:ext uri="{91240B29-F687-4F45-9708-019B960494DF}">
+              <a14:hiddenLine xmlns:a14="http://schemas.microsoft.com/office/drawing/2010/main" w="9525">
+                <a:solidFill>
+                  <a:schemeClr val="tx1"/>
+                </a:solidFill>
+                <a:miter lim="800000"/>
+                <a:headEnd/>
+                <a:tailEnd/>
+              </a14:hiddenLine>
+            </a:ext>
+            <a:ext uri="{AF507438-7753-43E0-B8FC-AC1667EBCBE1}">
+              <a14:hiddenEffects xmlns:a14="http://schemas.microsoft.com/office/drawing/2010/main">
+                <a:effectLst>
+                  <a:outerShdw dist="35921" dir="2700000" algn="ctr" rotWithShape="0">
+                    <a:schemeClr val="bg2"/>
+                  </a:outerShdw>
+                </a:effectLst>
+              </a14:hiddenEffects>
+            </a:ext>
+          </a:extLst>
+        </p:spPr>
+      </p:pic>
+      <p:sp>
+        <p:nvSpPr>
+          <p:cNvPr id="5" name="TextBox 4"/>
+          <p:cNvSpPr txBox="1"/>
+          <p:nvPr/>
+        </p:nvSpPr>
+        <p:spPr>
+          <a:xfrm>
+            <a:off x="838200" y="1828800"/>
+            <a:ext cx="184731" cy="369332"/>
+          </a:xfrm>
+          <a:prstGeom prst="rect">
+            <a:avLst/>
+          </a:prstGeom>
+          <a:noFill/>
+        </p:spPr>
+        <p:txBody>
+          <a:bodyPr wrap="none" rtlCol="0">
+            <a:spAutoFit/>
+          </a:bodyPr>
+          <a:lstStyle/>
+          <a:p>
+            <a:endParaRPr lang="en-US" dirty="0"/>
+          </a:p>
+        </p:txBody>
+      </p:sp>
+      <p:sp>
+        <p:nvSpPr>
+          <p:cNvPr id="6" name="TextBox 5"/>
+          <p:cNvSpPr txBox="1"/>
+          <p:nvPr/>
+        </p:nvSpPr>
+        <p:spPr>
+          <a:xfrm>
+            <a:off x="685800" y="3135406"/>
+            <a:ext cx="4014538" cy="2862322"/>
+          </a:xfrm>
+          <a:prstGeom prst="rect">
+            <a:avLst/>
+          </a:prstGeom>
+        </p:spPr>
+        <p:style>
+          <a:lnRef idx="1">
+            <a:schemeClr val="accent2"/>
+          </a:lnRef>
+          <a:fillRef idx="2">
+            <a:schemeClr val="accent2"/>
+          </a:fillRef>
+          <a:effectRef idx="1">
+            <a:schemeClr val="accent2"/>
+          </a:effectRef>
+          <a:fontRef idx="minor">
+            <a:schemeClr val="dk1"/>
+          </a:fontRef>
+        </p:style>
+        <p:txBody>
+          <a:bodyPr wrap="square" rtlCol="0">
+            <a:spAutoFit/>
+          </a:bodyPr>
+          <a:lstStyle/>
+          <a:p>
+            <a:r>
+              <a:rPr lang="ro-RO" b="1" dirty="0" smtClean="0"/>
+              <a:t>Shooter-ul este redat de catre sageata din imaginea alaturata, utilizatorul poate trage catre o grupare de doua sau mai multe bile.</a:t>
+            </a:r>
+          </a:p>
+          <a:p>
+            <a:endParaRPr lang="ro-RO" b="1" dirty="0"/>
+          </a:p>
+          <a:p>
+            <a:r>
+              <a:rPr lang="ro-RO" b="1" dirty="0" smtClean="0"/>
+              <a:t>O data tintita grupa de bile de aceeasi culoare cu bila, aceasta dispare si punctele se incrementeaza si afisate in sectiunea de sus din stanga a imaginii alaturate.</a:t>
+            </a:r>
+            <a:endParaRPr lang="en-US" b="1" dirty="0"/>
+          </a:p>
+        </p:txBody>
+      </p:sp>
+    </p:spTree>
+    <p:extLst>
+      <p:ext uri="{BB962C8B-B14F-4D97-AF65-F5344CB8AC3E}">
+        <p14:creationId xmlns:p14="http://schemas.microsoft.com/office/powerpoint/2010/main" val="3745293928"/>
       </p:ext>
     </p:extLst>
   </p:cSld>

</xml_diff>

<commit_message>
chore: modified delivery 3 doc
</commit_message>
<xml_diff>
--- a/docs/IOC_PrezentareBubbleShooter_DraghiciCiontu_CR4S1A.pptx
+++ b/docs/IOC_PrezentareBubbleShooter_DraghiciCiontu_CR4S1A.pptx
@@ -24,6 +24,7 @@
     <p:sldId id="269" r:id="rId18"/>
     <p:sldId id="270" r:id="rId19"/>
     <p:sldId id="271" r:id="rId20"/>
+    <p:sldId id="275" r:id="rId21"/>
   </p:sldIdLst>
   <p:sldSz cx="9144000" cy="6858000" type="screen4x3"/>
   <p:notesSz cx="6858000" cy="9144000"/>
@@ -356,7 +357,7 @@
             <a:fld id="{1D8BD707-D9CF-40AE-B4C6-C98DA3205C09}" type="datetimeFigureOut">
               <a:rPr lang="en-US" smtClean="0"/>
               <a:pPr/>
-              <a:t>4/5/2023</a:t>
+              <a:t>4/8/2023</a:t>
             </a:fld>
             <a:endParaRPr lang="en-US"/>
           </a:p>
@@ -571,7 +572,7 @@
             <a:fld id="{1D8BD707-D9CF-40AE-B4C6-C98DA3205C09}" type="datetimeFigureOut">
               <a:rPr lang="en-US" smtClean="0"/>
               <a:pPr/>
-              <a:t>4/5/2023</a:t>
+              <a:t>4/8/2023</a:t>
             </a:fld>
             <a:endParaRPr lang="en-US"/>
           </a:p>
@@ -748,7 +749,7 @@
             <a:fld id="{1D8BD707-D9CF-40AE-B4C6-C98DA3205C09}" type="datetimeFigureOut">
               <a:rPr lang="en-US" smtClean="0"/>
               <a:pPr/>
-              <a:t>4/5/2023</a:t>
+              <a:t>4/8/2023</a:t>
             </a:fld>
             <a:endParaRPr lang="en-US"/>
           </a:p>
@@ -915,7 +916,7 @@
             <a:fld id="{1D8BD707-D9CF-40AE-B4C6-C98DA3205C09}" type="datetimeFigureOut">
               <a:rPr lang="en-US" smtClean="0"/>
               <a:pPr/>
-              <a:t>4/5/2023</a:t>
+              <a:t>4/8/2023</a:t>
             </a:fld>
             <a:endParaRPr lang="en-US"/>
           </a:p>
@@ -1201,7 +1202,7 @@
             <a:fld id="{1D8BD707-D9CF-40AE-B4C6-C98DA3205C09}" type="datetimeFigureOut">
               <a:rPr lang="en-US" smtClean="0"/>
               <a:pPr/>
-              <a:t>4/5/2023</a:t>
+              <a:t>4/8/2023</a:t>
             </a:fld>
             <a:endParaRPr lang="en-US"/>
           </a:p>
@@ -1529,7 +1530,7 @@
             <a:fld id="{1D8BD707-D9CF-40AE-B4C6-C98DA3205C09}" type="datetimeFigureOut">
               <a:rPr lang="en-US" smtClean="0"/>
               <a:pPr/>
-              <a:t>4/5/2023</a:t>
+              <a:t>4/8/2023</a:t>
             </a:fld>
             <a:endParaRPr lang="en-US"/>
           </a:p>
@@ -1956,7 +1957,7 @@
             <a:fld id="{1D8BD707-D9CF-40AE-B4C6-C98DA3205C09}" type="datetimeFigureOut">
               <a:rPr lang="en-US" smtClean="0"/>
               <a:pPr/>
-              <a:t>4/5/2023</a:t>
+              <a:t>4/8/2023</a:t>
             </a:fld>
             <a:endParaRPr lang="en-US"/>
           </a:p>
@@ -2131,7 +2132,7 @@
             <a:fld id="{1D8BD707-D9CF-40AE-B4C6-C98DA3205C09}" type="datetimeFigureOut">
               <a:rPr lang="en-US" smtClean="0"/>
               <a:pPr/>
-              <a:t>4/5/2023</a:t>
+              <a:t>4/8/2023</a:t>
             </a:fld>
             <a:endParaRPr lang="en-US"/>
           </a:p>
@@ -2223,7 +2224,7 @@
             <a:fld id="{1D8BD707-D9CF-40AE-B4C6-C98DA3205C09}" type="datetimeFigureOut">
               <a:rPr lang="en-US" smtClean="0"/>
               <a:pPr/>
-              <a:t>4/5/2023</a:t>
+              <a:t>4/8/2023</a:t>
             </a:fld>
             <a:endParaRPr lang="en-US"/>
           </a:p>
@@ -2505,7 +2506,7 @@
             <a:fld id="{1D8BD707-D9CF-40AE-B4C6-C98DA3205C09}" type="datetimeFigureOut">
               <a:rPr lang="en-US" smtClean="0"/>
               <a:pPr/>
-              <a:t>4/5/2023</a:t>
+              <a:t>4/8/2023</a:t>
             </a:fld>
             <a:endParaRPr lang="en-US"/>
           </a:p>
@@ -2806,7 +2807,7 @@
             <a:fld id="{1D8BD707-D9CF-40AE-B4C6-C98DA3205C09}" type="datetimeFigureOut">
               <a:rPr lang="en-US" smtClean="0"/>
               <a:pPr/>
-              <a:t>4/5/2023</a:t>
+              <a:t>4/8/2023</a:t>
             </a:fld>
             <a:endParaRPr lang="en-US"/>
           </a:p>
@@ -3018,7 +3019,7 @@
             <a:fld id="{1D8BD707-D9CF-40AE-B4C6-C98DA3205C09}" type="datetimeFigureOut">
               <a:rPr lang="en-US" smtClean="0"/>
               <a:pPr/>
-              <a:t>4/5/2023</a:t>
+              <a:t>4/8/2023</a:t>
             </a:fld>
             <a:endParaRPr lang="en-US"/>
           </a:p>
@@ -6279,6 +6280,118 @@
 </p:sld>
 </file>
 
+<file path=ppt/slides/slide20.xml><?xml version="1.0" encoding="utf-8"?>
+<p:sld xmlns:a="http://schemas.openxmlformats.org/drawingml/2006/main" xmlns:r="http://schemas.openxmlformats.org/officeDocument/2006/relationships" xmlns:p="http://schemas.openxmlformats.org/presentationml/2006/main">
+  <p:cSld>
+    <p:spTree>
+      <p:nvGrpSpPr>
+        <p:cNvPr id="1" name=""/>
+        <p:cNvGrpSpPr/>
+        <p:nvPr/>
+      </p:nvGrpSpPr>
+      <p:grpSpPr>
+        <a:xfrm>
+          <a:off x="0" y="0"/>
+          <a:ext cx="0" cy="0"/>
+          <a:chOff x="0" y="0"/>
+          <a:chExt cx="0" cy="0"/>
+        </a:xfrm>
+      </p:grpSpPr>
+      <p:sp>
+        <p:nvSpPr>
+          <p:cNvPr id="2" name="Title 1"/>
+          <p:cNvSpPr>
+            <a:spLocks noGrp="1"/>
+          </p:cNvSpPr>
+          <p:nvPr>
+            <p:ph type="title"/>
+          </p:nvPr>
+        </p:nvSpPr>
+        <p:spPr>
+          <a:xfrm>
+            <a:off x="914400" y="457200"/>
+            <a:ext cx="7239000" cy="609600"/>
+          </a:xfrm>
+        </p:spPr>
+        <p:style>
+          <a:lnRef idx="2">
+            <a:schemeClr val="accent2"/>
+          </a:lnRef>
+          <a:fillRef idx="1">
+            <a:schemeClr val="lt1"/>
+          </a:fillRef>
+          <a:effectRef idx="0">
+            <a:schemeClr val="accent2"/>
+          </a:effectRef>
+          <a:fontRef idx="minor">
+            <a:schemeClr val="dk1"/>
+          </a:fontRef>
+        </p:style>
+        <p:txBody>
+          <a:bodyPr>
+            <a:normAutofit/>
+          </a:bodyPr>
+          <a:lstStyle/>
+          <a:p>
+            <a:pPr algn="ctr"/>
+            <a:r>
+              <a:rPr lang="ro-RO" sz="2800" b="1" dirty="0" smtClean="0">
+                <a:latin typeface="+mn-lt"/>
+              </a:rPr>
+              <a:t>Link catre aplicatia dezvoltata</a:t>
+            </a:r>
+            <a:endParaRPr lang="en-US" sz="2800" b="1" dirty="0">
+              <a:latin typeface="+mn-lt"/>
+            </a:endParaRPr>
+          </a:p>
+        </p:txBody>
+      </p:sp>
+      <p:sp>
+        <p:nvSpPr>
+          <p:cNvPr id="3" name="Content Placeholder 2"/>
+          <p:cNvSpPr>
+            <a:spLocks noGrp="1"/>
+          </p:cNvSpPr>
+          <p:nvPr>
+            <p:ph sz="half" idx="1"/>
+          </p:nvPr>
+        </p:nvSpPr>
+        <p:spPr>
+          <a:xfrm>
+            <a:off x="914400" y="2590800"/>
+            <a:ext cx="7315200" cy="2090928"/>
+          </a:xfrm>
+        </p:spPr>
+        <p:txBody>
+          <a:bodyPr>
+            <a:normAutofit/>
+          </a:bodyPr>
+          <a:lstStyle/>
+          <a:p>
+            <a:pPr marL="457200" indent="-457200">
+              <a:buFont typeface="+mj-lt"/>
+              <a:buAutoNum type="arabicPeriod"/>
+            </a:pPr>
+            <a:r>
+              <a:rPr lang="en-US" sz="2000" b="1" dirty="0"/>
+              <a:t>https://github.com/AndreeaDraghici/BubbleShooterGame.git</a:t>
+            </a:r>
+          </a:p>
+        </p:txBody>
+      </p:sp>
+    </p:spTree>
+    <p:extLst>
+      <p:ext uri="{BB962C8B-B14F-4D97-AF65-F5344CB8AC3E}">
+        <p14:creationId xmlns:p14="http://schemas.microsoft.com/office/powerpoint/2010/main" val="4073020984"/>
+      </p:ext>
+    </p:extLst>
+  </p:cSld>
+  <p:clrMapOvr>
+    <a:masterClrMapping/>
+  </p:clrMapOvr>
+</p:sld>
+</file>
+
 <file path=ppt/slides/slide3.xml><?xml version="1.0" encoding="utf-8"?>
 <p:sld xmlns:a="http://schemas.openxmlformats.org/drawingml/2006/main" xmlns:r="http://schemas.openxmlformats.org/officeDocument/2006/relationships" xmlns:p="http://schemas.openxmlformats.org/presentationml/2006/main">
   <p:cSld>

</xml_diff>